<commit_message>
Adding a workflow page for PhPID requests
</commit_message>
<xml_diff>
--- a/ImplementationGuideImages.pptx
+++ b/ImplementationGuideImages.pptx
@@ -6,6 +6,7 @@
   </p:sldMasterIdLst>
   <p:sldIdLst>
     <p:sldId id="256" r:id="rId2"/>
+    <p:sldId id="257" r:id="rId3"/>
   </p:sldIdLst>
   <p:sldSz cx="12192000" cy="6858000"/>
   <p:notesSz cx="6858000" cy="9144000"/>
@@ -104,6 +105,11 @@
       </a:defRPr>
     </a:lvl9pPr>
   </p:defaultTextStyle>
+  <p:extLst>
+    <p:ext uri="{EFAFB233-063F-42B5-8137-9DF3F51BA10A}">
+      <p15:sldGuideLst xmlns:p15="http://schemas.microsoft.com/office/powerpoint/2012/main"/>
+    </p:ext>
+  </p:extLst>
 </p:presentation>
 </file>
 
@@ -256,7 +262,7 @@
           <a:p>
             <a:fld id="{6B5A8AD0-4133-444B-956D-B3352209FA33}" type="datetimeFigureOut">
               <a:rPr lang="en-SE" smtClean="0"/>
-              <a:t>2023-09-29</a:t>
+              <a:t>2023-10-02</a:t>
             </a:fld>
             <a:endParaRPr lang="en-SE"/>
           </a:p>
@@ -456,7 +462,7 @@
           <a:p>
             <a:fld id="{6B5A8AD0-4133-444B-956D-B3352209FA33}" type="datetimeFigureOut">
               <a:rPr lang="en-SE" smtClean="0"/>
-              <a:t>2023-09-29</a:t>
+              <a:t>2023-10-02</a:t>
             </a:fld>
             <a:endParaRPr lang="en-SE"/>
           </a:p>
@@ -666,7 +672,7 @@
           <a:p>
             <a:fld id="{6B5A8AD0-4133-444B-956D-B3352209FA33}" type="datetimeFigureOut">
               <a:rPr lang="en-SE" smtClean="0"/>
-              <a:t>2023-09-29</a:t>
+              <a:t>2023-10-02</a:t>
             </a:fld>
             <a:endParaRPr lang="en-SE"/>
           </a:p>
@@ -866,7 +872,7 @@
           <a:p>
             <a:fld id="{6B5A8AD0-4133-444B-956D-B3352209FA33}" type="datetimeFigureOut">
               <a:rPr lang="en-SE" smtClean="0"/>
-              <a:t>2023-09-29</a:t>
+              <a:t>2023-10-02</a:t>
             </a:fld>
             <a:endParaRPr lang="en-SE"/>
           </a:p>
@@ -1142,7 +1148,7 @@
           <a:p>
             <a:fld id="{6B5A8AD0-4133-444B-956D-B3352209FA33}" type="datetimeFigureOut">
               <a:rPr lang="en-SE" smtClean="0"/>
-              <a:t>2023-09-29</a:t>
+              <a:t>2023-10-02</a:t>
             </a:fld>
             <a:endParaRPr lang="en-SE"/>
           </a:p>
@@ -1410,7 +1416,7 @@
           <a:p>
             <a:fld id="{6B5A8AD0-4133-444B-956D-B3352209FA33}" type="datetimeFigureOut">
               <a:rPr lang="en-SE" smtClean="0"/>
-              <a:t>2023-09-29</a:t>
+              <a:t>2023-10-02</a:t>
             </a:fld>
             <a:endParaRPr lang="en-SE"/>
           </a:p>
@@ -1825,7 +1831,7 @@
           <a:p>
             <a:fld id="{6B5A8AD0-4133-444B-956D-B3352209FA33}" type="datetimeFigureOut">
               <a:rPr lang="en-SE" smtClean="0"/>
-              <a:t>2023-09-29</a:t>
+              <a:t>2023-10-02</a:t>
             </a:fld>
             <a:endParaRPr lang="en-SE"/>
           </a:p>
@@ -1967,7 +1973,7 @@
           <a:p>
             <a:fld id="{6B5A8AD0-4133-444B-956D-B3352209FA33}" type="datetimeFigureOut">
               <a:rPr lang="en-SE" smtClean="0"/>
-              <a:t>2023-09-29</a:t>
+              <a:t>2023-10-02</a:t>
             </a:fld>
             <a:endParaRPr lang="en-SE"/>
           </a:p>
@@ -2080,7 +2086,7 @@
           <a:p>
             <a:fld id="{6B5A8AD0-4133-444B-956D-B3352209FA33}" type="datetimeFigureOut">
               <a:rPr lang="en-SE" smtClean="0"/>
-              <a:t>2023-09-29</a:t>
+              <a:t>2023-10-02</a:t>
             </a:fld>
             <a:endParaRPr lang="en-SE"/>
           </a:p>
@@ -2393,7 +2399,7 @@
           <a:p>
             <a:fld id="{6B5A8AD0-4133-444B-956D-B3352209FA33}" type="datetimeFigureOut">
               <a:rPr lang="en-SE" smtClean="0"/>
-              <a:t>2023-09-29</a:t>
+              <a:t>2023-10-02</a:t>
             </a:fld>
             <a:endParaRPr lang="en-SE"/>
           </a:p>
@@ -2682,7 +2688,7 @@
           <a:p>
             <a:fld id="{6B5A8AD0-4133-444B-956D-B3352209FA33}" type="datetimeFigureOut">
               <a:rPr lang="en-SE" smtClean="0"/>
-              <a:t>2023-09-29</a:t>
+              <a:t>2023-10-02</a:t>
             </a:fld>
             <a:endParaRPr lang="en-SE"/>
           </a:p>
@@ -2925,7 +2931,7 @@
           <a:p>
             <a:fld id="{6B5A8AD0-4133-444B-956D-B3352209FA33}" type="datetimeFigureOut">
               <a:rPr lang="en-SE" smtClean="0"/>
-              <a:t>2023-09-29</a:t>
+              <a:t>2023-10-02</a:t>
             </a:fld>
             <a:endParaRPr lang="en-SE"/>
           </a:p>
@@ -4683,6 +4689,2034 @@
 </p:sld>
 </file>
 
+<file path=ppt/slides/slide2.xml><?xml version="1.0" encoding="utf-8"?>
+<p:sld xmlns:a="http://schemas.openxmlformats.org/drawingml/2006/main" xmlns:r="http://schemas.openxmlformats.org/officeDocument/2006/relationships" xmlns:p="http://schemas.openxmlformats.org/presentationml/2006/main">
+  <p:cSld>
+    <p:spTree>
+      <p:nvGrpSpPr>
+        <p:cNvPr id="1" name=""/>
+        <p:cNvGrpSpPr/>
+        <p:nvPr/>
+      </p:nvGrpSpPr>
+      <p:grpSpPr>
+        <a:xfrm>
+          <a:off x="0" y="0"/>
+          <a:ext cx="0" cy="0"/>
+          <a:chOff x="0" y="0"/>
+          <a:chExt cx="0" cy="0"/>
+        </a:xfrm>
+      </p:grpSpPr>
+      <p:sp>
+        <p:nvSpPr>
+          <p:cNvPr id="20" name="Rectangle: Rounded Corners 19">
+            <a:extLst>
+              <a:ext uri="{FF2B5EF4-FFF2-40B4-BE49-F238E27FC236}">
+                <a16:creationId xmlns:a16="http://schemas.microsoft.com/office/drawing/2014/main" id="{A3D9F251-743A-733B-9B00-7B6F076E7A9A}"/>
+              </a:ext>
+            </a:extLst>
+          </p:cNvPr>
+          <p:cNvSpPr/>
+          <p:nvPr/>
+        </p:nvSpPr>
+        <p:spPr>
+          <a:xfrm>
+            <a:off x="882949" y="2303638"/>
+            <a:ext cx="3626232" cy="3272585"/>
+          </a:xfrm>
+          <a:prstGeom prst="roundRect">
+            <a:avLst/>
+          </a:prstGeom>
+          <a:solidFill>
+            <a:srgbClr val="0D494F"/>
+          </a:solidFill>
+          <a:ln w="12700" cap="flat" cmpd="sng" algn="ctr">
+            <a:solidFill>
+              <a:srgbClr val="0D494F">
+                <a:shade val="15000"/>
+              </a:srgbClr>
+            </a:solidFill>
+            <a:prstDash val="solid"/>
+            <a:miter lim="800000"/>
+          </a:ln>
+          <a:effectLst/>
+        </p:spPr>
+        <p:txBody>
+          <a:bodyPr rtlCol="0" anchor="ctr"/>
+          <a:lstStyle/>
+          <a:p>
+            <a:pPr marL="0" marR="0" lvl="0" indent="0" algn="ctr" defTabSz="914400" eaLnBrk="1" fontAlgn="auto" latinLnBrk="0" hangingPunct="1">
+              <a:lnSpc>
+                <a:spcPct val="100000"/>
+              </a:lnSpc>
+              <a:spcBef>
+                <a:spcPts val="0"/>
+              </a:spcBef>
+              <a:spcAft>
+                <a:spcPts val="0"/>
+              </a:spcAft>
+              <a:buClrTx/>
+              <a:buSzTx/>
+              <a:buFontTx/>
+              <a:buNone/>
+              <a:tabLst/>
+              <a:defRPr/>
+            </a:pPr>
+            <a:r>
+              <a:rPr kumimoji="0" lang="en-US" sz="1800" b="0" i="0" u="none" strike="noStrike" kern="0" cap="none" spc="0" normalizeH="0" baseline="0" noProof="0" dirty="0">
+                <a:ln>
+                  <a:noFill/>
+                </a:ln>
+                <a:solidFill>
+                  <a:srgbClr val="FFFFFF"/>
+                </a:solidFill>
+                <a:effectLst/>
+                <a:uLnTx/>
+                <a:uFillTx/>
+                <a:latin typeface="Calibri" panose="020F0502020204030204"/>
+                <a:ea typeface="+mn-ea"/>
+                <a:cs typeface="+mn-cs"/>
+              </a:rPr>
+              <a:t>Task</a:t>
+            </a:r>
+          </a:p>
+          <a:p>
+            <a:pPr marL="0" marR="0" lvl="0" indent="0" algn="ctr" defTabSz="914400" eaLnBrk="1" fontAlgn="auto" latinLnBrk="0" hangingPunct="1">
+              <a:lnSpc>
+                <a:spcPct val="100000"/>
+              </a:lnSpc>
+              <a:spcBef>
+                <a:spcPts val="0"/>
+              </a:spcBef>
+              <a:spcAft>
+                <a:spcPts val="0"/>
+              </a:spcAft>
+              <a:buClrTx/>
+              <a:buSzTx/>
+              <a:buFontTx/>
+              <a:buNone/>
+              <a:tabLst/>
+              <a:defRPr/>
+            </a:pPr>
+            <a:endParaRPr kumimoji="0" lang="en-US" sz="1800" b="0" i="0" u="none" strike="noStrike" kern="0" cap="none" spc="0" normalizeH="0" baseline="0" noProof="0" dirty="0">
+              <a:ln>
+                <a:noFill/>
+              </a:ln>
+              <a:solidFill>
+                <a:srgbClr val="FFFFFF"/>
+              </a:solidFill>
+              <a:effectLst/>
+              <a:uLnTx/>
+              <a:uFillTx/>
+              <a:latin typeface="Calibri" panose="020F0502020204030204"/>
+              <a:ea typeface="+mn-ea"/>
+              <a:cs typeface="+mn-cs"/>
+            </a:endParaRPr>
+          </a:p>
+          <a:p>
+            <a:pPr marL="0" marR="0" lvl="0" indent="0" algn="ctr" defTabSz="914400" eaLnBrk="1" fontAlgn="auto" latinLnBrk="0" hangingPunct="1">
+              <a:lnSpc>
+                <a:spcPct val="100000"/>
+              </a:lnSpc>
+              <a:spcBef>
+                <a:spcPts val="0"/>
+              </a:spcBef>
+              <a:spcAft>
+                <a:spcPts val="0"/>
+              </a:spcAft>
+              <a:buClrTx/>
+              <a:buSzTx/>
+              <a:buFontTx/>
+              <a:buNone/>
+              <a:tabLst/>
+              <a:defRPr/>
+            </a:pPr>
+            <a:endParaRPr kumimoji="0" lang="en-US" sz="1800" b="0" i="0" u="none" strike="noStrike" kern="0" cap="none" spc="0" normalizeH="0" baseline="0" noProof="0" dirty="0">
+              <a:ln>
+                <a:noFill/>
+              </a:ln>
+              <a:solidFill>
+                <a:srgbClr val="FFFFFF"/>
+              </a:solidFill>
+              <a:effectLst/>
+              <a:uLnTx/>
+              <a:uFillTx/>
+              <a:latin typeface="Calibri" panose="020F0502020204030204"/>
+              <a:ea typeface="+mn-ea"/>
+              <a:cs typeface="+mn-cs"/>
+            </a:endParaRPr>
+          </a:p>
+          <a:p>
+            <a:pPr marL="0" marR="0" lvl="0" indent="0" algn="ctr" defTabSz="914400" eaLnBrk="1" fontAlgn="auto" latinLnBrk="0" hangingPunct="1">
+              <a:lnSpc>
+                <a:spcPct val="100000"/>
+              </a:lnSpc>
+              <a:spcBef>
+                <a:spcPts val="0"/>
+              </a:spcBef>
+              <a:spcAft>
+                <a:spcPts val="0"/>
+              </a:spcAft>
+              <a:buClrTx/>
+              <a:buSzTx/>
+              <a:buFontTx/>
+              <a:buNone/>
+              <a:tabLst/>
+              <a:defRPr/>
+            </a:pPr>
+            <a:endParaRPr kumimoji="0" lang="en-US" sz="1800" b="0" i="0" u="none" strike="noStrike" kern="0" cap="none" spc="0" normalizeH="0" baseline="0" noProof="0" dirty="0">
+              <a:ln>
+                <a:noFill/>
+              </a:ln>
+              <a:solidFill>
+                <a:srgbClr val="FFFFFF"/>
+              </a:solidFill>
+              <a:effectLst/>
+              <a:uLnTx/>
+              <a:uFillTx/>
+              <a:latin typeface="Calibri" panose="020F0502020204030204"/>
+              <a:ea typeface="+mn-ea"/>
+              <a:cs typeface="+mn-cs"/>
+            </a:endParaRPr>
+          </a:p>
+          <a:p>
+            <a:pPr marL="0" marR="0" lvl="0" indent="0" algn="ctr" defTabSz="914400" eaLnBrk="1" fontAlgn="auto" latinLnBrk="0" hangingPunct="1">
+              <a:lnSpc>
+                <a:spcPct val="100000"/>
+              </a:lnSpc>
+              <a:spcBef>
+                <a:spcPts val="0"/>
+              </a:spcBef>
+              <a:spcAft>
+                <a:spcPts val="0"/>
+              </a:spcAft>
+              <a:buClrTx/>
+              <a:buSzTx/>
+              <a:buFontTx/>
+              <a:buNone/>
+              <a:tabLst/>
+              <a:defRPr/>
+            </a:pPr>
+            <a:endParaRPr kumimoji="0" lang="en-US" sz="1800" b="0" i="0" u="none" strike="noStrike" kern="0" cap="none" spc="0" normalizeH="0" baseline="0" noProof="0" dirty="0">
+              <a:ln>
+                <a:noFill/>
+              </a:ln>
+              <a:solidFill>
+                <a:srgbClr val="FFFFFF"/>
+              </a:solidFill>
+              <a:effectLst/>
+              <a:uLnTx/>
+              <a:uFillTx/>
+              <a:latin typeface="Calibri" panose="020F0502020204030204"/>
+              <a:ea typeface="+mn-ea"/>
+              <a:cs typeface="+mn-cs"/>
+            </a:endParaRPr>
+          </a:p>
+          <a:p>
+            <a:pPr marL="0" marR="0" lvl="0" indent="0" algn="ctr" defTabSz="914400" eaLnBrk="1" fontAlgn="auto" latinLnBrk="0" hangingPunct="1">
+              <a:lnSpc>
+                <a:spcPct val="100000"/>
+              </a:lnSpc>
+              <a:spcBef>
+                <a:spcPts val="0"/>
+              </a:spcBef>
+              <a:spcAft>
+                <a:spcPts val="0"/>
+              </a:spcAft>
+              <a:buClrTx/>
+              <a:buSzTx/>
+              <a:buFontTx/>
+              <a:buNone/>
+              <a:tabLst/>
+              <a:defRPr/>
+            </a:pPr>
+            <a:endParaRPr kumimoji="0" lang="en-US" sz="1800" b="0" i="0" u="none" strike="noStrike" kern="0" cap="none" spc="0" normalizeH="0" baseline="0" noProof="0" dirty="0">
+              <a:ln>
+                <a:noFill/>
+              </a:ln>
+              <a:solidFill>
+                <a:srgbClr val="FFFFFF"/>
+              </a:solidFill>
+              <a:effectLst/>
+              <a:uLnTx/>
+              <a:uFillTx/>
+              <a:latin typeface="Calibri" panose="020F0502020204030204"/>
+              <a:ea typeface="+mn-ea"/>
+              <a:cs typeface="+mn-cs"/>
+            </a:endParaRPr>
+          </a:p>
+          <a:p>
+            <a:pPr marL="0" marR="0" lvl="0" indent="0" algn="ctr" defTabSz="914400" eaLnBrk="1" fontAlgn="auto" latinLnBrk="0" hangingPunct="1">
+              <a:lnSpc>
+                <a:spcPct val="100000"/>
+              </a:lnSpc>
+              <a:spcBef>
+                <a:spcPts val="0"/>
+              </a:spcBef>
+              <a:spcAft>
+                <a:spcPts val="0"/>
+              </a:spcAft>
+              <a:buClrTx/>
+              <a:buSzTx/>
+              <a:buFontTx/>
+              <a:buNone/>
+              <a:tabLst/>
+              <a:defRPr/>
+            </a:pPr>
+            <a:endParaRPr kumimoji="0" lang="en-US" sz="1800" b="0" i="0" u="none" strike="noStrike" kern="0" cap="none" spc="0" normalizeH="0" baseline="0" noProof="0" dirty="0">
+              <a:ln>
+                <a:noFill/>
+              </a:ln>
+              <a:solidFill>
+                <a:srgbClr val="FFFFFF"/>
+              </a:solidFill>
+              <a:effectLst/>
+              <a:uLnTx/>
+              <a:uFillTx/>
+              <a:latin typeface="Calibri" panose="020F0502020204030204"/>
+              <a:ea typeface="+mn-ea"/>
+              <a:cs typeface="+mn-cs"/>
+            </a:endParaRPr>
+          </a:p>
+          <a:p>
+            <a:pPr marL="0" marR="0" lvl="0" indent="0" algn="ctr" defTabSz="914400" eaLnBrk="1" fontAlgn="auto" latinLnBrk="0" hangingPunct="1">
+              <a:lnSpc>
+                <a:spcPct val="100000"/>
+              </a:lnSpc>
+              <a:spcBef>
+                <a:spcPts val="0"/>
+              </a:spcBef>
+              <a:spcAft>
+                <a:spcPts val="0"/>
+              </a:spcAft>
+              <a:buClrTx/>
+              <a:buSzTx/>
+              <a:buFontTx/>
+              <a:buNone/>
+              <a:tabLst/>
+              <a:defRPr/>
+            </a:pPr>
+            <a:endParaRPr kumimoji="0" lang="en-US" sz="1800" b="0" i="0" u="none" strike="noStrike" kern="0" cap="none" spc="0" normalizeH="0" baseline="0" noProof="0" dirty="0">
+              <a:ln>
+                <a:noFill/>
+              </a:ln>
+              <a:solidFill>
+                <a:srgbClr val="FFFFFF"/>
+              </a:solidFill>
+              <a:effectLst/>
+              <a:uLnTx/>
+              <a:uFillTx/>
+              <a:latin typeface="Calibri" panose="020F0502020204030204"/>
+              <a:ea typeface="+mn-ea"/>
+              <a:cs typeface="+mn-cs"/>
+            </a:endParaRPr>
+          </a:p>
+          <a:p>
+            <a:pPr marL="0" marR="0" lvl="0" indent="0" algn="ctr" defTabSz="914400" eaLnBrk="1" fontAlgn="auto" latinLnBrk="0" hangingPunct="1">
+              <a:lnSpc>
+                <a:spcPct val="100000"/>
+              </a:lnSpc>
+              <a:spcBef>
+                <a:spcPts val="0"/>
+              </a:spcBef>
+              <a:spcAft>
+                <a:spcPts val="0"/>
+              </a:spcAft>
+              <a:buClrTx/>
+              <a:buSzTx/>
+              <a:buFontTx/>
+              <a:buNone/>
+              <a:tabLst/>
+              <a:defRPr/>
+            </a:pPr>
+            <a:endParaRPr kumimoji="0" lang="en-SE" sz="1800" b="0" i="0" u="none" strike="noStrike" kern="0" cap="none" spc="0" normalizeH="0" baseline="0" noProof="0" dirty="0">
+              <a:ln>
+                <a:noFill/>
+              </a:ln>
+              <a:solidFill>
+                <a:srgbClr val="FFFFFF"/>
+              </a:solidFill>
+              <a:effectLst/>
+              <a:uLnTx/>
+              <a:uFillTx/>
+              <a:latin typeface="Calibri" panose="020F0502020204030204"/>
+              <a:ea typeface="+mn-ea"/>
+              <a:cs typeface="+mn-cs"/>
+            </a:endParaRPr>
+          </a:p>
+        </p:txBody>
+      </p:sp>
+      <p:sp>
+        <p:nvSpPr>
+          <p:cNvPr id="21" name="Oval 20">
+            <a:extLst>
+              <a:ext uri="{FF2B5EF4-FFF2-40B4-BE49-F238E27FC236}">
+                <a16:creationId xmlns:a16="http://schemas.microsoft.com/office/drawing/2014/main" id="{FD85DED4-ACB1-AD71-BC81-242369AEEF88}"/>
+              </a:ext>
+            </a:extLst>
+          </p:cNvPr>
+          <p:cNvSpPr/>
+          <p:nvPr/>
+        </p:nvSpPr>
+        <p:spPr>
+          <a:xfrm>
+            <a:off x="5865693" y="3429000"/>
+            <a:ext cx="1511928" cy="1321806"/>
+          </a:xfrm>
+          <a:prstGeom prst="ellipse">
+            <a:avLst/>
+          </a:prstGeom>
+          <a:solidFill>
+            <a:srgbClr val="602651"/>
+          </a:solidFill>
+          <a:ln w="12700" cap="flat" cmpd="sng" algn="ctr">
+            <a:solidFill>
+              <a:srgbClr val="602651">
+                <a:shade val="15000"/>
+              </a:srgbClr>
+            </a:solidFill>
+            <a:prstDash val="solid"/>
+            <a:miter lim="800000"/>
+          </a:ln>
+          <a:effectLst/>
+        </p:spPr>
+        <p:txBody>
+          <a:bodyPr rtlCol="0" anchor="ctr"/>
+          <a:lstStyle/>
+          <a:p>
+            <a:pPr marL="0" marR="0" lvl="0" indent="0" algn="ctr" defTabSz="914400" eaLnBrk="1" fontAlgn="auto" latinLnBrk="0" hangingPunct="1">
+              <a:lnSpc>
+                <a:spcPct val="100000"/>
+              </a:lnSpc>
+              <a:spcBef>
+                <a:spcPts val="0"/>
+              </a:spcBef>
+              <a:spcAft>
+                <a:spcPts val="0"/>
+              </a:spcAft>
+              <a:buClrTx/>
+              <a:buSzTx/>
+              <a:buFontTx/>
+              <a:buNone/>
+              <a:tabLst/>
+              <a:defRPr/>
+            </a:pPr>
+            <a:r>
+              <a:rPr kumimoji="0" lang="en-US" sz="1200" b="0" i="0" u="none" strike="noStrike" kern="0" cap="none" spc="0" normalizeH="0" baseline="0" noProof="0" dirty="0">
+                <a:ln>
+                  <a:noFill/>
+                </a:ln>
+                <a:solidFill>
+                  <a:srgbClr val="FFFFFF"/>
+                </a:solidFill>
+                <a:effectLst/>
+                <a:uLnTx/>
+                <a:uFillTx/>
+                <a:latin typeface="Calibri" panose="020F0502020204030204"/>
+                <a:ea typeface="+mn-ea"/>
+                <a:cs typeface="+mn-cs"/>
+              </a:rPr>
+              <a:t>Maintenance org</a:t>
+            </a:r>
+            <a:endParaRPr kumimoji="0" lang="en-SE" sz="1200" b="0" i="0" u="none" strike="noStrike" kern="0" cap="none" spc="0" normalizeH="0" baseline="0" noProof="0" dirty="0">
+              <a:ln>
+                <a:noFill/>
+              </a:ln>
+              <a:solidFill>
+                <a:srgbClr val="FFFFFF"/>
+              </a:solidFill>
+              <a:effectLst/>
+              <a:uLnTx/>
+              <a:uFillTx/>
+              <a:latin typeface="Calibri" panose="020F0502020204030204"/>
+              <a:ea typeface="+mn-ea"/>
+              <a:cs typeface="+mn-cs"/>
+            </a:endParaRPr>
+          </a:p>
+        </p:txBody>
+      </p:sp>
+      <p:cxnSp>
+        <p:nvCxnSpPr>
+          <p:cNvPr id="22" name="Straight Arrow Connector 21">
+            <a:extLst>
+              <a:ext uri="{FF2B5EF4-FFF2-40B4-BE49-F238E27FC236}">
+                <a16:creationId xmlns:a16="http://schemas.microsoft.com/office/drawing/2014/main" id="{E98744B0-BCCC-FB65-B5E6-A56C6D762328}"/>
+              </a:ext>
+            </a:extLst>
+          </p:cNvPr>
+          <p:cNvCxnSpPr/>
+          <p:nvPr/>
+        </p:nvCxnSpPr>
+        <p:spPr>
+          <a:xfrm>
+            <a:off x="4734009" y="3721676"/>
+            <a:ext cx="986828" cy="0"/>
+          </a:xfrm>
+          <a:prstGeom prst="straightConnector1">
+            <a:avLst/>
+          </a:prstGeom>
+          <a:noFill/>
+          <a:ln w="57150" cap="flat" cmpd="sng" algn="ctr">
+            <a:solidFill>
+              <a:srgbClr val="602651"/>
+            </a:solidFill>
+            <a:prstDash val="solid"/>
+            <a:miter lim="800000"/>
+            <a:tailEnd type="triangle"/>
+          </a:ln>
+          <a:effectLst/>
+        </p:spPr>
+      </p:cxnSp>
+      <p:cxnSp>
+        <p:nvCxnSpPr>
+          <p:cNvPr id="23" name="Straight Arrow Connector 22">
+            <a:extLst>
+              <a:ext uri="{FF2B5EF4-FFF2-40B4-BE49-F238E27FC236}">
+                <a16:creationId xmlns:a16="http://schemas.microsoft.com/office/drawing/2014/main" id="{765839AA-20DD-ABAA-694A-080210B06ECD}"/>
+              </a:ext>
+            </a:extLst>
+          </p:cNvPr>
+          <p:cNvCxnSpPr/>
+          <p:nvPr/>
+        </p:nvCxnSpPr>
+        <p:spPr>
+          <a:xfrm>
+            <a:off x="4734009" y="4124406"/>
+            <a:ext cx="986828" cy="0"/>
+          </a:xfrm>
+          <a:prstGeom prst="straightConnector1">
+            <a:avLst/>
+          </a:prstGeom>
+          <a:noFill/>
+          <a:ln w="57150" cap="flat" cmpd="sng" algn="ctr">
+            <a:solidFill>
+              <a:srgbClr val="602651"/>
+            </a:solidFill>
+            <a:prstDash val="solid"/>
+            <a:miter lim="800000"/>
+            <a:tailEnd type="triangle"/>
+          </a:ln>
+          <a:effectLst/>
+        </p:spPr>
+      </p:cxnSp>
+      <p:cxnSp>
+        <p:nvCxnSpPr>
+          <p:cNvPr id="24" name="Straight Arrow Connector 23">
+            <a:extLst>
+              <a:ext uri="{FF2B5EF4-FFF2-40B4-BE49-F238E27FC236}">
+                <a16:creationId xmlns:a16="http://schemas.microsoft.com/office/drawing/2014/main" id="{24A4F852-B066-A3E0-BAFE-1F99A98F3A90}"/>
+              </a:ext>
+            </a:extLst>
+          </p:cNvPr>
+          <p:cNvCxnSpPr/>
+          <p:nvPr/>
+        </p:nvCxnSpPr>
+        <p:spPr>
+          <a:xfrm>
+            <a:off x="4734009" y="4536123"/>
+            <a:ext cx="986828" cy="0"/>
+          </a:xfrm>
+          <a:prstGeom prst="straightConnector1">
+            <a:avLst/>
+          </a:prstGeom>
+          <a:noFill/>
+          <a:ln w="57150" cap="flat" cmpd="sng" algn="ctr">
+            <a:solidFill>
+              <a:srgbClr val="602651"/>
+            </a:solidFill>
+            <a:prstDash val="solid"/>
+            <a:miter lim="800000"/>
+            <a:tailEnd type="triangle"/>
+          </a:ln>
+          <a:effectLst/>
+        </p:spPr>
+      </p:cxnSp>
+      <p:cxnSp>
+        <p:nvCxnSpPr>
+          <p:cNvPr id="25" name="Straight Arrow Connector 24">
+            <a:extLst>
+              <a:ext uri="{FF2B5EF4-FFF2-40B4-BE49-F238E27FC236}">
+                <a16:creationId xmlns:a16="http://schemas.microsoft.com/office/drawing/2014/main" id="{B62E26AA-BE62-E0A5-35DF-9705A2B88CDA}"/>
+              </a:ext>
+            </a:extLst>
+          </p:cNvPr>
+          <p:cNvCxnSpPr/>
+          <p:nvPr/>
+        </p:nvCxnSpPr>
+        <p:spPr>
+          <a:xfrm>
+            <a:off x="7602449" y="4141054"/>
+            <a:ext cx="986828" cy="0"/>
+          </a:xfrm>
+          <a:prstGeom prst="straightConnector1">
+            <a:avLst/>
+          </a:prstGeom>
+          <a:noFill/>
+          <a:ln w="57150" cap="flat" cmpd="sng" algn="ctr">
+            <a:solidFill>
+              <a:srgbClr val="602651"/>
+            </a:solidFill>
+            <a:prstDash val="solid"/>
+            <a:miter lim="800000"/>
+            <a:tailEnd type="triangle"/>
+          </a:ln>
+          <a:effectLst/>
+        </p:spPr>
+      </p:cxnSp>
+      <p:cxnSp>
+        <p:nvCxnSpPr>
+          <p:cNvPr id="26" name="Straight Arrow Connector 13">
+            <a:extLst>
+              <a:ext uri="{FF2B5EF4-FFF2-40B4-BE49-F238E27FC236}">
+                <a16:creationId xmlns:a16="http://schemas.microsoft.com/office/drawing/2014/main" id="{7EAFECAD-617E-728D-4EFB-0753DCA1E595}"/>
+              </a:ext>
+            </a:extLst>
+          </p:cNvPr>
+          <p:cNvCxnSpPr>
+            <a:cxnSpLocks/>
+            <a:endCxn id="34" idx="2"/>
+          </p:cNvCxnSpPr>
+          <p:nvPr/>
+        </p:nvCxnSpPr>
+        <p:spPr>
+          <a:xfrm flipV="1">
+            <a:off x="4734009" y="4435796"/>
+            <a:ext cx="5676151" cy="1355826"/>
+          </a:xfrm>
+          <a:prstGeom prst="bentConnector2">
+            <a:avLst/>
+          </a:prstGeom>
+          <a:noFill/>
+          <a:ln w="57150" cap="flat" cmpd="sng" algn="ctr">
+            <a:solidFill>
+              <a:srgbClr val="602651"/>
+            </a:solidFill>
+            <a:prstDash val="solid"/>
+            <a:miter lim="800000"/>
+            <a:tailEnd type="triangle"/>
+          </a:ln>
+          <a:effectLst/>
+        </p:spPr>
+      </p:cxnSp>
+      <p:sp>
+        <p:nvSpPr>
+          <p:cNvPr id="27" name="TextBox 26">
+            <a:extLst>
+              <a:ext uri="{FF2B5EF4-FFF2-40B4-BE49-F238E27FC236}">
+                <a16:creationId xmlns:a16="http://schemas.microsoft.com/office/drawing/2014/main" id="{030CE359-862B-0646-6203-4CC960B156A5}"/>
+              </a:ext>
+            </a:extLst>
+          </p:cNvPr>
+          <p:cNvSpPr txBox="1"/>
+          <p:nvPr/>
+        </p:nvSpPr>
+        <p:spPr>
+          <a:xfrm>
+            <a:off x="4870383" y="3361625"/>
+            <a:ext cx="683394" cy="369332"/>
+          </a:xfrm>
+          <a:prstGeom prst="rect">
+            <a:avLst/>
+          </a:prstGeom>
+          <a:noFill/>
+        </p:spPr>
+        <p:txBody>
+          <a:bodyPr wrap="square" rtlCol="0">
+            <a:spAutoFit/>
+          </a:bodyPr>
+          <a:lstStyle/>
+          <a:p>
+            <a:pPr marL="0" marR="0" lvl="0" indent="0" defTabSz="914400" eaLnBrk="1" fontAlgn="auto" latinLnBrk="0" hangingPunct="1">
+              <a:lnSpc>
+                <a:spcPct val="100000"/>
+              </a:lnSpc>
+              <a:spcBef>
+                <a:spcPts val="0"/>
+              </a:spcBef>
+              <a:spcAft>
+                <a:spcPts val="0"/>
+              </a:spcAft>
+              <a:buClrTx/>
+              <a:buSzTx/>
+              <a:buFontTx/>
+              <a:buNone/>
+              <a:tabLst/>
+              <a:defRPr/>
+            </a:pPr>
+            <a:r>
+              <a:rPr kumimoji="0" lang="en-US" sz="1800" b="0" i="0" u="none" strike="noStrike" kern="0" cap="none" spc="0" normalizeH="0" baseline="0" noProof="0" dirty="0">
+                <a:ln>
+                  <a:noFill/>
+                </a:ln>
+                <a:solidFill>
+                  <a:srgbClr val="163861"/>
+                </a:solidFill>
+                <a:effectLst/>
+                <a:uLnTx/>
+                <a:uFillTx/>
+              </a:rPr>
+              <a:t>POST</a:t>
+            </a:r>
+            <a:endParaRPr kumimoji="0" lang="en-SE" sz="1800" b="0" i="0" u="none" strike="noStrike" kern="0" cap="none" spc="0" normalizeH="0" baseline="0" noProof="0" dirty="0">
+              <a:ln>
+                <a:noFill/>
+              </a:ln>
+              <a:solidFill>
+                <a:srgbClr val="163861"/>
+              </a:solidFill>
+              <a:effectLst/>
+              <a:uLnTx/>
+              <a:uFillTx/>
+            </a:endParaRPr>
+          </a:p>
+        </p:txBody>
+      </p:sp>
+      <p:sp>
+        <p:nvSpPr>
+          <p:cNvPr id="28" name="TextBox 27">
+            <a:extLst>
+              <a:ext uri="{FF2B5EF4-FFF2-40B4-BE49-F238E27FC236}">
+                <a16:creationId xmlns:a16="http://schemas.microsoft.com/office/drawing/2014/main" id="{E34252CB-26AF-1382-E64D-3DD97B6D4138}"/>
+              </a:ext>
+            </a:extLst>
+          </p:cNvPr>
+          <p:cNvSpPr txBox="1"/>
+          <p:nvPr/>
+        </p:nvSpPr>
+        <p:spPr>
+          <a:xfrm>
+            <a:off x="7905883" y="5422290"/>
+            <a:ext cx="683394" cy="369332"/>
+          </a:xfrm>
+          <a:prstGeom prst="rect">
+            <a:avLst/>
+          </a:prstGeom>
+          <a:noFill/>
+        </p:spPr>
+        <p:txBody>
+          <a:bodyPr wrap="square" rtlCol="0">
+            <a:spAutoFit/>
+          </a:bodyPr>
+          <a:lstStyle/>
+          <a:p>
+            <a:pPr marL="0" marR="0" lvl="0" indent="0" defTabSz="914400" eaLnBrk="1" fontAlgn="auto" latinLnBrk="0" hangingPunct="1">
+              <a:lnSpc>
+                <a:spcPct val="100000"/>
+              </a:lnSpc>
+              <a:spcBef>
+                <a:spcPts val="0"/>
+              </a:spcBef>
+              <a:spcAft>
+                <a:spcPts val="0"/>
+              </a:spcAft>
+              <a:buClrTx/>
+              <a:buSzTx/>
+              <a:buFontTx/>
+              <a:buNone/>
+              <a:tabLst/>
+              <a:defRPr/>
+            </a:pPr>
+            <a:r>
+              <a:rPr kumimoji="0" lang="en-US" sz="1800" b="0" i="0" u="none" strike="noStrike" kern="0" cap="none" spc="0" normalizeH="0" baseline="0" noProof="0" dirty="0">
+                <a:ln>
+                  <a:noFill/>
+                </a:ln>
+                <a:solidFill>
+                  <a:srgbClr val="163861"/>
+                </a:solidFill>
+                <a:effectLst/>
+                <a:uLnTx/>
+                <a:uFillTx/>
+              </a:rPr>
+              <a:t>GET</a:t>
+            </a:r>
+            <a:endParaRPr kumimoji="0" lang="en-SE" sz="1800" b="0" i="0" u="none" strike="noStrike" kern="0" cap="none" spc="0" normalizeH="0" baseline="0" noProof="0" dirty="0">
+              <a:ln>
+                <a:noFill/>
+              </a:ln>
+              <a:solidFill>
+                <a:srgbClr val="163861"/>
+              </a:solidFill>
+              <a:effectLst/>
+              <a:uLnTx/>
+              <a:uFillTx/>
+            </a:endParaRPr>
+          </a:p>
+        </p:txBody>
+      </p:sp>
+      <p:sp>
+        <p:nvSpPr>
+          <p:cNvPr id="29" name="TextBox 28">
+            <a:extLst>
+              <a:ext uri="{FF2B5EF4-FFF2-40B4-BE49-F238E27FC236}">
+                <a16:creationId xmlns:a16="http://schemas.microsoft.com/office/drawing/2014/main" id="{E20A6CD7-17BD-5E89-43FE-60C3C3949BF7}"/>
+              </a:ext>
+            </a:extLst>
+          </p:cNvPr>
+          <p:cNvSpPr txBox="1"/>
+          <p:nvPr/>
+        </p:nvSpPr>
+        <p:spPr>
+          <a:xfrm>
+            <a:off x="4561040" y="3755265"/>
+            <a:ext cx="1425873" cy="369332"/>
+          </a:xfrm>
+          <a:prstGeom prst="rect">
+            <a:avLst/>
+          </a:prstGeom>
+          <a:noFill/>
+        </p:spPr>
+        <p:txBody>
+          <a:bodyPr wrap="square" rtlCol="0">
+            <a:spAutoFit/>
+          </a:bodyPr>
+          <a:lstStyle/>
+          <a:p>
+            <a:pPr marL="0" marR="0" lvl="0" indent="0" defTabSz="914400" eaLnBrk="1" fontAlgn="auto" latinLnBrk="0" hangingPunct="1">
+              <a:lnSpc>
+                <a:spcPct val="100000"/>
+              </a:lnSpc>
+              <a:spcBef>
+                <a:spcPts val="0"/>
+              </a:spcBef>
+              <a:spcAft>
+                <a:spcPts val="0"/>
+              </a:spcAft>
+              <a:buClrTx/>
+              <a:buSzTx/>
+              <a:buFontTx/>
+              <a:buNone/>
+              <a:tabLst/>
+              <a:defRPr/>
+            </a:pPr>
+            <a:r>
+              <a:rPr kumimoji="0" lang="en-US" sz="1800" b="0" i="0" u="none" strike="noStrike" kern="0" cap="none" spc="0" normalizeH="0" baseline="0" noProof="0" dirty="0">
+                <a:ln>
+                  <a:noFill/>
+                </a:ln>
+                <a:solidFill>
+                  <a:srgbClr val="163861"/>
+                </a:solidFill>
+                <a:effectLst/>
+                <a:uLnTx/>
+                <a:uFillTx/>
+              </a:rPr>
+              <a:t>GET - status</a:t>
+            </a:r>
+            <a:endParaRPr kumimoji="0" lang="en-SE" sz="1800" b="0" i="0" u="none" strike="noStrike" kern="0" cap="none" spc="0" normalizeH="0" baseline="0" noProof="0" dirty="0">
+              <a:ln>
+                <a:noFill/>
+              </a:ln>
+              <a:solidFill>
+                <a:srgbClr val="163861"/>
+              </a:solidFill>
+              <a:effectLst/>
+              <a:uLnTx/>
+              <a:uFillTx/>
+            </a:endParaRPr>
+          </a:p>
+        </p:txBody>
+      </p:sp>
+      <p:sp>
+        <p:nvSpPr>
+          <p:cNvPr id="30" name="TextBox 29">
+            <a:extLst>
+              <a:ext uri="{FF2B5EF4-FFF2-40B4-BE49-F238E27FC236}">
+                <a16:creationId xmlns:a16="http://schemas.microsoft.com/office/drawing/2014/main" id="{D3F11D45-B7FC-BA99-0192-C47C12D0419D}"/>
+              </a:ext>
+            </a:extLst>
+          </p:cNvPr>
+          <p:cNvSpPr txBox="1"/>
+          <p:nvPr/>
+        </p:nvSpPr>
+        <p:spPr>
+          <a:xfrm>
+            <a:off x="4549635" y="4165961"/>
+            <a:ext cx="1425873" cy="369332"/>
+          </a:xfrm>
+          <a:prstGeom prst="rect">
+            <a:avLst/>
+          </a:prstGeom>
+          <a:noFill/>
+        </p:spPr>
+        <p:txBody>
+          <a:bodyPr wrap="square" rtlCol="0">
+            <a:spAutoFit/>
+          </a:bodyPr>
+          <a:lstStyle/>
+          <a:p>
+            <a:pPr marL="0" marR="0" lvl="0" indent="0" defTabSz="914400" eaLnBrk="1" fontAlgn="auto" latinLnBrk="0" hangingPunct="1">
+              <a:lnSpc>
+                <a:spcPct val="100000"/>
+              </a:lnSpc>
+              <a:spcBef>
+                <a:spcPts val="0"/>
+              </a:spcBef>
+              <a:spcAft>
+                <a:spcPts val="0"/>
+              </a:spcAft>
+              <a:buClrTx/>
+              <a:buSzTx/>
+              <a:buFontTx/>
+              <a:buNone/>
+              <a:tabLst/>
+              <a:defRPr/>
+            </a:pPr>
+            <a:r>
+              <a:rPr kumimoji="0" lang="en-US" sz="1800" b="0" i="0" u="none" strike="noStrike" kern="0" cap="none" spc="0" normalizeH="0" baseline="0" noProof="0" dirty="0">
+                <a:ln>
+                  <a:noFill/>
+                </a:ln>
+                <a:solidFill>
+                  <a:srgbClr val="163861"/>
+                </a:solidFill>
+                <a:effectLst/>
+                <a:uLnTx/>
+                <a:uFillTx/>
+              </a:rPr>
+              <a:t>GET - status</a:t>
+            </a:r>
+            <a:endParaRPr kumimoji="0" lang="en-SE" sz="1800" b="0" i="0" u="none" strike="noStrike" kern="0" cap="none" spc="0" normalizeH="0" baseline="0" noProof="0" dirty="0">
+              <a:ln>
+                <a:noFill/>
+              </a:ln>
+              <a:solidFill>
+                <a:srgbClr val="163861"/>
+              </a:solidFill>
+              <a:effectLst/>
+              <a:uLnTx/>
+              <a:uFillTx/>
+            </a:endParaRPr>
+          </a:p>
+        </p:txBody>
+      </p:sp>
+      <p:sp>
+        <p:nvSpPr>
+          <p:cNvPr id="31" name="Rectangle: Rounded Corners 30">
+            <a:extLst>
+              <a:ext uri="{FF2B5EF4-FFF2-40B4-BE49-F238E27FC236}">
+                <a16:creationId xmlns:a16="http://schemas.microsoft.com/office/drawing/2014/main" id="{13ED159F-760B-F430-63D9-8F43B0A368E6}"/>
+              </a:ext>
+            </a:extLst>
+          </p:cNvPr>
+          <p:cNvSpPr/>
+          <p:nvPr/>
+        </p:nvSpPr>
+        <p:spPr>
+          <a:xfrm>
+            <a:off x="1109591" y="3108177"/>
+            <a:ext cx="3172945" cy="622780"/>
+          </a:xfrm>
+          <a:prstGeom prst="roundRect">
+            <a:avLst/>
+          </a:prstGeom>
+          <a:solidFill>
+            <a:srgbClr val="602651"/>
+          </a:solidFill>
+          <a:ln w="12700" cap="flat" cmpd="sng" algn="ctr">
+            <a:solidFill>
+              <a:srgbClr val="602651">
+                <a:shade val="15000"/>
+              </a:srgbClr>
+            </a:solidFill>
+            <a:prstDash val="solid"/>
+            <a:miter lim="800000"/>
+          </a:ln>
+          <a:effectLst/>
+        </p:spPr>
+        <p:txBody>
+          <a:bodyPr rtlCol="0" anchor="ctr"/>
+          <a:lstStyle/>
+          <a:p>
+            <a:pPr marL="0" marR="0" lvl="0" indent="0" algn="ctr" defTabSz="914400" eaLnBrk="1" fontAlgn="auto" latinLnBrk="0" hangingPunct="1">
+              <a:lnSpc>
+                <a:spcPct val="100000"/>
+              </a:lnSpc>
+              <a:spcBef>
+                <a:spcPts val="0"/>
+              </a:spcBef>
+              <a:spcAft>
+                <a:spcPts val="0"/>
+              </a:spcAft>
+              <a:buClrTx/>
+              <a:buSzTx/>
+              <a:buFontTx/>
+              <a:buNone/>
+              <a:tabLst/>
+              <a:defRPr/>
+            </a:pPr>
+            <a:r>
+              <a:rPr kumimoji="0" lang="en-US" sz="1800" b="0" i="0" u="none" strike="noStrike" kern="0" cap="none" spc="0" normalizeH="0" baseline="0" noProof="0" dirty="0" err="1">
+                <a:ln>
+                  <a:noFill/>
+                </a:ln>
+                <a:solidFill>
+                  <a:srgbClr val="FFFFFF"/>
+                </a:solidFill>
+                <a:effectLst/>
+                <a:uLnTx/>
+                <a:uFillTx/>
+                <a:latin typeface="Calibri" panose="020F0502020204030204"/>
+                <a:ea typeface="+mn-ea"/>
+                <a:cs typeface="+mn-cs"/>
+              </a:rPr>
+              <a:t>MedicinalProductDefinition</a:t>
+            </a:r>
+            <a:endParaRPr kumimoji="0" lang="en-SE" sz="1800" b="0" i="0" u="none" strike="noStrike" kern="0" cap="none" spc="0" normalizeH="0" baseline="0" noProof="0" dirty="0">
+              <a:ln>
+                <a:noFill/>
+              </a:ln>
+              <a:solidFill>
+                <a:srgbClr val="FFFFFF"/>
+              </a:solidFill>
+              <a:effectLst/>
+              <a:uLnTx/>
+              <a:uFillTx/>
+              <a:latin typeface="Calibri" panose="020F0502020204030204"/>
+              <a:ea typeface="+mn-ea"/>
+              <a:cs typeface="+mn-cs"/>
+            </a:endParaRPr>
+          </a:p>
+        </p:txBody>
+      </p:sp>
+      <p:sp>
+        <p:nvSpPr>
+          <p:cNvPr id="32" name="Rectangle: Rounded Corners 31">
+            <a:extLst>
+              <a:ext uri="{FF2B5EF4-FFF2-40B4-BE49-F238E27FC236}">
+                <a16:creationId xmlns:a16="http://schemas.microsoft.com/office/drawing/2014/main" id="{7808AE25-E6E6-CCAD-17DC-5ADB03C28324}"/>
+              </a:ext>
+            </a:extLst>
+          </p:cNvPr>
+          <p:cNvSpPr/>
+          <p:nvPr/>
+        </p:nvSpPr>
+        <p:spPr>
+          <a:xfrm>
+            <a:off x="1020037" y="3876654"/>
+            <a:ext cx="3352054" cy="622780"/>
+          </a:xfrm>
+          <a:prstGeom prst="roundRect">
+            <a:avLst/>
+          </a:prstGeom>
+          <a:solidFill>
+            <a:srgbClr val="163861"/>
+          </a:solidFill>
+          <a:ln w="12700" cap="flat" cmpd="sng" algn="ctr">
+            <a:solidFill>
+              <a:srgbClr val="602651">
+                <a:shade val="15000"/>
+              </a:srgbClr>
+            </a:solidFill>
+            <a:prstDash val="solid"/>
+            <a:miter lim="800000"/>
+          </a:ln>
+          <a:effectLst/>
+        </p:spPr>
+        <p:txBody>
+          <a:bodyPr rtlCol="0" anchor="ctr"/>
+          <a:lstStyle/>
+          <a:p>
+            <a:pPr marL="0" marR="0" lvl="0" indent="0" algn="ctr" defTabSz="914400" eaLnBrk="1" fontAlgn="auto" latinLnBrk="0" hangingPunct="1">
+              <a:lnSpc>
+                <a:spcPct val="100000"/>
+              </a:lnSpc>
+              <a:spcBef>
+                <a:spcPts val="0"/>
+              </a:spcBef>
+              <a:spcAft>
+                <a:spcPts val="0"/>
+              </a:spcAft>
+              <a:buClrTx/>
+              <a:buSzTx/>
+              <a:buFontTx/>
+              <a:buNone/>
+              <a:tabLst/>
+              <a:defRPr/>
+            </a:pPr>
+            <a:r>
+              <a:rPr kumimoji="0" lang="en-US" sz="1800" b="0" i="0" u="none" strike="noStrike" kern="0" cap="none" spc="0" normalizeH="0" baseline="0" noProof="0" dirty="0" err="1">
+                <a:ln>
+                  <a:noFill/>
+                </a:ln>
+                <a:solidFill>
+                  <a:srgbClr val="FFFFFF"/>
+                </a:solidFill>
+                <a:effectLst/>
+                <a:uLnTx/>
+                <a:uFillTx/>
+                <a:latin typeface="Calibri" panose="020F0502020204030204"/>
+                <a:ea typeface="+mn-ea"/>
+                <a:cs typeface="+mn-cs"/>
+              </a:rPr>
+              <a:t>AdministrableProductDefinition</a:t>
+            </a:r>
+            <a:endParaRPr kumimoji="0" lang="en-US" sz="1800" b="0" i="0" u="none" strike="noStrike" kern="0" cap="none" spc="0" normalizeH="0" baseline="0" noProof="0" dirty="0">
+              <a:ln>
+                <a:noFill/>
+              </a:ln>
+              <a:solidFill>
+                <a:srgbClr val="FFFFFF"/>
+              </a:solidFill>
+              <a:effectLst/>
+              <a:uLnTx/>
+              <a:uFillTx/>
+              <a:latin typeface="Calibri" panose="020F0502020204030204"/>
+              <a:ea typeface="+mn-ea"/>
+              <a:cs typeface="+mn-cs"/>
+            </a:endParaRPr>
+          </a:p>
+          <a:p>
+            <a:pPr marL="0" marR="0" lvl="0" indent="0" algn="ctr" defTabSz="914400" eaLnBrk="1" fontAlgn="auto" latinLnBrk="0" hangingPunct="1">
+              <a:lnSpc>
+                <a:spcPct val="100000"/>
+              </a:lnSpc>
+              <a:spcBef>
+                <a:spcPts val="0"/>
+              </a:spcBef>
+              <a:spcAft>
+                <a:spcPts val="0"/>
+              </a:spcAft>
+              <a:buClrTx/>
+              <a:buSzTx/>
+              <a:buFontTx/>
+              <a:buNone/>
+              <a:tabLst/>
+              <a:defRPr/>
+            </a:pPr>
+            <a:r>
+              <a:rPr kumimoji="0" lang="en-US" sz="1800" b="0" i="0" u="none" strike="noStrike" kern="0" cap="none" spc="0" normalizeH="0" baseline="0" noProof="0" dirty="0">
+                <a:ln>
+                  <a:noFill/>
+                </a:ln>
+                <a:solidFill>
+                  <a:srgbClr val="FFFFFF"/>
+                </a:solidFill>
+                <a:effectLst/>
+                <a:uLnTx/>
+                <a:uFillTx/>
+                <a:latin typeface="Calibri" panose="020F0502020204030204"/>
+                <a:ea typeface="+mn-ea"/>
+                <a:cs typeface="+mn-cs"/>
+              </a:rPr>
+              <a:t>(Draft – no PhPID)</a:t>
+            </a:r>
+            <a:endParaRPr kumimoji="0" lang="en-SE" sz="1800" b="0" i="0" u="none" strike="noStrike" kern="0" cap="none" spc="0" normalizeH="0" baseline="0" noProof="0" dirty="0">
+              <a:ln>
+                <a:noFill/>
+              </a:ln>
+              <a:solidFill>
+                <a:srgbClr val="FFFFFF"/>
+              </a:solidFill>
+              <a:effectLst/>
+              <a:uLnTx/>
+              <a:uFillTx/>
+              <a:latin typeface="Calibri" panose="020F0502020204030204"/>
+              <a:ea typeface="+mn-ea"/>
+              <a:cs typeface="+mn-cs"/>
+            </a:endParaRPr>
+          </a:p>
+        </p:txBody>
+      </p:sp>
+      <p:sp>
+        <p:nvSpPr>
+          <p:cNvPr id="33" name="Rectangle: Rounded Corners 32">
+            <a:extLst>
+              <a:ext uri="{FF2B5EF4-FFF2-40B4-BE49-F238E27FC236}">
+                <a16:creationId xmlns:a16="http://schemas.microsoft.com/office/drawing/2014/main" id="{6B0B2C9B-0D5C-FB39-205D-A133E45E6804}"/>
+              </a:ext>
+            </a:extLst>
+          </p:cNvPr>
+          <p:cNvSpPr/>
+          <p:nvPr/>
+        </p:nvSpPr>
+        <p:spPr>
+          <a:xfrm>
+            <a:off x="1405416" y="4706604"/>
+            <a:ext cx="2227251" cy="622780"/>
+          </a:xfrm>
+          <a:prstGeom prst="roundRect">
+            <a:avLst/>
+          </a:prstGeom>
+          <a:gradFill rotWithShape="1">
+            <a:gsLst>
+              <a:gs pos="0">
+                <a:srgbClr val="77C5B1">
+                  <a:satMod val="103000"/>
+                  <a:lumMod val="102000"/>
+                  <a:tint val="94000"/>
+                </a:srgbClr>
+              </a:gs>
+              <a:gs pos="50000">
+                <a:srgbClr val="77C5B1">
+                  <a:satMod val="110000"/>
+                  <a:lumMod val="100000"/>
+                  <a:shade val="100000"/>
+                </a:srgbClr>
+              </a:gs>
+              <a:gs pos="100000">
+                <a:srgbClr val="77C5B1">
+                  <a:lumMod val="99000"/>
+                  <a:satMod val="120000"/>
+                  <a:shade val="78000"/>
+                </a:srgbClr>
+              </a:gs>
+            </a:gsLst>
+            <a:lin ang="5400000" scaled="0"/>
+          </a:gradFill>
+          <a:ln w="6350" cap="flat" cmpd="sng" algn="ctr">
+            <a:solidFill>
+              <a:srgbClr val="77C5B1"/>
+            </a:solidFill>
+            <a:prstDash val="solid"/>
+            <a:miter lim="800000"/>
+          </a:ln>
+          <a:effectLst/>
+        </p:spPr>
+        <p:txBody>
+          <a:bodyPr rtlCol="0" anchor="ctr"/>
+          <a:lstStyle/>
+          <a:p>
+            <a:pPr marL="0" marR="0" lvl="0" indent="0" algn="ctr" defTabSz="914400" eaLnBrk="1" fontAlgn="auto" latinLnBrk="0" hangingPunct="1">
+              <a:lnSpc>
+                <a:spcPct val="100000"/>
+              </a:lnSpc>
+              <a:spcBef>
+                <a:spcPts val="0"/>
+              </a:spcBef>
+              <a:spcAft>
+                <a:spcPts val="0"/>
+              </a:spcAft>
+              <a:buClrTx/>
+              <a:buSzTx/>
+              <a:buFontTx/>
+              <a:buNone/>
+              <a:tabLst/>
+              <a:defRPr/>
+            </a:pPr>
+            <a:r>
+              <a:rPr kumimoji="0" lang="en-US" sz="1800" b="0" i="0" u="none" strike="noStrike" kern="0" cap="none" spc="0" normalizeH="0" baseline="0" noProof="0" dirty="0">
+                <a:ln>
+                  <a:noFill/>
+                </a:ln>
+                <a:solidFill>
+                  <a:srgbClr val="FFFFFF"/>
+                </a:solidFill>
+                <a:effectLst/>
+                <a:uLnTx/>
+                <a:uFillTx/>
+                <a:latin typeface="Calibri" panose="020F0502020204030204"/>
+                <a:ea typeface="+mn-ea"/>
+                <a:cs typeface="+mn-cs"/>
+              </a:rPr>
+              <a:t>Ingredient</a:t>
+            </a:r>
+            <a:endParaRPr kumimoji="0" lang="en-SE" sz="1800" b="0" i="0" u="none" strike="noStrike" kern="0" cap="none" spc="0" normalizeH="0" baseline="0" noProof="0" dirty="0">
+              <a:ln>
+                <a:noFill/>
+              </a:ln>
+              <a:solidFill>
+                <a:srgbClr val="FFFFFF"/>
+              </a:solidFill>
+              <a:effectLst/>
+              <a:uLnTx/>
+              <a:uFillTx/>
+              <a:latin typeface="Calibri" panose="020F0502020204030204"/>
+              <a:ea typeface="+mn-ea"/>
+              <a:cs typeface="+mn-cs"/>
+            </a:endParaRPr>
+          </a:p>
+        </p:txBody>
+      </p:sp>
+      <p:sp>
+        <p:nvSpPr>
+          <p:cNvPr id="34" name="Rectangle: Rounded Corners 33">
+            <a:extLst>
+              <a:ext uri="{FF2B5EF4-FFF2-40B4-BE49-F238E27FC236}">
+                <a16:creationId xmlns:a16="http://schemas.microsoft.com/office/drawing/2014/main" id="{0631AF96-80D9-F329-C57F-B632E95E905A}"/>
+              </a:ext>
+            </a:extLst>
+          </p:cNvPr>
+          <p:cNvSpPr/>
+          <p:nvPr/>
+        </p:nvSpPr>
+        <p:spPr>
+          <a:xfrm>
+            <a:off x="8734133" y="3813016"/>
+            <a:ext cx="3352054" cy="622780"/>
+          </a:xfrm>
+          <a:prstGeom prst="roundRect">
+            <a:avLst/>
+          </a:prstGeom>
+          <a:solidFill>
+            <a:srgbClr val="163861"/>
+          </a:solidFill>
+          <a:ln w="12700" cap="flat" cmpd="sng" algn="ctr">
+            <a:solidFill>
+              <a:srgbClr val="602651">
+                <a:shade val="15000"/>
+              </a:srgbClr>
+            </a:solidFill>
+            <a:prstDash val="solid"/>
+            <a:miter lim="800000"/>
+          </a:ln>
+          <a:effectLst/>
+        </p:spPr>
+        <p:txBody>
+          <a:bodyPr rtlCol="0" anchor="ctr"/>
+          <a:lstStyle/>
+          <a:p>
+            <a:pPr marL="0" marR="0" lvl="0" indent="0" algn="ctr" defTabSz="914400" eaLnBrk="1" fontAlgn="auto" latinLnBrk="0" hangingPunct="1">
+              <a:lnSpc>
+                <a:spcPct val="100000"/>
+              </a:lnSpc>
+              <a:spcBef>
+                <a:spcPts val="0"/>
+              </a:spcBef>
+              <a:spcAft>
+                <a:spcPts val="0"/>
+              </a:spcAft>
+              <a:buClrTx/>
+              <a:buSzTx/>
+              <a:buFontTx/>
+              <a:buNone/>
+              <a:tabLst/>
+              <a:defRPr/>
+            </a:pPr>
+            <a:r>
+              <a:rPr kumimoji="0" lang="en-US" sz="1800" b="0" i="0" u="none" strike="noStrike" kern="0" cap="none" spc="0" normalizeH="0" baseline="0" noProof="0" dirty="0" err="1">
+                <a:ln>
+                  <a:noFill/>
+                </a:ln>
+                <a:solidFill>
+                  <a:srgbClr val="FFFFFF"/>
+                </a:solidFill>
+                <a:effectLst/>
+                <a:uLnTx/>
+                <a:uFillTx/>
+                <a:latin typeface="Calibri" panose="020F0502020204030204"/>
+                <a:ea typeface="+mn-ea"/>
+                <a:cs typeface="+mn-cs"/>
+              </a:rPr>
+              <a:t>AdministrableProductDefinition</a:t>
+            </a:r>
+            <a:endParaRPr kumimoji="0" lang="en-US" sz="1800" b="0" i="0" u="none" strike="noStrike" kern="0" cap="none" spc="0" normalizeH="0" baseline="0" noProof="0" dirty="0">
+              <a:ln>
+                <a:noFill/>
+              </a:ln>
+              <a:solidFill>
+                <a:srgbClr val="FFFFFF"/>
+              </a:solidFill>
+              <a:effectLst/>
+              <a:uLnTx/>
+              <a:uFillTx/>
+              <a:latin typeface="Calibri" panose="020F0502020204030204"/>
+              <a:ea typeface="+mn-ea"/>
+              <a:cs typeface="+mn-cs"/>
+            </a:endParaRPr>
+          </a:p>
+          <a:p>
+            <a:pPr marL="0" marR="0" lvl="0" indent="0" algn="ctr" defTabSz="914400" eaLnBrk="1" fontAlgn="auto" latinLnBrk="0" hangingPunct="1">
+              <a:lnSpc>
+                <a:spcPct val="100000"/>
+              </a:lnSpc>
+              <a:spcBef>
+                <a:spcPts val="0"/>
+              </a:spcBef>
+              <a:spcAft>
+                <a:spcPts val="0"/>
+              </a:spcAft>
+              <a:buClrTx/>
+              <a:buSzTx/>
+              <a:buFontTx/>
+              <a:buNone/>
+              <a:tabLst/>
+              <a:defRPr/>
+            </a:pPr>
+            <a:r>
+              <a:rPr kumimoji="0" lang="en-US" sz="1800" b="0" i="0" u="none" strike="noStrike" kern="0" cap="none" spc="0" normalizeH="0" baseline="0" noProof="0" dirty="0">
+                <a:ln>
+                  <a:noFill/>
+                </a:ln>
+                <a:solidFill>
+                  <a:srgbClr val="FFFFFF"/>
+                </a:solidFill>
+                <a:effectLst/>
+                <a:uLnTx/>
+                <a:uFillTx/>
+                <a:latin typeface="Calibri" panose="020F0502020204030204"/>
+                <a:ea typeface="+mn-ea"/>
+                <a:cs typeface="+mn-cs"/>
+              </a:rPr>
+              <a:t>(PhPID)</a:t>
+            </a:r>
+            <a:endParaRPr kumimoji="0" lang="en-SE" sz="1800" b="0" i="0" u="none" strike="noStrike" kern="0" cap="none" spc="0" normalizeH="0" baseline="0" noProof="0" dirty="0">
+              <a:ln>
+                <a:noFill/>
+              </a:ln>
+              <a:solidFill>
+                <a:srgbClr val="FFFFFF"/>
+              </a:solidFill>
+              <a:effectLst/>
+              <a:uLnTx/>
+              <a:uFillTx/>
+              <a:latin typeface="Calibri" panose="020F0502020204030204"/>
+              <a:ea typeface="+mn-ea"/>
+              <a:cs typeface="+mn-cs"/>
+            </a:endParaRPr>
+          </a:p>
+        </p:txBody>
+      </p:sp>
+      <p:sp>
+        <p:nvSpPr>
+          <p:cNvPr id="35" name="TextBox 34">
+            <a:extLst>
+              <a:ext uri="{FF2B5EF4-FFF2-40B4-BE49-F238E27FC236}">
+                <a16:creationId xmlns:a16="http://schemas.microsoft.com/office/drawing/2014/main" id="{3AF6F818-1278-64EB-0DEC-0B0F67E1219F}"/>
+              </a:ext>
+            </a:extLst>
+          </p:cNvPr>
+          <p:cNvSpPr txBox="1"/>
+          <p:nvPr/>
+        </p:nvSpPr>
+        <p:spPr>
+          <a:xfrm>
+            <a:off x="7602449" y="3714395"/>
+            <a:ext cx="899740" cy="369332"/>
+          </a:xfrm>
+          <a:prstGeom prst="rect">
+            <a:avLst/>
+          </a:prstGeom>
+          <a:noFill/>
+        </p:spPr>
+        <p:txBody>
+          <a:bodyPr wrap="square" rtlCol="0">
+            <a:spAutoFit/>
+          </a:bodyPr>
+          <a:lstStyle/>
+          <a:p>
+            <a:pPr marL="0" marR="0" lvl="0" indent="0" defTabSz="914400" eaLnBrk="1" fontAlgn="auto" latinLnBrk="0" hangingPunct="1">
+              <a:lnSpc>
+                <a:spcPct val="100000"/>
+              </a:lnSpc>
+              <a:spcBef>
+                <a:spcPts val="0"/>
+              </a:spcBef>
+              <a:spcAft>
+                <a:spcPts val="0"/>
+              </a:spcAft>
+              <a:buClrTx/>
+              <a:buSzTx/>
+              <a:buFontTx/>
+              <a:buNone/>
+              <a:tabLst/>
+              <a:defRPr/>
+            </a:pPr>
+            <a:r>
+              <a:rPr kumimoji="0" lang="en-US" sz="1800" b="0" i="0" u="none" strike="noStrike" kern="0" cap="none" spc="0" normalizeH="0" baseline="0" noProof="0" dirty="0">
+                <a:ln>
+                  <a:noFill/>
+                </a:ln>
+                <a:solidFill>
+                  <a:srgbClr val="163861"/>
+                </a:solidFill>
+                <a:effectLst/>
+                <a:uLnTx/>
+                <a:uFillTx/>
+              </a:rPr>
+              <a:t>Publish</a:t>
+            </a:r>
+            <a:endParaRPr kumimoji="0" lang="en-SE" sz="1800" b="0" i="0" u="none" strike="noStrike" kern="0" cap="none" spc="0" normalizeH="0" baseline="0" noProof="0" dirty="0">
+              <a:ln>
+                <a:noFill/>
+              </a:ln>
+              <a:solidFill>
+                <a:srgbClr val="163861"/>
+              </a:solidFill>
+              <a:effectLst/>
+              <a:uLnTx/>
+              <a:uFillTx/>
+            </a:endParaRPr>
+          </a:p>
+        </p:txBody>
+      </p:sp>
+    </p:spTree>
+    <p:extLst>
+      <p:ext uri="{BB962C8B-B14F-4D97-AF65-F5344CB8AC3E}">
+        <p14:creationId xmlns:p14="http://schemas.microsoft.com/office/powerpoint/2010/main" val="1387589740"/>
+      </p:ext>
+    </p:extLst>
+  </p:cSld>
+  <p:clrMapOvr>
+    <a:masterClrMapping/>
+  </p:clrMapOvr>
+  <p:timing>
+    <p:tnLst>
+      <p:par>
+        <p:cTn id="1" dur="indefinite" restart="never" nodeType="tmRoot">
+          <p:childTnLst>
+            <p:seq concurrent="1" nextAc="seek">
+              <p:cTn id="2" dur="indefinite" nodeType="mainSeq">
+                <p:childTnLst>
+                  <p:par>
+                    <p:cTn id="3" fill="hold">
+                      <p:stCondLst>
+                        <p:cond delay="indefinite"/>
+                      </p:stCondLst>
+                      <p:childTnLst>
+                        <p:par>
+                          <p:cTn id="4" fill="hold">
+                            <p:stCondLst>
+                              <p:cond delay="0"/>
+                            </p:stCondLst>
+                            <p:childTnLst>
+                              <p:par>
+                                <p:cTn id="5" presetID="1" presetClass="entr" presetSubtype="0" fill="hold" grpId="0" nodeType="clickEffect">
+                                  <p:stCondLst>
+                                    <p:cond delay="0"/>
+                                  </p:stCondLst>
+                                  <p:childTnLst>
+                                    <p:set>
+                                      <p:cBhvr>
+                                        <p:cTn id="6" dur="1" fill="hold">
+                                          <p:stCondLst>
+                                            <p:cond delay="0"/>
+                                          </p:stCondLst>
+                                        </p:cTn>
+                                        <p:tgtEl>
+                                          <p:spTgt spid="31"/>
+                                        </p:tgtEl>
+                                        <p:attrNameLst>
+                                          <p:attrName>style.visibility</p:attrName>
+                                        </p:attrNameLst>
+                                      </p:cBhvr>
+                                      <p:to>
+                                        <p:strVal val="visible"/>
+                                      </p:to>
+                                    </p:set>
+                                  </p:childTnLst>
+                                </p:cTn>
+                              </p:par>
+                              <p:par>
+                                <p:cTn id="7" presetID="1" presetClass="entr" presetSubtype="0" fill="hold" grpId="0" nodeType="withEffect">
+                                  <p:stCondLst>
+                                    <p:cond delay="0"/>
+                                  </p:stCondLst>
+                                  <p:childTnLst>
+                                    <p:set>
+                                      <p:cBhvr>
+                                        <p:cTn id="8" dur="1" fill="hold">
+                                          <p:stCondLst>
+                                            <p:cond delay="0"/>
+                                          </p:stCondLst>
+                                        </p:cTn>
+                                        <p:tgtEl>
+                                          <p:spTgt spid="32"/>
+                                        </p:tgtEl>
+                                        <p:attrNameLst>
+                                          <p:attrName>style.visibility</p:attrName>
+                                        </p:attrNameLst>
+                                      </p:cBhvr>
+                                      <p:to>
+                                        <p:strVal val="visible"/>
+                                      </p:to>
+                                    </p:set>
+                                  </p:childTnLst>
+                                </p:cTn>
+                              </p:par>
+                              <p:par>
+                                <p:cTn id="9" presetID="1" presetClass="entr" presetSubtype="0" fill="hold" grpId="0" nodeType="withEffect">
+                                  <p:stCondLst>
+                                    <p:cond delay="0"/>
+                                  </p:stCondLst>
+                                  <p:childTnLst>
+                                    <p:set>
+                                      <p:cBhvr>
+                                        <p:cTn id="10" dur="1" fill="hold">
+                                          <p:stCondLst>
+                                            <p:cond delay="0"/>
+                                          </p:stCondLst>
+                                        </p:cTn>
+                                        <p:tgtEl>
+                                          <p:spTgt spid="33"/>
+                                        </p:tgtEl>
+                                        <p:attrNameLst>
+                                          <p:attrName>style.visibility</p:attrName>
+                                        </p:attrNameLst>
+                                      </p:cBhvr>
+                                      <p:to>
+                                        <p:strVal val="visible"/>
+                                      </p:to>
+                                    </p:set>
+                                  </p:childTnLst>
+                                </p:cTn>
+                              </p:par>
+                            </p:childTnLst>
+                          </p:cTn>
+                        </p:par>
+                      </p:childTnLst>
+                    </p:cTn>
+                  </p:par>
+                  <p:par>
+                    <p:cTn id="11" fill="hold">
+                      <p:stCondLst>
+                        <p:cond delay="indefinite"/>
+                      </p:stCondLst>
+                      <p:childTnLst>
+                        <p:par>
+                          <p:cTn id="12" fill="hold">
+                            <p:stCondLst>
+                              <p:cond delay="0"/>
+                            </p:stCondLst>
+                            <p:childTnLst>
+                              <p:par>
+                                <p:cTn id="13" presetID="1" presetClass="entr" presetSubtype="0" fill="hold" grpId="0" nodeType="clickEffect">
+                                  <p:stCondLst>
+                                    <p:cond delay="0"/>
+                                  </p:stCondLst>
+                                  <p:childTnLst>
+                                    <p:set>
+                                      <p:cBhvr>
+                                        <p:cTn id="14" dur="1" fill="hold">
+                                          <p:stCondLst>
+                                            <p:cond delay="0"/>
+                                          </p:stCondLst>
+                                        </p:cTn>
+                                        <p:tgtEl>
+                                          <p:spTgt spid="20"/>
+                                        </p:tgtEl>
+                                        <p:attrNameLst>
+                                          <p:attrName>style.visibility</p:attrName>
+                                        </p:attrNameLst>
+                                      </p:cBhvr>
+                                      <p:to>
+                                        <p:strVal val="visible"/>
+                                      </p:to>
+                                    </p:set>
+                                  </p:childTnLst>
+                                </p:cTn>
+                              </p:par>
+                            </p:childTnLst>
+                          </p:cTn>
+                        </p:par>
+                      </p:childTnLst>
+                    </p:cTn>
+                  </p:par>
+                  <p:par>
+                    <p:cTn id="15" fill="hold">
+                      <p:stCondLst>
+                        <p:cond delay="indefinite"/>
+                      </p:stCondLst>
+                      <p:childTnLst>
+                        <p:par>
+                          <p:cTn id="16" fill="hold">
+                            <p:stCondLst>
+                              <p:cond delay="0"/>
+                            </p:stCondLst>
+                            <p:childTnLst>
+                              <p:par>
+                                <p:cTn id="17" presetID="1" presetClass="entr" presetSubtype="0" fill="hold" grpId="0" nodeType="clickEffect">
+                                  <p:stCondLst>
+                                    <p:cond delay="0"/>
+                                  </p:stCondLst>
+                                  <p:childTnLst>
+                                    <p:set>
+                                      <p:cBhvr>
+                                        <p:cTn id="18" dur="1" fill="hold">
+                                          <p:stCondLst>
+                                            <p:cond delay="0"/>
+                                          </p:stCondLst>
+                                        </p:cTn>
+                                        <p:tgtEl>
+                                          <p:spTgt spid="21"/>
+                                        </p:tgtEl>
+                                        <p:attrNameLst>
+                                          <p:attrName>style.visibility</p:attrName>
+                                        </p:attrNameLst>
+                                      </p:cBhvr>
+                                      <p:to>
+                                        <p:strVal val="visible"/>
+                                      </p:to>
+                                    </p:set>
+                                  </p:childTnLst>
+                                </p:cTn>
+                              </p:par>
+                              <p:par>
+                                <p:cTn id="19" presetID="1" presetClass="entr" presetSubtype="0" fill="hold" nodeType="withEffect">
+                                  <p:stCondLst>
+                                    <p:cond delay="0"/>
+                                  </p:stCondLst>
+                                  <p:childTnLst>
+                                    <p:set>
+                                      <p:cBhvr>
+                                        <p:cTn id="20" dur="1" fill="hold">
+                                          <p:stCondLst>
+                                            <p:cond delay="0"/>
+                                          </p:stCondLst>
+                                        </p:cTn>
+                                        <p:tgtEl>
+                                          <p:spTgt spid="22"/>
+                                        </p:tgtEl>
+                                        <p:attrNameLst>
+                                          <p:attrName>style.visibility</p:attrName>
+                                        </p:attrNameLst>
+                                      </p:cBhvr>
+                                      <p:to>
+                                        <p:strVal val="visible"/>
+                                      </p:to>
+                                    </p:set>
+                                  </p:childTnLst>
+                                </p:cTn>
+                              </p:par>
+                              <p:par>
+                                <p:cTn id="21" presetID="1" presetClass="entr" presetSubtype="0" fill="hold" nodeType="withEffect">
+                                  <p:stCondLst>
+                                    <p:cond delay="0"/>
+                                  </p:stCondLst>
+                                  <p:childTnLst>
+                                    <p:set>
+                                      <p:cBhvr>
+                                        <p:cTn id="22" dur="1" fill="hold">
+                                          <p:stCondLst>
+                                            <p:cond delay="0"/>
+                                          </p:stCondLst>
+                                        </p:cTn>
+                                        <p:tgtEl>
+                                          <p:spTgt spid="23"/>
+                                        </p:tgtEl>
+                                        <p:attrNameLst>
+                                          <p:attrName>style.visibility</p:attrName>
+                                        </p:attrNameLst>
+                                      </p:cBhvr>
+                                      <p:to>
+                                        <p:strVal val="visible"/>
+                                      </p:to>
+                                    </p:set>
+                                  </p:childTnLst>
+                                </p:cTn>
+                              </p:par>
+                              <p:par>
+                                <p:cTn id="23" presetID="1" presetClass="entr" presetSubtype="0" fill="hold" nodeType="withEffect">
+                                  <p:stCondLst>
+                                    <p:cond delay="0"/>
+                                  </p:stCondLst>
+                                  <p:childTnLst>
+                                    <p:set>
+                                      <p:cBhvr>
+                                        <p:cTn id="24" dur="1" fill="hold">
+                                          <p:stCondLst>
+                                            <p:cond delay="0"/>
+                                          </p:stCondLst>
+                                        </p:cTn>
+                                        <p:tgtEl>
+                                          <p:spTgt spid="24"/>
+                                        </p:tgtEl>
+                                        <p:attrNameLst>
+                                          <p:attrName>style.visibility</p:attrName>
+                                        </p:attrNameLst>
+                                      </p:cBhvr>
+                                      <p:to>
+                                        <p:strVal val="visible"/>
+                                      </p:to>
+                                    </p:set>
+                                  </p:childTnLst>
+                                </p:cTn>
+                              </p:par>
+                              <p:par>
+                                <p:cTn id="25" presetID="1" presetClass="entr" presetSubtype="0" fill="hold" grpId="0" nodeType="withEffect">
+                                  <p:stCondLst>
+                                    <p:cond delay="0"/>
+                                  </p:stCondLst>
+                                  <p:childTnLst>
+                                    <p:set>
+                                      <p:cBhvr>
+                                        <p:cTn id="26" dur="1" fill="hold">
+                                          <p:stCondLst>
+                                            <p:cond delay="0"/>
+                                          </p:stCondLst>
+                                        </p:cTn>
+                                        <p:tgtEl>
+                                          <p:spTgt spid="30"/>
+                                        </p:tgtEl>
+                                        <p:attrNameLst>
+                                          <p:attrName>style.visibility</p:attrName>
+                                        </p:attrNameLst>
+                                      </p:cBhvr>
+                                      <p:to>
+                                        <p:strVal val="visible"/>
+                                      </p:to>
+                                    </p:set>
+                                  </p:childTnLst>
+                                </p:cTn>
+                              </p:par>
+                              <p:par>
+                                <p:cTn id="27" presetID="1" presetClass="entr" presetSubtype="0" fill="hold" grpId="0" nodeType="withEffect">
+                                  <p:stCondLst>
+                                    <p:cond delay="0"/>
+                                  </p:stCondLst>
+                                  <p:childTnLst>
+                                    <p:set>
+                                      <p:cBhvr>
+                                        <p:cTn id="28" dur="1" fill="hold">
+                                          <p:stCondLst>
+                                            <p:cond delay="0"/>
+                                          </p:stCondLst>
+                                        </p:cTn>
+                                        <p:tgtEl>
+                                          <p:spTgt spid="29"/>
+                                        </p:tgtEl>
+                                        <p:attrNameLst>
+                                          <p:attrName>style.visibility</p:attrName>
+                                        </p:attrNameLst>
+                                      </p:cBhvr>
+                                      <p:to>
+                                        <p:strVal val="visible"/>
+                                      </p:to>
+                                    </p:set>
+                                  </p:childTnLst>
+                                </p:cTn>
+                              </p:par>
+                              <p:par>
+                                <p:cTn id="29" presetID="1" presetClass="entr" presetSubtype="0" fill="hold" grpId="0" nodeType="withEffect">
+                                  <p:stCondLst>
+                                    <p:cond delay="0"/>
+                                  </p:stCondLst>
+                                  <p:childTnLst>
+                                    <p:set>
+                                      <p:cBhvr>
+                                        <p:cTn id="30" dur="1" fill="hold">
+                                          <p:stCondLst>
+                                            <p:cond delay="0"/>
+                                          </p:stCondLst>
+                                        </p:cTn>
+                                        <p:tgtEl>
+                                          <p:spTgt spid="27"/>
+                                        </p:tgtEl>
+                                        <p:attrNameLst>
+                                          <p:attrName>style.visibility</p:attrName>
+                                        </p:attrNameLst>
+                                      </p:cBhvr>
+                                      <p:to>
+                                        <p:strVal val="visible"/>
+                                      </p:to>
+                                    </p:set>
+                                  </p:childTnLst>
+                                </p:cTn>
+                              </p:par>
+                            </p:childTnLst>
+                          </p:cTn>
+                        </p:par>
+                      </p:childTnLst>
+                    </p:cTn>
+                  </p:par>
+                  <p:par>
+                    <p:cTn id="31" fill="hold">
+                      <p:stCondLst>
+                        <p:cond delay="indefinite"/>
+                      </p:stCondLst>
+                      <p:childTnLst>
+                        <p:par>
+                          <p:cTn id="32" fill="hold">
+                            <p:stCondLst>
+                              <p:cond delay="0"/>
+                            </p:stCondLst>
+                            <p:childTnLst>
+                              <p:par>
+                                <p:cTn id="33" presetID="1" presetClass="entr" presetSubtype="0" fill="hold" nodeType="clickEffect">
+                                  <p:stCondLst>
+                                    <p:cond delay="0"/>
+                                  </p:stCondLst>
+                                  <p:childTnLst>
+                                    <p:set>
+                                      <p:cBhvr>
+                                        <p:cTn id="34" dur="1" fill="hold">
+                                          <p:stCondLst>
+                                            <p:cond delay="0"/>
+                                          </p:stCondLst>
+                                        </p:cTn>
+                                        <p:tgtEl>
+                                          <p:spTgt spid="25"/>
+                                        </p:tgtEl>
+                                        <p:attrNameLst>
+                                          <p:attrName>style.visibility</p:attrName>
+                                        </p:attrNameLst>
+                                      </p:cBhvr>
+                                      <p:to>
+                                        <p:strVal val="visible"/>
+                                      </p:to>
+                                    </p:set>
+                                  </p:childTnLst>
+                                </p:cTn>
+                              </p:par>
+                              <p:par>
+                                <p:cTn id="35" presetID="1" presetClass="entr" presetSubtype="0" fill="hold" grpId="0" nodeType="withEffect">
+                                  <p:stCondLst>
+                                    <p:cond delay="0"/>
+                                  </p:stCondLst>
+                                  <p:childTnLst>
+                                    <p:set>
+                                      <p:cBhvr>
+                                        <p:cTn id="36" dur="1" fill="hold">
+                                          <p:stCondLst>
+                                            <p:cond delay="0"/>
+                                          </p:stCondLst>
+                                        </p:cTn>
+                                        <p:tgtEl>
+                                          <p:spTgt spid="34"/>
+                                        </p:tgtEl>
+                                        <p:attrNameLst>
+                                          <p:attrName>style.visibility</p:attrName>
+                                        </p:attrNameLst>
+                                      </p:cBhvr>
+                                      <p:to>
+                                        <p:strVal val="visible"/>
+                                      </p:to>
+                                    </p:set>
+                                  </p:childTnLst>
+                                </p:cTn>
+                              </p:par>
+                              <p:par>
+                                <p:cTn id="37" presetID="1" presetClass="entr" presetSubtype="0" fill="hold" grpId="0" nodeType="withEffect">
+                                  <p:stCondLst>
+                                    <p:cond delay="0"/>
+                                  </p:stCondLst>
+                                  <p:childTnLst>
+                                    <p:set>
+                                      <p:cBhvr>
+                                        <p:cTn id="38" dur="1" fill="hold">
+                                          <p:stCondLst>
+                                            <p:cond delay="0"/>
+                                          </p:stCondLst>
+                                        </p:cTn>
+                                        <p:tgtEl>
+                                          <p:spTgt spid="35"/>
+                                        </p:tgtEl>
+                                        <p:attrNameLst>
+                                          <p:attrName>style.visibility</p:attrName>
+                                        </p:attrNameLst>
+                                      </p:cBhvr>
+                                      <p:to>
+                                        <p:strVal val="visible"/>
+                                      </p:to>
+                                    </p:set>
+                                  </p:childTnLst>
+                                </p:cTn>
+                              </p:par>
+                            </p:childTnLst>
+                          </p:cTn>
+                        </p:par>
+                      </p:childTnLst>
+                    </p:cTn>
+                  </p:par>
+                  <p:par>
+                    <p:cTn id="39" fill="hold">
+                      <p:stCondLst>
+                        <p:cond delay="indefinite"/>
+                      </p:stCondLst>
+                      <p:childTnLst>
+                        <p:par>
+                          <p:cTn id="40" fill="hold">
+                            <p:stCondLst>
+                              <p:cond delay="0"/>
+                            </p:stCondLst>
+                            <p:childTnLst>
+                              <p:par>
+                                <p:cTn id="41" presetID="1" presetClass="entr" presetSubtype="0" fill="hold" nodeType="clickEffect">
+                                  <p:stCondLst>
+                                    <p:cond delay="0"/>
+                                  </p:stCondLst>
+                                  <p:childTnLst>
+                                    <p:set>
+                                      <p:cBhvr>
+                                        <p:cTn id="42" dur="1" fill="hold">
+                                          <p:stCondLst>
+                                            <p:cond delay="0"/>
+                                          </p:stCondLst>
+                                        </p:cTn>
+                                        <p:tgtEl>
+                                          <p:spTgt spid="26"/>
+                                        </p:tgtEl>
+                                        <p:attrNameLst>
+                                          <p:attrName>style.visibility</p:attrName>
+                                        </p:attrNameLst>
+                                      </p:cBhvr>
+                                      <p:to>
+                                        <p:strVal val="visible"/>
+                                      </p:to>
+                                    </p:set>
+                                  </p:childTnLst>
+                                </p:cTn>
+                              </p:par>
+                              <p:par>
+                                <p:cTn id="43" presetID="1" presetClass="entr" presetSubtype="0" fill="hold" grpId="0" nodeType="withEffect">
+                                  <p:stCondLst>
+                                    <p:cond delay="0"/>
+                                  </p:stCondLst>
+                                  <p:childTnLst>
+                                    <p:set>
+                                      <p:cBhvr>
+                                        <p:cTn id="44" dur="1" fill="hold">
+                                          <p:stCondLst>
+                                            <p:cond delay="0"/>
+                                          </p:stCondLst>
+                                        </p:cTn>
+                                        <p:tgtEl>
+                                          <p:spTgt spid="28"/>
+                                        </p:tgtEl>
+                                        <p:attrNameLst>
+                                          <p:attrName>style.visibility</p:attrName>
+                                        </p:attrNameLst>
+                                      </p:cBhvr>
+                                      <p:to>
+                                        <p:strVal val="visible"/>
+                                      </p:to>
+                                    </p:set>
+                                  </p:childTnLst>
+                                </p:cTn>
+                              </p:par>
+                            </p:childTnLst>
+                          </p:cTn>
+                        </p:par>
+                      </p:childTnLst>
+                    </p:cTn>
+                  </p:par>
+                </p:childTnLst>
+              </p:cTn>
+              <p:prevCondLst>
+                <p:cond evt="onPrev" delay="0">
+                  <p:tgtEl>
+                    <p:sldTgt/>
+                  </p:tgtEl>
+                </p:cond>
+              </p:prevCondLst>
+              <p:nextCondLst>
+                <p:cond evt="onNext" delay="0">
+                  <p:tgtEl>
+                    <p:sldTgt/>
+                  </p:tgtEl>
+                </p:cond>
+              </p:nextCondLst>
+            </p:seq>
+          </p:childTnLst>
+        </p:cTn>
+      </p:par>
+    </p:tnLst>
+    <p:bldLst>
+      <p:bldP spid="20" grpId="0" animBg="1"/>
+      <p:bldP spid="21" grpId="0" animBg="1"/>
+      <p:bldP spid="27" grpId="0"/>
+      <p:bldP spid="28" grpId="0"/>
+      <p:bldP spid="29" grpId="0"/>
+      <p:bldP spid="30" grpId="0"/>
+      <p:bldP spid="31" grpId="0" animBg="1"/>
+      <p:bldP spid="32" grpId="0" animBg="1"/>
+      <p:bldP spid="33" grpId="0" animBg="1"/>
+      <p:bldP spid="34" grpId="0" animBg="1"/>
+      <p:bldP spid="35" grpId="0"/>
+    </p:bldLst>
+  </p:timing>
+</p:sld>
+</file>
+
 <file path=ppt/theme/theme1.xml><?xml version="1.0" encoding="utf-8"?>
 <a:theme xmlns:a="http://schemas.openxmlformats.org/drawingml/2006/main" name="Office Theme">
   <a:themeElements>

</xml_diff>

<commit_message>
Adding some more documentation
</commit_message>
<xml_diff>
--- a/ImplementationGuideImages.pptx
+++ b/ImplementationGuideImages.pptx
@@ -7,6 +7,7 @@
   <p:sldIdLst>
     <p:sldId id="256" r:id="rId2"/>
     <p:sldId id="257" r:id="rId3"/>
+    <p:sldId id="258" r:id="rId4"/>
   </p:sldIdLst>
   <p:sldSz cx="12192000" cy="6858000"/>
   <p:notesSz cx="6858000" cy="9144000"/>
@@ -6717,6 +6718,157 @@
 </p:sld>
 </file>
 
+<file path=ppt/slides/slide3.xml><?xml version="1.0" encoding="utf-8"?>
+<p:sld xmlns:a="http://schemas.openxmlformats.org/drawingml/2006/main" xmlns:r="http://schemas.openxmlformats.org/officeDocument/2006/relationships" xmlns:p="http://schemas.openxmlformats.org/presentationml/2006/main">
+  <p:cSld>
+    <p:spTree>
+      <p:nvGrpSpPr>
+        <p:cNvPr id="1" name=""/>
+        <p:cNvGrpSpPr/>
+        <p:nvPr/>
+      </p:nvGrpSpPr>
+      <p:grpSpPr>
+        <a:xfrm>
+          <a:off x="0" y="0"/>
+          <a:ext cx="0" cy="0"/>
+          <a:chOff x="0" y="0"/>
+          <a:chExt cx="0" cy="0"/>
+        </a:xfrm>
+      </p:grpSpPr>
+      <p:sp>
+        <p:nvSpPr>
+          <p:cNvPr id="2" name="Title 1">
+            <a:extLst>
+              <a:ext uri="{FF2B5EF4-FFF2-40B4-BE49-F238E27FC236}">
+                <a16:creationId xmlns:a16="http://schemas.microsoft.com/office/drawing/2014/main" id="{BB772126-2B51-0973-C3DB-BAB2D47B954C}"/>
+              </a:ext>
+            </a:extLst>
+          </p:cNvPr>
+          <p:cNvSpPr txBox="1">
+            <a:spLocks/>
+          </p:cNvSpPr>
+          <p:nvPr/>
+        </p:nvSpPr>
+        <p:spPr>
+          <a:xfrm>
+            <a:off x="596393" y="462292"/>
+            <a:ext cx="4519304" cy="1325563"/>
+          </a:xfrm>
+          <a:prstGeom prst="rect">
+            <a:avLst/>
+          </a:prstGeom>
+        </p:spPr>
+        <p:txBody>
+          <a:bodyPr>
+            <a:normAutofit fontScale="97500"/>
+          </a:bodyPr>
+          <a:lstStyle>
+            <a:lvl1pPr algn="l" defTabSz="914400" rtl="0" eaLnBrk="1" latinLnBrk="0" hangingPunct="1">
+              <a:lnSpc>
+                <a:spcPct val="90000"/>
+              </a:lnSpc>
+              <a:spcBef>
+                <a:spcPct val="0"/>
+              </a:spcBef>
+              <a:buNone/>
+              <a:defRPr sz="4400" kern="1200">
+                <a:solidFill>
+                  <a:schemeClr val="tx1"/>
+                </a:solidFill>
+                <a:latin typeface="+mj-lt"/>
+                <a:ea typeface="+mj-ea"/>
+                <a:cs typeface="+mj-cs"/>
+              </a:defRPr>
+            </a:lvl1pPr>
+          </a:lstStyle>
+          <a:p>
+            <a:pPr algn="ctr"/>
+            <a:r>
+              <a:rPr lang="en-US" dirty="0">
+                <a:ea typeface="Source Sans Pro"/>
+                <a:cs typeface="Calibri"/>
+              </a:rPr>
+              <a:t>Global PhPID and Substance ID (GSID)</a:t>
+            </a:r>
+            <a:endParaRPr lang="en-US" dirty="0">
+              <a:ea typeface="Source Sans Pro"/>
+            </a:endParaRPr>
+          </a:p>
+        </p:txBody>
+      </p:sp>
+      <p:pic>
+        <p:nvPicPr>
+          <p:cNvPr id="3" name="Content Placeholder 5">
+            <a:extLst>
+              <a:ext uri="{FF2B5EF4-FFF2-40B4-BE49-F238E27FC236}">
+                <a16:creationId xmlns:a16="http://schemas.microsoft.com/office/drawing/2014/main" id="{C685FCBD-6BF0-9B7B-56D7-485559A3AC25}"/>
+              </a:ext>
+            </a:extLst>
+          </p:cNvPr>
+          <p:cNvPicPr>
+            <a:picLocks noChangeAspect="1"/>
+          </p:cNvPicPr>
+          <p:nvPr/>
+        </p:nvPicPr>
+        <p:blipFill>
+          <a:blip r:embed="rId2"/>
+          <a:stretch>
+            <a:fillRect/>
+          </a:stretch>
+        </p:blipFill>
+        <p:spPr>
+          <a:xfrm>
+            <a:off x="4974153" y="164589"/>
+            <a:ext cx="6379646" cy="6398014"/>
+          </a:xfrm>
+          <a:prstGeom prst="rect">
+            <a:avLst/>
+          </a:prstGeom>
+        </p:spPr>
+      </p:pic>
+      <p:pic>
+        <p:nvPicPr>
+          <p:cNvPr id="4" name="Picture 3">
+            <a:extLst>
+              <a:ext uri="{FF2B5EF4-FFF2-40B4-BE49-F238E27FC236}">
+                <a16:creationId xmlns:a16="http://schemas.microsoft.com/office/drawing/2014/main" id="{524984F8-040F-CFEE-ADB6-EE344F9A9AB8}"/>
+              </a:ext>
+            </a:extLst>
+          </p:cNvPr>
+          <p:cNvPicPr>
+            <a:picLocks noChangeAspect="1"/>
+          </p:cNvPicPr>
+          <p:nvPr/>
+        </p:nvPicPr>
+        <p:blipFill>
+          <a:blip r:embed="rId3"/>
+          <a:stretch>
+            <a:fillRect/>
+          </a:stretch>
+        </p:blipFill>
+        <p:spPr>
+          <a:xfrm>
+            <a:off x="596393" y="1787855"/>
+            <a:ext cx="4207619" cy="3989786"/>
+          </a:xfrm>
+          <a:prstGeom prst="rect">
+            <a:avLst/>
+          </a:prstGeom>
+        </p:spPr>
+      </p:pic>
+    </p:spTree>
+    <p:extLst>
+      <p:ext uri="{BB962C8B-B14F-4D97-AF65-F5344CB8AC3E}">
+        <p14:creationId xmlns:p14="http://schemas.microsoft.com/office/powerpoint/2010/main" val="2798728492"/>
+      </p:ext>
+    </p:extLst>
+  </p:cSld>
+  <p:clrMapOvr>
+    <a:masterClrMapping/>
+  </p:clrMapOvr>
+</p:sld>
+</file>
+
 <file path=ppt/theme/theme1.xml><?xml version="1.0" encoding="utf-8"?>
 <a:theme xmlns:a="http://schemas.openxmlformats.org/drawingml/2006/main" name="Office Theme">
   <a:themeElements>

</xml_diff>

<commit_message>
Updated image on PhPID WF
</commit_message>
<xml_diff>
--- a/ImplementationGuideImages.pptx
+++ b/ImplementationGuideImages.pptx
@@ -263,7 +263,7 @@
           <a:p>
             <a:fld id="{6B5A8AD0-4133-444B-956D-B3352209FA33}" type="datetimeFigureOut">
               <a:rPr lang="en-SE" smtClean="0"/>
-              <a:t>2023-10-02</a:t>
+              <a:t>2024-01-10</a:t>
             </a:fld>
             <a:endParaRPr lang="en-SE"/>
           </a:p>
@@ -463,7 +463,7 @@
           <a:p>
             <a:fld id="{6B5A8AD0-4133-444B-956D-B3352209FA33}" type="datetimeFigureOut">
               <a:rPr lang="en-SE" smtClean="0"/>
-              <a:t>2023-10-02</a:t>
+              <a:t>2024-01-10</a:t>
             </a:fld>
             <a:endParaRPr lang="en-SE"/>
           </a:p>
@@ -673,7 +673,7 @@
           <a:p>
             <a:fld id="{6B5A8AD0-4133-444B-956D-B3352209FA33}" type="datetimeFigureOut">
               <a:rPr lang="en-SE" smtClean="0"/>
-              <a:t>2023-10-02</a:t>
+              <a:t>2024-01-10</a:t>
             </a:fld>
             <a:endParaRPr lang="en-SE"/>
           </a:p>
@@ -873,7 +873,7 @@
           <a:p>
             <a:fld id="{6B5A8AD0-4133-444B-956D-B3352209FA33}" type="datetimeFigureOut">
               <a:rPr lang="en-SE" smtClean="0"/>
-              <a:t>2023-10-02</a:t>
+              <a:t>2024-01-10</a:t>
             </a:fld>
             <a:endParaRPr lang="en-SE"/>
           </a:p>
@@ -1149,7 +1149,7 @@
           <a:p>
             <a:fld id="{6B5A8AD0-4133-444B-956D-B3352209FA33}" type="datetimeFigureOut">
               <a:rPr lang="en-SE" smtClean="0"/>
-              <a:t>2023-10-02</a:t>
+              <a:t>2024-01-10</a:t>
             </a:fld>
             <a:endParaRPr lang="en-SE"/>
           </a:p>
@@ -1417,7 +1417,7 @@
           <a:p>
             <a:fld id="{6B5A8AD0-4133-444B-956D-B3352209FA33}" type="datetimeFigureOut">
               <a:rPr lang="en-SE" smtClean="0"/>
-              <a:t>2023-10-02</a:t>
+              <a:t>2024-01-10</a:t>
             </a:fld>
             <a:endParaRPr lang="en-SE"/>
           </a:p>
@@ -1832,7 +1832,7 @@
           <a:p>
             <a:fld id="{6B5A8AD0-4133-444B-956D-B3352209FA33}" type="datetimeFigureOut">
               <a:rPr lang="en-SE" smtClean="0"/>
-              <a:t>2023-10-02</a:t>
+              <a:t>2024-01-10</a:t>
             </a:fld>
             <a:endParaRPr lang="en-SE"/>
           </a:p>
@@ -1974,7 +1974,7 @@
           <a:p>
             <a:fld id="{6B5A8AD0-4133-444B-956D-B3352209FA33}" type="datetimeFigureOut">
               <a:rPr lang="en-SE" smtClean="0"/>
-              <a:t>2023-10-02</a:t>
+              <a:t>2024-01-10</a:t>
             </a:fld>
             <a:endParaRPr lang="en-SE"/>
           </a:p>
@@ -2087,7 +2087,7 @@
           <a:p>
             <a:fld id="{6B5A8AD0-4133-444B-956D-B3352209FA33}" type="datetimeFigureOut">
               <a:rPr lang="en-SE" smtClean="0"/>
-              <a:t>2023-10-02</a:t>
+              <a:t>2024-01-10</a:t>
             </a:fld>
             <a:endParaRPr lang="en-SE"/>
           </a:p>
@@ -2400,7 +2400,7 @@
           <a:p>
             <a:fld id="{6B5A8AD0-4133-444B-956D-B3352209FA33}" type="datetimeFigureOut">
               <a:rPr lang="en-SE" smtClean="0"/>
-              <a:t>2023-10-02</a:t>
+              <a:t>2024-01-10</a:t>
             </a:fld>
             <a:endParaRPr lang="en-SE"/>
           </a:p>
@@ -2689,7 +2689,7 @@
           <a:p>
             <a:fld id="{6B5A8AD0-4133-444B-956D-B3352209FA33}" type="datetimeFigureOut">
               <a:rPr lang="en-SE" smtClean="0"/>
-              <a:t>2023-10-02</a:t>
+              <a:t>2024-01-10</a:t>
             </a:fld>
             <a:endParaRPr lang="en-SE"/>
           </a:p>
@@ -2932,7 +2932,7 @@
           <a:p>
             <a:fld id="{6B5A8AD0-4133-444B-956D-B3352209FA33}" type="datetimeFigureOut">
               <a:rPr lang="en-SE" smtClean="0"/>
-              <a:t>2023-10-02</a:t>
+              <a:t>2024-01-10</a:t>
             </a:fld>
             <a:endParaRPr lang="en-SE"/>
           </a:p>
@@ -4721,8 +4721,8 @@
         </p:nvSpPr>
         <p:spPr>
           <a:xfrm>
-            <a:off x="882949" y="2303638"/>
-            <a:ext cx="3626232" cy="3272585"/>
+            <a:off x="882949" y="2916198"/>
+            <a:ext cx="3626232" cy="2660025"/>
           </a:xfrm>
           <a:prstGeom prst="roundRect">
             <a:avLst/>
@@ -4779,72 +4779,6 @@
               </a:rPr>
               <a:t>Task</a:t>
             </a:r>
-          </a:p>
-          <a:p>
-            <a:pPr marL="0" marR="0" lvl="0" indent="0" algn="ctr" defTabSz="914400" eaLnBrk="1" fontAlgn="auto" latinLnBrk="0" hangingPunct="1">
-              <a:lnSpc>
-                <a:spcPct val="100000"/>
-              </a:lnSpc>
-              <a:spcBef>
-                <a:spcPts val="0"/>
-              </a:spcBef>
-              <a:spcAft>
-                <a:spcPts val="0"/>
-              </a:spcAft>
-              <a:buClrTx/>
-              <a:buSzTx/>
-              <a:buFontTx/>
-              <a:buNone/>
-              <a:tabLst/>
-              <a:defRPr/>
-            </a:pPr>
-            <a:endParaRPr kumimoji="0" lang="en-US" sz="1800" b="0" i="0" u="none" strike="noStrike" kern="0" cap="none" spc="0" normalizeH="0" baseline="0" noProof="0" dirty="0">
-              <a:ln>
-                <a:noFill/>
-              </a:ln>
-              <a:solidFill>
-                <a:srgbClr val="FFFFFF"/>
-              </a:solidFill>
-              <a:effectLst/>
-              <a:uLnTx/>
-              <a:uFillTx/>
-              <a:latin typeface="Calibri" panose="020F0502020204030204"/>
-              <a:ea typeface="+mn-ea"/>
-              <a:cs typeface="+mn-cs"/>
-            </a:endParaRPr>
-          </a:p>
-          <a:p>
-            <a:pPr marL="0" marR="0" lvl="0" indent="0" algn="ctr" defTabSz="914400" eaLnBrk="1" fontAlgn="auto" latinLnBrk="0" hangingPunct="1">
-              <a:lnSpc>
-                <a:spcPct val="100000"/>
-              </a:lnSpc>
-              <a:spcBef>
-                <a:spcPts val="0"/>
-              </a:spcBef>
-              <a:spcAft>
-                <a:spcPts val="0"/>
-              </a:spcAft>
-              <a:buClrTx/>
-              <a:buSzTx/>
-              <a:buFontTx/>
-              <a:buNone/>
-              <a:tabLst/>
-              <a:defRPr/>
-            </a:pPr>
-            <a:endParaRPr kumimoji="0" lang="en-US" sz="1800" b="0" i="0" u="none" strike="noStrike" kern="0" cap="none" spc="0" normalizeH="0" baseline="0" noProof="0" dirty="0">
-              <a:ln>
-                <a:noFill/>
-              </a:ln>
-              <a:solidFill>
-                <a:srgbClr val="FFFFFF"/>
-              </a:solidFill>
-              <a:effectLst/>
-              <a:uLnTx/>
-              <a:uFillTx/>
-              <a:latin typeface="Calibri" panose="020F0502020204030204"/>
-              <a:ea typeface="+mn-ea"/>
-              <a:cs typeface="+mn-cs"/>
-            </a:endParaRPr>
           </a:p>
           <a:p>
             <a:pPr marL="0" marR="0" lvl="0" indent="0" algn="ctr" defTabSz="914400" eaLnBrk="1" fontAlgn="auto" latinLnBrk="0" hangingPunct="1">
@@ -5604,7 +5538,7 @@
         </p:nvSpPr>
         <p:spPr>
           <a:xfrm>
-            <a:off x="1109591" y="3108177"/>
+            <a:off x="1109592" y="3836985"/>
             <a:ext cx="3172945" cy="622780"/>
           </a:xfrm>
           <a:prstGeom prst="roundRect">
@@ -5681,10 +5615,10 @@
       </p:sp>
       <p:sp>
         <p:nvSpPr>
-          <p:cNvPr id="32" name="Rectangle: Rounded Corners 31">
-            <a:extLst>
-              <a:ext uri="{FF2B5EF4-FFF2-40B4-BE49-F238E27FC236}">
-                <a16:creationId xmlns:a16="http://schemas.microsoft.com/office/drawing/2014/main" id="{7808AE25-E6E6-CCAD-17DC-5ADB03C28324}"/>
+          <p:cNvPr id="33" name="Rectangle: Rounded Corners 32">
+            <a:extLst>
+              <a:ext uri="{FF2B5EF4-FFF2-40B4-BE49-F238E27FC236}">
+                <a16:creationId xmlns:a16="http://schemas.microsoft.com/office/drawing/2014/main" id="{6B0B2C9B-0D5C-FB39-205D-A133E45E6804}"/>
               </a:ext>
             </a:extLst>
           </p:cNvPr>
@@ -5693,146 +5627,7 @@
         </p:nvSpPr>
         <p:spPr>
           <a:xfrm>
-            <a:off x="1020037" y="3876654"/>
-            <a:ext cx="3352054" cy="622780"/>
-          </a:xfrm>
-          <a:prstGeom prst="roundRect">
-            <a:avLst/>
-          </a:prstGeom>
-          <a:solidFill>
-            <a:srgbClr val="163861"/>
-          </a:solidFill>
-          <a:ln w="12700" cap="flat" cmpd="sng" algn="ctr">
-            <a:solidFill>
-              <a:srgbClr val="602651">
-                <a:shade val="15000"/>
-              </a:srgbClr>
-            </a:solidFill>
-            <a:prstDash val="solid"/>
-            <a:miter lim="800000"/>
-          </a:ln>
-          <a:effectLst/>
-        </p:spPr>
-        <p:txBody>
-          <a:bodyPr rtlCol="0" anchor="ctr"/>
-          <a:lstStyle/>
-          <a:p>
-            <a:pPr marL="0" marR="0" lvl="0" indent="0" algn="ctr" defTabSz="914400" eaLnBrk="1" fontAlgn="auto" latinLnBrk="0" hangingPunct="1">
-              <a:lnSpc>
-                <a:spcPct val="100000"/>
-              </a:lnSpc>
-              <a:spcBef>
-                <a:spcPts val="0"/>
-              </a:spcBef>
-              <a:spcAft>
-                <a:spcPts val="0"/>
-              </a:spcAft>
-              <a:buClrTx/>
-              <a:buSzTx/>
-              <a:buFontTx/>
-              <a:buNone/>
-              <a:tabLst/>
-              <a:defRPr/>
-            </a:pPr>
-            <a:r>
-              <a:rPr kumimoji="0" lang="en-US" sz="1800" b="0" i="0" u="none" strike="noStrike" kern="0" cap="none" spc="0" normalizeH="0" baseline="0" noProof="0" dirty="0" err="1">
-                <a:ln>
-                  <a:noFill/>
-                </a:ln>
-                <a:solidFill>
-                  <a:srgbClr val="FFFFFF"/>
-                </a:solidFill>
-                <a:effectLst/>
-                <a:uLnTx/>
-                <a:uFillTx/>
-                <a:latin typeface="Calibri" panose="020F0502020204030204"/>
-                <a:ea typeface="+mn-ea"/>
-                <a:cs typeface="+mn-cs"/>
-              </a:rPr>
-              <a:t>AdministrableProductDefinition</a:t>
-            </a:r>
-            <a:endParaRPr kumimoji="0" lang="en-US" sz="1800" b="0" i="0" u="none" strike="noStrike" kern="0" cap="none" spc="0" normalizeH="0" baseline="0" noProof="0" dirty="0">
-              <a:ln>
-                <a:noFill/>
-              </a:ln>
-              <a:solidFill>
-                <a:srgbClr val="FFFFFF"/>
-              </a:solidFill>
-              <a:effectLst/>
-              <a:uLnTx/>
-              <a:uFillTx/>
-              <a:latin typeface="Calibri" panose="020F0502020204030204"/>
-              <a:ea typeface="+mn-ea"/>
-              <a:cs typeface="+mn-cs"/>
-            </a:endParaRPr>
-          </a:p>
-          <a:p>
-            <a:pPr marL="0" marR="0" lvl="0" indent="0" algn="ctr" defTabSz="914400" eaLnBrk="1" fontAlgn="auto" latinLnBrk="0" hangingPunct="1">
-              <a:lnSpc>
-                <a:spcPct val="100000"/>
-              </a:lnSpc>
-              <a:spcBef>
-                <a:spcPts val="0"/>
-              </a:spcBef>
-              <a:spcAft>
-                <a:spcPts val="0"/>
-              </a:spcAft>
-              <a:buClrTx/>
-              <a:buSzTx/>
-              <a:buFontTx/>
-              <a:buNone/>
-              <a:tabLst/>
-              <a:defRPr/>
-            </a:pPr>
-            <a:r>
-              <a:rPr kumimoji="0" lang="en-US" sz="1800" b="0" i="0" u="none" strike="noStrike" kern="0" cap="none" spc="0" normalizeH="0" baseline="0" noProof="0" dirty="0">
-                <a:ln>
-                  <a:noFill/>
-                </a:ln>
-                <a:solidFill>
-                  <a:srgbClr val="FFFFFF"/>
-                </a:solidFill>
-                <a:effectLst/>
-                <a:uLnTx/>
-                <a:uFillTx/>
-                <a:latin typeface="Calibri" panose="020F0502020204030204"/>
-                <a:ea typeface="+mn-ea"/>
-                <a:cs typeface="+mn-cs"/>
-              </a:rPr>
-              <a:t>(Draft – no PhPID)</a:t>
-            </a:r>
-            <a:endParaRPr kumimoji="0" lang="en-SE" sz="1800" b="0" i="0" u="none" strike="noStrike" kern="0" cap="none" spc="0" normalizeH="0" baseline="0" noProof="0" dirty="0">
-              <a:ln>
-                <a:noFill/>
-              </a:ln>
-              <a:solidFill>
-                <a:srgbClr val="FFFFFF"/>
-              </a:solidFill>
-              <a:effectLst/>
-              <a:uLnTx/>
-              <a:uFillTx/>
-              <a:latin typeface="Calibri" panose="020F0502020204030204"/>
-              <a:ea typeface="+mn-ea"/>
-              <a:cs typeface="+mn-cs"/>
-            </a:endParaRPr>
-          </a:p>
-        </p:txBody>
-      </p:sp>
-      <p:sp>
-        <p:nvSpPr>
-          <p:cNvPr id="33" name="Rectangle: Rounded Corners 32">
-            <a:extLst>
-              <a:ext uri="{FF2B5EF4-FFF2-40B4-BE49-F238E27FC236}">
-                <a16:creationId xmlns:a16="http://schemas.microsoft.com/office/drawing/2014/main" id="{6B0B2C9B-0D5C-FB39-205D-A133E45E6804}"/>
-              </a:ext>
-            </a:extLst>
-          </p:cNvPr>
-          <p:cNvSpPr/>
-          <p:nvPr/>
-        </p:nvSpPr>
-        <p:spPr>
-          <a:xfrm>
-            <a:off x="1405416" y="4706604"/>
+            <a:off x="1582438" y="4615988"/>
             <a:ext cx="2227251" cy="622780"/>
           </a:xfrm>
           <a:prstGeom prst="roundRect">
@@ -6137,6 +5932,294 @@
               <a:uLnTx/>
               <a:uFillTx/>
             </a:endParaRPr>
+          </a:p>
+        </p:txBody>
+      </p:sp>
+      <p:sp>
+        <p:nvSpPr>
+          <p:cNvPr id="2" name="Oval 1">
+            <a:extLst>
+              <a:ext uri="{FF2B5EF4-FFF2-40B4-BE49-F238E27FC236}">
+                <a16:creationId xmlns:a16="http://schemas.microsoft.com/office/drawing/2014/main" id="{833FAF6A-9DC3-0655-8427-FF42F0FA272F}"/>
+              </a:ext>
+            </a:extLst>
+          </p:cNvPr>
+          <p:cNvSpPr/>
+          <p:nvPr/>
+        </p:nvSpPr>
+        <p:spPr>
+          <a:xfrm>
+            <a:off x="1283858" y="4278533"/>
+            <a:ext cx="597159" cy="547943"/>
+          </a:xfrm>
+          <a:prstGeom prst="ellipse">
+            <a:avLst/>
+          </a:prstGeom>
+        </p:spPr>
+        <p:style>
+          <a:lnRef idx="2">
+            <a:schemeClr val="dk1"/>
+          </a:lnRef>
+          <a:fillRef idx="1">
+            <a:schemeClr val="lt1"/>
+          </a:fillRef>
+          <a:effectRef idx="0">
+            <a:schemeClr val="dk1"/>
+          </a:effectRef>
+          <a:fontRef idx="minor">
+            <a:schemeClr val="dk1"/>
+          </a:fontRef>
+        </p:style>
+        <p:txBody>
+          <a:bodyPr rtlCol="0" anchor="ctr"/>
+          <a:lstStyle/>
+          <a:p>
+            <a:pPr algn="ctr"/>
+            <a:r>
+              <a:rPr lang="en-US" dirty="0"/>
+              <a:t>1</a:t>
+            </a:r>
+            <a:endParaRPr lang="en-SE" dirty="0"/>
+          </a:p>
+        </p:txBody>
+      </p:sp>
+      <p:sp>
+        <p:nvSpPr>
+          <p:cNvPr id="3" name="Oval 2">
+            <a:extLst>
+              <a:ext uri="{FF2B5EF4-FFF2-40B4-BE49-F238E27FC236}">
+                <a16:creationId xmlns:a16="http://schemas.microsoft.com/office/drawing/2014/main" id="{96A1E009-FAB8-9095-271E-878F7D82A925}"/>
+              </a:ext>
+            </a:extLst>
+          </p:cNvPr>
+          <p:cNvSpPr/>
+          <p:nvPr/>
+        </p:nvSpPr>
+        <p:spPr>
+          <a:xfrm>
+            <a:off x="2893805" y="2549662"/>
+            <a:ext cx="597159" cy="547943"/>
+          </a:xfrm>
+          <a:prstGeom prst="ellipse">
+            <a:avLst/>
+          </a:prstGeom>
+        </p:spPr>
+        <p:style>
+          <a:lnRef idx="2">
+            <a:schemeClr val="dk1"/>
+          </a:lnRef>
+          <a:fillRef idx="1">
+            <a:schemeClr val="lt1"/>
+          </a:fillRef>
+          <a:effectRef idx="0">
+            <a:schemeClr val="dk1"/>
+          </a:effectRef>
+          <a:fontRef idx="minor">
+            <a:schemeClr val="dk1"/>
+          </a:fontRef>
+        </p:style>
+        <p:txBody>
+          <a:bodyPr rtlCol="0" anchor="ctr"/>
+          <a:lstStyle/>
+          <a:p>
+            <a:pPr algn="ctr"/>
+            <a:r>
+              <a:rPr lang="en-US" dirty="0"/>
+              <a:t>2</a:t>
+            </a:r>
+            <a:endParaRPr lang="en-SE" dirty="0"/>
+          </a:p>
+        </p:txBody>
+      </p:sp>
+      <p:sp>
+        <p:nvSpPr>
+          <p:cNvPr id="4" name="Oval 3">
+            <a:extLst>
+              <a:ext uri="{FF2B5EF4-FFF2-40B4-BE49-F238E27FC236}">
+                <a16:creationId xmlns:a16="http://schemas.microsoft.com/office/drawing/2014/main" id="{E90FD837-239C-71EC-9058-5A6F196E2CCF}"/>
+              </a:ext>
+            </a:extLst>
+          </p:cNvPr>
+          <p:cNvSpPr/>
+          <p:nvPr/>
+        </p:nvSpPr>
+        <p:spPr>
+          <a:xfrm>
+            <a:off x="5123678" y="2781909"/>
+            <a:ext cx="597159" cy="547943"/>
+          </a:xfrm>
+          <a:prstGeom prst="ellipse">
+            <a:avLst/>
+          </a:prstGeom>
+        </p:spPr>
+        <p:style>
+          <a:lnRef idx="2">
+            <a:schemeClr val="dk1"/>
+          </a:lnRef>
+          <a:fillRef idx="1">
+            <a:schemeClr val="lt1"/>
+          </a:fillRef>
+          <a:effectRef idx="0">
+            <a:schemeClr val="dk1"/>
+          </a:effectRef>
+          <a:fontRef idx="minor">
+            <a:schemeClr val="dk1"/>
+          </a:fontRef>
+        </p:style>
+        <p:txBody>
+          <a:bodyPr rtlCol="0" anchor="ctr"/>
+          <a:lstStyle/>
+          <a:p>
+            <a:pPr algn="ctr"/>
+            <a:r>
+              <a:rPr lang="en-US" dirty="0"/>
+              <a:t>3</a:t>
+            </a:r>
+            <a:endParaRPr lang="en-SE" dirty="0"/>
+          </a:p>
+        </p:txBody>
+      </p:sp>
+      <p:sp>
+        <p:nvSpPr>
+          <p:cNvPr id="5" name="Oval 4">
+            <a:extLst>
+              <a:ext uri="{FF2B5EF4-FFF2-40B4-BE49-F238E27FC236}">
+                <a16:creationId xmlns:a16="http://schemas.microsoft.com/office/drawing/2014/main" id="{A04B9EC5-BE21-DE43-33AE-9652098EC279}"/>
+              </a:ext>
+            </a:extLst>
+          </p:cNvPr>
+          <p:cNvSpPr/>
+          <p:nvPr/>
+        </p:nvSpPr>
+        <p:spPr>
+          <a:xfrm>
+            <a:off x="5336460" y="4690825"/>
+            <a:ext cx="597159" cy="547943"/>
+          </a:xfrm>
+          <a:prstGeom prst="ellipse">
+            <a:avLst/>
+          </a:prstGeom>
+        </p:spPr>
+        <p:style>
+          <a:lnRef idx="2">
+            <a:schemeClr val="dk1"/>
+          </a:lnRef>
+          <a:fillRef idx="1">
+            <a:schemeClr val="lt1"/>
+          </a:fillRef>
+          <a:effectRef idx="0">
+            <a:schemeClr val="dk1"/>
+          </a:effectRef>
+          <a:fontRef idx="minor">
+            <a:schemeClr val="dk1"/>
+          </a:fontRef>
+        </p:style>
+        <p:txBody>
+          <a:bodyPr rtlCol="0" anchor="ctr"/>
+          <a:lstStyle/>
+          <a:p>
+            <a:pPr algn="ctr"/>
+            <a:r>
+              <a:rPr lang="en-US" dirty="0"/>
+              <a:t>4</a:t>
+            </a:r>
+            <a:endParaRPr lang="en-SE" dirty="0"/>
+          </a:p>
+        </p:txBody>
+      </p:sp>
+      <p:sp>
+        <p:nvSpPr>
+          <p:cNvPr id="6" name="Oval 5">
+            <a:extLst>
+              <a:ext uri="{FF2B5EF4-FFF2-40B4-BE49-F238E27FC236}">
+                <a16:creationId xmlns:a16="http://schemas.microsoft.com/office/drawing/2014/main" id="{0EB9319A-3A3C-A819-6B11-46A4767560F9}"/>
+              </a:ext>
+            </a:extLst>
+          </p:cNvPr>
+          <p:cNvSpPr/>
+          <p:nvPr/>
+        </p:nvSpPr>
+        <p:spPr>
+          <a:xfrm>
+            <a:off x="8430687" y="3165355"/>
+            <a:ext cx="597159" cy="547943"/>
+          </a:xfrm>
+          <a:prstGeom prst="ellipse">
+            <a:avLst/>
+          </a:prstGeom>
+        </p:spPr>
+        <p:style>
+          <a:lnRef idx="2">
+            <a:schemeClr val="dk1"/>
+          </a:lnRef>
+          <a:fillRef idx="1">
+            <a:schemeClr val="lt1"/>
+          </a:fillRef>
+          <a:effectRef idx="0">
+            <a:schemeClr val="dk1"/>
+          </a:effectRef>
+          <a:fontRef idx="minor">
+            <a:schemeClr val="dk1"/>
+          </a:fontRef>
+        </p:style>
+        <p:txBody>
+          <a:bodyPr rtlCol="0" anchor="ctr"/>
+          <a:lstStyle/>
+          <a:p>
+            <a:pPr algn="ctr"/>
+            <a:r>
+              <a:rPr lang="en-US" dirty="0"/>
+              <a:t>5</a:t>
+            </a:r>
+            <a:endParaRPr lang="en-SE" dirty="0"/>
+          </a:p>
+        </p:txBody>
+      </p:sp>
+      <p:sp>
+        <p:nvSpPr>
+          <p:cNvPr id="7" name="Oval 6">
+            <a:extLst>
+              <a:ext uri="{FF2B5EF4-FFF2-40B4-BE49-F238E27FC236}">
+                <a16:creationId xmlns:a16="http://schemas.microsoft.com/office/drawing/2014/main" id="{AAAF70DF-F125-5E1D-B717-5E583E4BB261}"/>
+              </a:ext>
+            </a:extLst>
+          </p:cNvPr>
+          <p:cNvSpPr/>
+          <p:nvPr/>
+        </p:nvSpPr>
+        <p:spPr>
+          <a:xfrm>
+            <a:off x="7168189" y="5545645"/>
+            <a:ext cx="597159" cy="547943"/>
+          </a:xfrm>
+          <a:prstGeom prst="ellipse">
+            <a:avLst/>
+          </a:prstGeom>
+        </p:spPr>
+        <p:style>
+          <a:lnRef idx="2">
+            <a:schemeClr val="dk1"/>
+          </a:lnRef>
+          <a:fillRef idx="1">
+            <a:schemeClr val="lt1"/>
+          </a:fillRef>
+          <a:effectRef idx="0">
+            <a:schemeClr val="dk1"/>
+          </a:effectRef>
+          <a:fontRef idx="minor">
+            <a:schemeClr val="dk1"/>
+          </a:fontRef>
+        </p:style>
+        <p:txBody>
+          <a:bodyPr rtlCol="0" anchor="ctr"/>
+          <a:lstStyle/>
+          <a:p>
+            <a:pPr algn="ctr"/>
+            <a:r>
+              <a:rPr lang="en-US" dirty="0"/>
+              <a:t>6</a:t>
+            </a:r>
+            <a:endParaRPr lang="en-SE" dirty="0"/>
           </a:p>
         </p:txBody>
       </p:sp>
@@ -6211,33 +6294,6 @@
                                           </p:stCondLst>
                                         </p:cTn>
                                         <p:tgtEl>
-                                          <p:spTgt spid="32"/>
-                                        </p:tgtEl>
-                                        <p:attrNameLst>
-                                          <p:attrName>style.visibility</p:attrName>
-                                        </p:attrNameLst>
-                                      </p:cBhvr>
-                                      <p:to>
-                                        <p:strVal val="visible"/>
-                                      </p:to>
-                                    </p:set>
-                                  </p:childTnLst>
-                                </p:cTn>
-                              </p:par>
-                              <p:par>
-                                <p:cTn id="9" presetID="1" presetClass="entr" presetSubtype="0" fill="hold" grpId="0" nodeType="withEffect">
-                                  <p:stCondLst>
-                                    <p:cond delay="0"/>
-                                  </p:stCondLst>
-                                  <p:childTnLst>
-                                    <p:set>
-                                      <p:cBhvr>
-                                        <p:cTn id="10" dur="1" fill="hold">
-                                          <p:stCondLst>
-                                            <p:cond delay="0"/>
-                                          </p:stCondLst>
-                                        </p:cTn>
-                                        <p:tgtEl>
                                           <p:spTgt spid="33"/>
                                         </p:tgtEl>
                                         <p:attrNameLst>
@@ -6258,26 +6314,26 @@
                     </p:cTn>
                   </p:par>
                   <p:par>
-                    <p:cTn id="11" fill="hold">
+                    <p:cTn id="9" fill="hold">
                       <p:stCondLst>
                         <p:cond delay="indefinite"/>
                       </p:stCondLst>
                       <p:childTnLst>
                         <p:par>
-                          <p:cTn id="12" fill="hold">
+                          <p:cTn id="10" fill="hold">
                             <p:stCondLst>
                               <p:cond delay="0"/>
                             </p:stCondLst>
                             <p:childTnLst>
                               <p:par>
-                                <p:cTn id="13" presetID="1" presetClass="entr" presetSubtype="0" fill="hold" grpId="0" nodeType="clickEffect">
+                                <p:cTn id="11" presetID="1" presetClass="entr" presetSubtype="0" fill="hold" grpId="0" nodeType="clickEffect">
                                   <p:stCondLst>
                                     <p:cond delay="0"/>
                                   </p:stCondLst>
                                   <p:childTnLst>
                                     <p:set>
                                       <p:cBhvr>
-                                        <p:cTn id="14" dur="1" fill="hold">
+                                        <p:cTn id="12" dur="1" fill="hold">
                                           <p:stCondLst>
                                             <p:cond delay="0"/>
                                           </p:stCondLst>
@@ -6303,19 +6359,46 @@
                     </p:cTn>
                   </p:par>
                   <p:par>
-                    <p:cTn id="15" fill="hold">
+                    <p:cTn id="13" fill="hold">
                       <p:stCondLst>
                         <p:cond delay="indefinite"/>
                       </p:stCondLst>
                       <p:childTnLst>
                         <p:par>
-                          <p:cTn id="16" fill="hold">
+                          <p:cTn id="14" fill="hold">
                             <p:stCondLst>
                               <p:cond delay="0"/>
                             </p:stCondLst>
                             <p:childTnLst>
                               <p:par>
-                                <p:cTn id="17" presetID="1" presetClass="entr" presetSubtype="0" fill="hold" grpId="0" nodeType="clickEffect">
+                                <p:cTn id="15" presetID="1" presetClass="entr" presetSubtype="0" fill="hold" grpId="0" nodeType="clickEffect">
+                                  <p:stCondLst>
+                                    <p:cond delay="0"/>
+                                  </p:stCondLst>
+                                  <p:childTnLst>
+                                    <p:set>
+                                      <p:cBhvr>
+                                        <p:cTn id="16" dur="1" fill="hold">
+                                          <p:stCondLst>
+                                            <p:cond delay="0"/>
+                                          </p:stCondLst>
+                                        </p:cTn>
+                                        <p:tgtEl>
+                                          <p:spTgt spid="21"/>
+                                        </p:tgtEl>
+                                        <p:attrNameLst>
+                                          <p:attrName>style.visibility</p:attrName>
+                                        </p:attrNameLst>
+                                      </p:cBhvr>
+                                      <p:to>
+                                        <p:strVal val="visible"/>
+                                      </p:to>
+                                    </p:set>
+                                  </p:childTnLst>
+                                </p:cTn>
+                              </p:par>
+                              <p:par>
+                                <p:cTn id="17" presetID="1" presetClass="entr" presetSubtype="0" fill="hold" nodeType="withEffect">
                                   <p:stCondLst>
                                     <p:cond delay="0"/>
                                   </p:stCondLst>
@@ -6328,7 +6411,7 @@
                                           </p:stCondLst>
                                         </p:cTn>
                                         <p:tgtEl>
-                                          <p:spTgt spid="21"/>
+                                          <p:spTgt spid="22"/>
                                         </p:tgtEl>
                                         <p:attrNameLst>
                                           <p:attrName>style.visibility</p:attrName>
@@ -6355,7 +6438,7 @@
                                           </p:stCondLst>
                                         </p:cTn>
                                         <p:tgtEl>
-                                          <p:spTgt spid="22"/>
+                                          <p:spTgt spid="23"/>
                                         </p:tgtEl>
                                         <p:attrNameLst>
                                           <p:attrName>style.visibility</p:attrName>
@@ -6382,7 +6465,7 @@
                                           </p:stCondLst>
                                         </p:cTn>
                                         <p:tgtEl>
-                                          <p:spTgt spid="23"/>
+                                          <p:spTgt spid="24"/>
                                         </p:tgtEl>
                                         <p:attrNameLst>
                                           <p:attrName>style.visibility</p:attrName>
@@ -6396,7 +6479,7 @@
                                 </p:cTn>
                               </p:par>
                               <p:par>
-                                <p:cTn id="23" presetID="1" presetClass="entr" presetSubtype="0" fill="hold" nodeType="withEffect">
+                                <p:cTn id="23" presetID="1" presetClass="entr" presetSubtype="0" fill="hold" grpId="0" nodeType="withEffect">
                                   <p:stCondLst>
                                     <p:cond delay="0"/>
                                   </p:stCondLst>
@@ -6409,7 +6492,7 @@
                                           </p:stCondLst>
                                         </p:cTn>
                                         <p:tgtEl>
-                                          <p:spTgt spid="24"/>
+                                          <p:spTgt spid="30"/>
                                         </p:tgtEl>
                                         <p:attrNameLst>
                                           <p:attrName>style.visibility</p:attrName>
@@ -6436,7 +6519,7 @@
                                           </p:stCondLst>
                                         </p:cTn>
                                         <p:tgtEl>
-                                          <p:spTgt spid="30"/>
+                                          <p:spTgt spid="29"/>
                                         </p:tgtEl>
                                         <p:attrNameLst>
                                           <p:attrName>style.visibility</p:attrName>
@@ -6463,33 +6546,6 @@
                                           </p:stCondLst>
                                         </p:cTn>
                                         <p:tgtEl>
-                                          <p:spTgt spid="29"/>
-                                        </p:tgtEl>
-                                        <p:attrNameLst>
-                                          <p:attrName>style.visibility</p:attrName>
-                                        </p:attrNameLst>
-                                      </p:cBhvr>
-                                      <p:to>
-                                        <p:strVal val="visible"/>
-                                      </p:to>
-                                    </p:set>
-                                  </p:childTnLst>
-                                </p:cTn>
-                              </p:par>
-                              <p:par>
-                                <p:cTn id="29" presetID="1" presetClass="entr" presetSubtype="0" fill="hold" grpId="0" nodeType="withEffect">
-                                  <p:stCondLst>
-                                    <p:cond delay="0"/>
-                                  </p:stCondLst>
-                                  <p:childTnLst>
-                                    <p:set>
-                                      <p:cBhvr>
-                                        <p:cTn id="30" dur="1" fill="hold">
-                                          <p:stCondLst>
-                                            <p:cond delay="0"/>
-                                          </p:stCondLst>
-                                        </p:cTn>
-                                        <p:tgtEl>
                                           <p:spTgt spid="27"/>
                                         </p:tgtEl>
                                         <p:attrNameLst>
@@ -6510,19 +6566,46 @@
                     </p:cTn>
                   </p:par>
                   <p:par>
-                    <p:cTn id="31" fill="hold">
+                    <p:cTn id="29" fill="hold">
                       <p:stCondLst>
                         <p:cond delay="indefinite"/>
                       </p:stCondLst>
                       <p:childTnLst>
                         <p:par>
-                          <p:cTn id="32" fill="hold">
+                          <p:cTn id="30" fill="hold">
                             <p:stCondLst>
                               <p:cond delay="0"/>
                             </p:stCondLst>
                             <p:childTnLst>
                               <p:par>
-                                <p:cTn id="33" presetID="1" presetClass="entr" presetSubtype="0" fill="hold" nodeType="clickEffect">
+                                <p:cTn id="31" presetID="1" presetClass="entr" presetSubtype="0" fill="hold" nodeType="clickEffect">
+                                  <p:stCondLst>
+                                    <p:cond delay="0"/>
+                                  </p:stCondLst>
+                                  <p:childTnLst>
+                                    <p:set>
+                                      <p:cBhvr>
+                                        <p:cTn id="32" dur="1" fill="hold">
+                                          <p:stCondLst>
+                                            <p:cond delay="0"/>
+                                          </p:stCondLst>
+                                        </p:cTn>
+                                        <p:tgtEl>
+                                          <p:spTgt spid="25"/>
+                                        </p:tgtEl>
+                                        <p:attrNameLst>
+                                          <p:attrName>style.visibility</p:attrName>
+                                        </p:attrNameLst>
+                                      </p:cBhvr>
+                                      <p:to>
+                                        <p:strVal val="visible"/>
+                                      </p:to>
+                                    </p:set>
+                                  </p:childTnLst>
+                                </p:cTn>
+                              </p:par>
+                              <p:par>
+                                <p:cTn id="33" presetID="1" presetClass="entr" presetSubtype="0" fill="hold" grpId="0" nodeType="withEffect">
                                   <p:stCondLst>
                                     <p:cond delay="0"/>
                                   </p:stCondLst>
@@ -6535,7 +6618,7 @@
                                           </p:stCondLst>
                                         </p:cTn>
                                         <p:tgtEl>
-                                          <p:spTgt spid="25"/>
+                                          <p:spTgt spid="34"/>
                                         </p:tgtEl>
                                         <p:attrNameLst>
                                           <p:attrName>style.visibility</p:attrName>
@@ -6562,33 +6645,6 @@
                                           </p:stCondLst>
                                         </p:cTn>
                                         <p:tgtEl>
-                                          <p:spTgt spid="34"/>
-                                        </p:tgtEl>
-                                        <p:attrNameLst>
-                                          <p:attrName>style.visibility</p:attrName>
-                                        </p:attrNameLst>
-                                      </p:cBhvr>
-                                      <p:to>
-                                        <p:strVal val="visible"/>
-                                      </p:to>
-                                    </p:set>
-                                  </p:childTnLst>
-                                </p:cTn>
-                              </p:par>
-                              <p:par>
-                                <p:cTn id="37" presetID="1" presetClass="entr" presetSubtype="0" fill="hold" grpId="0" nodeType="withEffect">
-                                  <p:stCondLst>
-                                    <p:cond delay="0"/>
-                                  </p:stCondLst>
-                                  <p:childTnLst>
-                                    <p:set>
-                                      <p:cBhvr>
-                                        <p:cTn id="38" dur="1" fill="hold">
-                                          <p:stCondLst>
-                                            <p:cond delay="0"/>
-                                          </p:stCondLst>
-                                        </p:cTn>
-                                        <p:tgtEl>
                                           <p:spTgt spid="35"/>
                                         </p:tgtEl>
                                         <p:attrNameLst>
@@ -6609,26 +6665,26 @@
                     </p:cTn>
                   </p:par>
                   <p:par>
-                    <p:cTn id="39" fill="hold">
+                    <p:cTn id="37" fill="hold">
                       <p:stCondLst>
                         <p:cond delay="indefinite"/>
                       </p:stCondLst>
                       <p:childTnLst>
                         <p:par>
-                          <p:cTn id="40" fill="hold">
+                          <p:cTn id="38" fill="hold">
                             <p:stCondLst>
                               <p:cond delay="0"/>
                             </p:stCondLst>
                             <p:childTnLst>
                               <p:par>
-                                <p:cTn id="41" presetID="1" presetClass="entr" presetSubtype="0" fill="hold" nodeType="clickEffect">
+                                <p:cTn id="39" presetID="1" presetClass="entr" presetSubtype="0" fill="hold" nodeType="clickEffect">
                                   <p:stCondLst>
                                     <p:cond delay="0"/>
                                   </p:stCondLst>
                                   <p:childTnLst>
                                     <p:set>
                                       <p:cBhvr>
-                                        <p:cTn id="42" dur="1" fill="hold">
+                                        <p:cTn id="40" dur="1" fill="hold">
                                           <p:stCondLst>
                                             <p:cond delay="0"/>
                                           </p:stCondLst>
@@ -6648,14 +6704,14 @@
                                 </p:cTn>
                               </p:par>
                               <p:par>
-                                <p:cTn id="43" presetID="1" presetClass="entr" presetSubtype="0" fill="hold" grpId="0" nodeType="withEffect">
+                                <p:cTn id="41" presetID="1" presetClass="entr" presetSubtype="0" fill="hold" grpId="0" nodeType="withEffect">
                                   <p:stCondLst>
                                     <p:cond delay="0"/>
                                   </p:stCondLst>
                                   <p:childTnLst>
                                     <p:set>
                                       <p:cBhvr>
-                                        <p:cTn id="44" dur="1" fill="hold">
+                                        <p:cTn id="42" dur="1" fill="hold">
                                           <p:stCondLst>
                                             <p:cond delay="0"/>
                                           </p:stCondLst>
@@ -6709,7 +6765,6 @@
       <p:bldP spid="29" grpId="0"/>
       <p:bldP spid="30" grpId="0"/>
       <p:bldP spid="31" grpId="0" animBg="1"/>
-      <p:bldP spid="32" grpId="0" animBg="1"/>
       <p:bldP spid="33" grpId="0" animBg="1"/>
       <p:bldP spid="34" grpId="0" animBg="1"/>
       <p:bldP spid="35" grpId="0"/>

</xml_diff>

<commit_message>
Modifying some profiles and extending documentation of Task process
</commit_message>
<xml_diff>
--- a/ImplementationGuideImages.pptx
+++ b/ImplementationGuideImages.pptx
@@ -8,7 +8,8 @@
     <p:sldId id="259" r:id="rId2"/>
     <p:sldId id="256" r:id="rId3"/>
     <p:sldId id="257" r:id="rId4"/>
-    <p:sldId id="258" r:id="rId5"/>
+    <p:sldId id="261" r:id="rId5"/>
+    <p:sldId id="258" r:id="rId6"/>
   </p:sldIdLst>
   <p:sldSz cx="12192000" cy="6858000"/>
   <p:notesSz cx="6858000" cy="9144000"/>
@@ -264,7 +265,7 @@
           <a:p>
             <a:fld id="{6B5A8AD0-4133-444B-956D-B3352209FA33}" type="datetimeFigureOut">
               <a:rPr lang="en-SE" smtClean="0"/>
-              <a:t>2024-01-12</a:t>
+              <a:t>2024-01-24</a:t>
             </a:fld>
             <a:endParaRPr lang="en-SE"/>
           </a:p>
@@ -464,7 +465,7 @@
           <a:p>
             <a:fld id="{6B5A8AD0-4133-444B-956D-B3352209FA33}" type="datetimeFigureOut">
               <a:rPr lang="en-SE" smtClean="0"/>
-              <a:t>2024-01-12</a:t>
+              <a:t>2024-01-24</a:t>
             </a:fld>
             <a:endParaRPr lang="en-SE"/>
           </a:p>
@@ -674,7 +675,7 @@
           <a:p>
             <a:fld id="{6B5A8AD0-4133-444B-956D-B3352209FA33}" type="datetimeFigureOut">
               <a:rPr lang="en-SE" smtClean="0"/>
-              <a:t>2024-01-12</a:t>
+              <a:t>2024-01-24</a:t>
             </a:fld>
             <a:endParaRPr lang="en-SE"/>
           </a:p>
@@ -874,7 +875,7 @@
           <a:p>
             <a:fld id="{6B5A8AD0-4133-444B-956D-B3352209FA33}" type="datetimeFigureOut">
               <a:rPr lang="en-SE" smtClean="0"/>
-              <a:t>2024-01-12</a:t>
+              <a:t>2024-01-24</a:t>
             </a:fld>
             <a:endParaRPr lang="en-SE"/>
           </a:p>
@@ -1150,7 +1151,7 @@
           <a:p>
             <a:fld id="{6B5A8AD0-4133-444B-956D-B3352209FA33}" type="datetimeFigureOut">
               <a:rPr lang="en-SE" smtClean="0"/>
-              <a:t>2024-01-12</a:t>
+              <a:t>2024-01-24</a:t>
             </a:fld>
             <a:endParaRPr lang="en-SE"/>
           </a:p>
@@ -1418,7 +1419,7 @@
           <a:p>
             <a:fld id="{6B5A8AD0-4133-444B-956D-B3352209FA33}" type="datetimeFigureOut">
               <a:rPr lang="en-SE" smtClean="0"/>
-              <a:t>2024-01-12</a:t>
+              <a:t>2024-01-24</a:t>
             </a:fld>
             <a:endParaRPr lang="en-SE"/>
           </a:p>
@@ -1833,7 +1834,7 @@
           <a:p>
             <a:fld id="{6B5A8AD0-4133-444B-956D-B3352209FA33}" type="datetimeFigureOut">
               <a:rPr lang="en-SE" smtClean="0"/>
-              <a:t>2024-01-12</a:t>
+              <a:t>2024-01-24</a:t>
             </a:fld>
             <a:endParaRPr lang="en-SE"/>
           </a:p>
@@ -1975,7 +1976,7 @@
           <a:p>
             <a:fld id="{6B5A8AD0-4133-444B-956D-B3352209FA33}" type="datetimeFigureOut">
               <a:rPr lang="en-SE" smtClean="0"/>
-              <a:t>2024-01-12</a:t>
+              <a:t>2024-01-24</a:t>
             </a:fld>
             <a:endParaRPr lang="en-SE"/>
           </a:p>
@@ -2088,7 +2089,7 @@
           <a:p>
             <a:fld id="{6B5A8AD0-4133-444B-956D-B3352209FA33}" type="datetimeFigureOut">
               <a:rPr lang="en-SE" smtClean="0"/>
-              <a:t>2024-01-12</a:t>
+              <a:t>2024-01-24</a:t>
             </a:fld>
             <a:endParaRPr lang="en-SE"/>
           </a:p>
@@ -2401,7 +2402,7 @@
           <a:p>
             <a:fld id="{6B5A8AD0-4133-444B-956D-B3352209FA33}" type="datetimeFigureOut">
               <a:rPr lang="en-SE" smtClean="0"/>
-              <a:t>2024-01-12</a:t>
+              <a:t>2024-01-24</a:t>
             </a:fld>
             <a:endParaRPr lang="en-SE"/>
           </a:p>
@@ -2690,7 +2691,7 @@
           <a:p>
             <a:fld id="{6B5A8AD0-4133-444B-956D-B3352209FA33}" type="datetimeFigureOut">
               <a:rPr lang="en-SE" smtClean="0"/>
-              <a:t>2024-01-12</a:t>
+              <a:t>2024-01-24</a:t>
             </a:fld>
             <a:endParaRPr lang="en-SE"/>
           </a:p>
@@ -2933,7 +2934,7 @@
           <a:p>
             <a:fld id="{6B5A8AD0-4133-444B-956D-B3352209FA33}" type="datetimeFigureOut">
               <a:rPr lang="en-SE" smtClean="0"/>
-              <a:t>2024-01-12</a:t>
+              <a:t>2024-01-24</a:t>
             </a:fld>
             <a:endParaRPr lang="en-SE"/>
           </a:p>
@@ -6750,6 +6751,35 @@
             <a:r>
               <a:rPr lang="en-US" dirty="0"/>
               <a:t>6</a:t>
+            </a:r>
+            <a:endParaRPr lang="en-SE" dirty="0"/>
+          </a:p>
+        </p:txBody>
+      </p:sp>
+      <p:sp>
+        <p:nvSpPr>
+          <p:cNvPr id="8" name="Title 7">
+            <a:extLst>
+              <a:ext uri="{FF2B5EF4-FFF2-40B4-BE49-F238E27FC236}">
+                <a16:creationId xmlns:a16="http://schemas.microsoft.com/office/drawing/2014/main" id="{13F19C36-24C6-17C2-84D9-DE2ACE70754A}"/>
+              </a:ext>
+            </a:extLst>
+          </p:cNvPr>
+          <p:cNvSpPr>
+            <a:spLocks noGrp="1"/>
+          </p:cNvSpPr>
+          <p:nvPr>
+            <p:ph type="title"/>
+          </p:nvPr>
+        </p:nvSpPr>
+        <p:spPr/>
+        <p:txBody>
+          <a:bodyPr/>
+          <a:lstStyle/>
+          <a:p>
+            <a:r>
+              <a:rPr lang="en-US" dirty="0"/>
+              <a:t>Simplified</a:t>
             </a:r>
             <a:endParaRPr lang="en-SE" dirty="0"/>
           </a:p>
@@ -7324,6 +7354,2270 @@
       </p:grpSpPr>
       <p:sp>
         <p:nvSpPr>
+          <p:cNvPr id="20" name="Rectangle: Rounded Corners 19">
+            <a:extLst>
+              <a:ext uri="{FF2B5EF4-FFF2-40B4-BE49-F238E27FC236}">
+                <a16:creationId xmlns:a16="http://schemas.microsoft.com/office/drawing/2014/main" id="{A3D9F251-743A-733B-9B00-7B6F076E7A9A}"/>
+              </a:ext>
+            </a:extLst>
+          </p:cNvPr>
+          <p:cNvSpPr/>
+          <p:nvPr/>
+        </p:nvSpPr>
+        <p:spPr>
+          <a:xfrm>
+            <a:off x="882949" y="2916198"/>
+            <a:ext cx="3626232" cy="3007947"/>
+          </a:xfrm>
+          <a:prstGeom prst="roundRect">
+            <a:avLst/>
+          </a:prstGeom>
+          <a:solidFill>
+            <a:srgbClr val="0D494F"/>
+          </a:solidFill>
+          <a:ln w="12700" cap="flat" cmpd="sng" algn="ctr">
+            <a:solidFill>
+              <a:srgbClr val="0D494F">
+                <a:shade val="15000"/>
+              </a:srgbClr>
+            </a:solidFill>
+            <a:prstDash val="solid"/>
+            <a:miter lim="800000"/>
+          </a:ln>
+          <a:effectLst/>
+        </p:spPr>
+        <p:txBody>
+          <a:bodyPr rtlCol="0" anchor="ctr"/>
+          <a:lstStyle/>
+          <a:p>
+            <a:pPr marL="0" marR="0" lvl="0" indent="0" algn="ctr" defTabSz="914400" eaLnBrk="1" fontAlgn="auto" latinLnBrk="0" hangingPunct="1">
+              <a:lnSpc>
+                <a:spcPct val="100000"/>
+              </a:lnSpc>
+              <a:spcBef>
+                <a:spcPts val="0"/>
+              </a:spcBef>
+              <a:spcAft>
+                <a:spcPts val="0"/>
+              </a:spcAft>
+              <a:buClrTx/>
+              <a:buSzTx/>
+              <a:buFontTx/>
+              <a:buNone/>
+              <a:tabLst/>
+              <a:defRPr/>
+            </a:pPr>
+            <a:r>
+              <a:rPr kumimoji="0" lang="en-US" sz="1800" b="0" i="0" u="none" strike="noStrike" kern="0" cap="none" spc="0" normalizeH="0" baseline="0" noProof="0" dirty="0">
+                <a:ln>
+                  <a:noFill/>
+                </a:ln>
+                <a:solidFill>
+                  <a:srgbClr val="FFFFFF"/>
+                </a:solidFill>
+                <a:effectLst/>
+                <a:uLnTx/>
+                <a:uFillTx/>
+                <a:latin typeface="Calibri" panose="020F0502020204030204"/>
+                <a:ea typeface="+mn-ea"/>
+                <a:cs typeface="+mn-cs"/>
+              </a:rPr>
+              <a:t>Task</a:t>
+            </a:r>
+          </a:p>
+          <a:p>
+            <a:pPr marL="0" marR="0" lvl="0" indent="0" algn="ctr" defTabSz="914400" eaLnBrk="1" fontAlgn="auto" latinLnBrk="0" hangingPunct="1">
+              <a:lnSpc>
+                <a:spcPct val="100000"/>
+              </a:lnSpc>
+              <a:spcBef>
+                <a:spcPts val="0"/>
+              </a:spcBef>
+              <a:spcAft>
+                <a:spcPts val="0"/>
+              </a:spcAft>
+              <a:buClrTx/>
+              <a:buSzTx/>
+              <a:buFontTx/>
+              <a:buNone/>
+              <a:tabLst/>
+              <a:defRPr/>
+            </a:pPr>
+            <a:endParaRPr kumimoji="0" lang="en-US" sz="1800" b="0" i="0" u="none" strike="noStrike" kern="0" cap="none" spc="0" normalizeH="0" baseline="0" noProof="0" dirty="0">
+              <a:ln>
+                <a:noFill/>
+              </a:ln>
+              <a:solidFill>
+                <a:srgbClr val="FFFFFF"/>
+              </a:solidFill>
+              <a:effectLst/>
+              <a:uLnTx/>
+              <a:uFillTx/>
+              <a:latin typeface="Calibri" panose="020F0502020204030204"/>
+              <a:ea typeface="+mn-ea"/>
+              <a:cs typeface="+mn-cs"/>
+            </a:endParaRPr>
+          </a:p>
+          <a:p>
+            <a:pPr marL="0" marR="0" lvl="0" indent="0" algn="ctr" defTabSz="914400" eaLnBrk="1" fontAlgn="auto" latinLnBrk="0" hangingPunct="1">
+              <a:lnSpc>
+                <a:spcPct val="100000"/>
+              </a:lnSpc>
+              <a:spcBef>
+                <a:spcPts val="0"/>
+              </a:spcBef>
+              <a:spcAft>
+                <a:spcPts val="0"/>
+              </a:spcAft>
+              <a:buClrTx/>
+              <a:buSzTx/>
+              <a:buFontTx/>
+              <a:buNone/>
+              <a:tabLst/>
+              <a:defRPr/>
+            </a:pPr>
+            <a:endParaRPr kumimoji="0" lang="en-US" sz="1800" b="0" i="0" u="none" strike="noStrike" kern="0" cap="none" spc="0" normalizeH="0" baseline="0" noProof="0" dirty="0">
+              <a:ln>
+                <a:noFill/>
+              </a:ln>
+              <a:solidFill>
+                <a:srgbClr val="FFFFFF"/>
+              </a:solidFill>
+              <a:effectLst/>
+              <a:uLnTx/>
+              <a:uFillTx/>
+              <a:latin typeface="Calibri" panose="020F0502020204030204"/>
+              <a:ea typeface="+mn-ea"/>
+              <a:cs typeface="+mn-cs"/>
+            </a:endParaRPr>
+          </a:p>
+          <a:p>
+            <a:pPr marL="0" marR="0" lvl="0" indent="0" algn="ctr" defTabSz="914400" eaLnBrk="1" fontAlgn="auto" latinLnBrk="0" hangingPunct="1">
+              <a:lnSpc>
+                <a:spcPct val="100000"/>
+              </a:lnSpc>
+              <a:spcBef>
+                <a:spcPts val="0"/>
+              </a:spcBef>
+              <a:spcAft>
+                <a:spcPts val="0"/>
+              </a:spcAft>
+              <a:buClrTx/>
+              <a:buSzTx/>
+              <a:buFontTx/>
+              <a:buNone/>
+              <a:tabLst/>
+              <a:defRPr/>
+            </a:pPr>
+            <a:endParaRPr kumimoji="0" lang="en-US" sz="1800" b="0" i="0" u="none" strike="noStrike" kern="0" cap="none" spc="0" normalizeH="0" baseline="0" noProof="0" dirty="0">
+              <a:ln>
+                <a:noFill/>
+              </a:ln>
+              <a:solidFill>
+                <a:srgbClr val="FFFFFF"/>
+              </a:solidFill>
+              <a:effectLst/>
+              <a:uLnTx/>
+              <a:uFillTx/>
+              <a:latin typeface="Calibri" panose="020F0502020204030204"/>
+              <a:ea typeface="+mn-ea"/>
+              <a:cs typeface="+mn-cs"/>
+            </a:endParaRPr>
+          </a:p>
+          <a:p>
+            <a:pPr marL="0" marR="0" lvl="0" indent="0" algn="ctr" defTabSz="914400" eaLnBrk="1" fontAlgn="auto" latinLnBrk="0" hangingPunct="1">
+              <a:lnSpc>
+                <a:spcPct val="100000"/>
+              </a:lnSpc>
+              <a:spcBef>
+                <a:spcPts val="0"/>
+              </a:spcBef>
+              <a:spcAft>
+                <a:spcPts val="0"/>
+              </a:spcAft>
+              <a:buClrTx/>
+              <a:buSzTx/>
+              <a:buFontTx/>
+              <a:buNone/>
+              <a:tabLst/>
+              <a:defRPr/>
+            </a:pPr>
+            <a:endParaRPr kumimoji="0" lang="en-US" sz="1800" b="0" i="0" u="none" strike="noStrike" kern="0" cap="none" spc="0" normalizeH="0" baseline="0" noProof="0" dirty="0">
+              <a:ln>
+                <a:noFill/>
+              </a:ln>
+              <a:solidFill>
+                <a:srgbClr val="FFFFFF"/>
+              </a:solidFill>
+              <a:effectLst/>
+              <a:uLnTx/>
+              <a:uFillTx/>
+              <a:latin typeface="Calibri" panose="020F0502020204030204"/>
+              <a:ea typeface="+mn-ea"/>
+              <a:cs typeface="+mn-cs"/>
+            </a:endParaRPr>
+          </a:p>
+          <a:p>
+            <a:pPr marL="0" marR="0" lvl="0" indent="0" algn="ctr" defTabSz="914400" eaLnBrk="1" fontAlgn="auto" latinLnBrk="0" hangingPunct="1">
+              <a:lnSpc>
+                <a:spcPct val="100000"/>
+              </a:lnSpc>
+              <a:spcBef>
+                <a:spcPts val="0"/>
+              </a:spcBef>
+              <a:spcAft>
+                <a:spcPts val="0"/>
+              </a:spcAft>
+              <a:buClrTx/>
+              <a:buSzTx/>
+              <a:buFontTx/>
+              <a:buNone/>
+              <a:tabLst/>
+              <a:defRPr/>
+            </a:pPr>
+            <a:endParaRPr kumimoji="0" lang="en-US" sz="1800" b="0" i="0" u="none" strike="noStrike" kern="0" cap="none" spc="0" normalizeH="0" baseline="0" noProof="0" dirty="0">
+              <a:ln>
+                <a:noFill/>
+              </a:ln>
+              <a:solidFill>
+                <a:srgbClr val="FFFFFF"/>
+              </a:solidFill>
+              <a:effectLst/>
+              <a:uLnTx/>
+              <a:uFillTx/>
+              <a:latin typeface="Calibri" panose="020F0502020204030204"/>
+              <a:ea typeface="+mn-ea"/>
+              <a:cs typeface="+mn-cs"/>
+            </a:endParaRPr>
+          </a:p>
+          <a:p>
+            <a:pPr marL="0" marR="0" lvl="0" indent="0" algn="ctr" defTabSz="914400" eaLnBrk="1" fontAlgn="auto" latinLnBrk="0" hangingPunct="1">
+              <a:lnSpc>
+                <a:spcPct val="100000"/>
+              </a:lnSpc>
+              <a:spcBef>
+                <a:spcPts val="0"/>
+              </a:spcBef>
+              <a:spcAft>
+                <a:spcPts val="0"/>
+              </a:spcAft>
+              <a:buClrTx/>
+              <a:buSzTx/>
+              <a:buFontTx/>
+              <a:buNone/>
+              <a:tabLst/>
+              <a:defRPr/>
+            </a:pPr>
+            <a:endParaRPr kumimoji="0" lang="en-US" sz="1800" b="0" i="0" u="none" strike="noStrike" kern="0" cap="none" spc="0" normalizeH="0" baseline="0" noProof="0" dirty="0">
+              <a:ln>
+                <a:noFill/>
+              </a:ln>
+              <a:solidFill>
+                <a:srgbClr val="FFFFFF"/>
+              </a:solidFill>
+              <a:effectLst/>
+              <a:uLnTx/>
+              <a:uFillTx/>
+              <a:latin typeface="Calibri" panose="020F0502020204030204"/>
+              <a:ea typeface="+mn-ea"/>
+              <a:cs typeface="+mn-cs"/>
+            </a:endParaRPr>
+          </a:p>
+          <a:p>
+            <a:pPr marL="0" marR="0" lvl="0" indent="0" algn="ctr" defTabSz="914400" eaLnBrk="1" fontAlgn="auto" latinLnBrk="0" hangingPunct="1">
+              <a:lnSpc>
+                <a:spcPct val="100000"/>
+              </a:lnSpc>
+              <a:spcBef>
+                <a:spcPts val="0"/>
+              </a:spcBef>
+              <a:spcAft>
+                <a:spcPts val="0"/>
+              </a:spcAft>
+              <a:buClrTx/>
+              <a:buSzTx/>
+              <a:buFontTx/>
+              <a:buNone/>
+              <a:tabLst/>
+              <a:defRPr/>
+            </a:pPr>
+            <a:endParaRPr kumimoji="0" lang="en-SE" sz="1800" b="0" i="0" u="none" strike="noStrike" kern="0" cap="none" spc="0" normalizeH="0" baseline="0" noProof="0" dirty="0">
+              <a:ln>
+                <a:noFill/>
+              </a:ln>
+              <a:solidFill>
+                <a:srgbClr val="FFFFFF"/>
+              </a:solidFill>
+              <a:effectLst/>
+              <a:uLnTx/>
+              <a:uFillTx/>
+              <a:latin typeface="Calibri" panose="020F0502020204030204"/>
+              <a:ea typeface="+mn-ea"/>
+              <a:cs typeface="+mn-cs"/>
+            </a:endParaRPr>
+          </a:p>
+        </p:txBody>
+      </p:sp>
+      <p:sp>
+        <p:nvSpPr>
+          <p:cNvPr id="21" name="Oval 20">
+            <a:extLst>
+              <a:ext uri="{FF2B5EF4-FFF2-40B4-BE49-F238E27FC236}">
+                <a16:creationId xmlns:a16="http://schemas.microsoft.com/office/drawing/2014/main" id="{FD85DED4-ACB1-AD71-BC81-242369AEEF88}"/>
+              </a:ext>
+            </a:extLst>
+          </p:cNvPr>
+          <p:cNvSpPr/>
+          <p:nvPr/>
+        </p:nvSpPr>
+        <p:spPr>
+          <a:xfrm>
+            <a:off x="5865693" y="3429000"/>
+            <a:ext cx="1511928" cy="1321806"/>
+          </a:xfrm>
+          <a:prstGeom prst="ellipse">
+            <a:avLst/>
+          </a:prstGeom>
+          <a:solidFill>
+            <a:srgbClr val="602651"/>
+          </a:solidFill>
+          <a:ln w="12700" cap="flat" cmpd="sng" algn="ctr">
+            <a:solidFill>
+              <a:srgbClr val="602651">
+                <a:shade val="15000"/>
+              </a:srgbClr>
+            </a:solidFill>
+            <a:prstDash val="solid"/>
+            <a:miter lim="800000"/>
+          </a:ln>
+          <a:effectLst/>
+        </p:spPr>
+        <p:txBody>
+          <a:bodyPr rtlCol="0" anchor="ctr"/>
+          <a:lstStyle/>
+          <a:p>
+            <a:pPr marL="0" marR="0" lvl="0" indent="0" algn="ctr" defTabSz="914400" eaLnBrk="1" fontAlgn="auto" latinLnBrk="0" hangingPunct="1">
+              <a:lnSpc>
+                <a:spcPct val="100000"/>
+              </a:lnSpc>
+              <a:spcBef>
+                <a:spcPts val="0"/>
+              </a:spcBef>
+              <a:spcAft>
+                <a:spcPts val="0"/>
+              </a:spcAft>
+              <a:buClrTx/>
+              <a:buSzTx/>
+              <a:buFontTx/>
+              <a:buNone/>
+              <a:tabLst/>
+              <a:defRPr/>
+            </a:pPr>
+            <a:r>
+              <a:rPr kumimoji="0" lang="en-US" sz="1200" b="0" i="0" u="none" strike="noStrike" kern="0" cap="none" spc="0" normalizeH="0" baseline="0" noProof="0" dirty="0">
+                <a:ln>
+                  <a:noFill/>
+                </a:ln>
+                <a:solidFill>
+                  <a:srgbClr val="FFFFFF"/>
+                </a:solidFill>
+                <a:effectLst/>
+                <a:uLnTx/>
+                <a:uFillTx/>
+                <a:latin typeface="Calibri" panose="020F0502020204030204"/>
+                <a:ea typeface="+mn-ea"/>
+                <a:cs typeface="+mn-cs"/>
+              </a:rPr>
+              <a:t>Maintenance org</a:t>
+            </a:r>
+            <a:endParaRPr kumimoji="0" lang="en-SE" sz="1200" b="0" i="0" u="none" strike="noStrike" kern="0" cap="none" spc="0" normalizeH="0" baseline="0" noProof="0" dirty="0">
+              <a:ln>
+                <a:noFill/>
+              </a:ln>
+              <a:solidFill>
+                <a:srgbClr val="FFFFFF"/>
+              </a:solidFill>
+              <a:effectLst/>
+              <a:uLnTx/>
+              <a:uFillTx/>
+              <a:latin typeface="Calibri" panose="020F0502020204030204"/>
+              <a:ea typeface="+mn-ea"/>
+              <a:cs typeface="+mn-cs"/>
+            </a:endParaRPr>
+          </a:p>
+        </p:txBody>
+      </p:sp>
+      <p:cxnSp>
+        <p:nvCxnSpPr>
+          <p:cNvPr id="22" name="Straight Arrow Connector 21">
+            <a:extLst>
+              <a:ext uri="{FF2B5EF4-FFF2-40B4-BE49-F238E27FC236}">
+                <a16:creationId xmlns:a16="http://schemas.microsoft.com/office/drawing/2014/main" id="{E98744B0-BCCC-FB65-B5E6-A56C6D762328}"/>
+              </a:ext>
+            </a:extLst>
+          </p:cNvPr>
+          <p:cNvCxnSpPr/>
+          <p:nvPr/>
+        </p:nvCxnSpPr>
+        <p:spPr>
+          <a:xfrm>
+            <a:off x="4734009" y="3721676"/>
+            <a:ext cx="986828" cy="0"/>
+          </a:xfrm>
+          <a:prstGeom prst="straightConnector1">
+            <a:avLst/>
+          </a:prstGeom>
+          <a:noFill/>
+          <a:ln w="57150" cap="flat" cmpd="sng" algn="ctr">
+            <a:solidFill>
+              <a:srgbClr val="602651"/>
+            </a:solidFill>
+            <a:prstDash val="solid"/>
+            <a:miter lim="800000"/>
+            <a:tailEnd type="triangle"/>
+          </a:ln>
+          <a:effectLst/>
+        </p:spPr>
+      </p:cxnSp>
+      <p:cxnSp>
+        <p:nvCxnSpPr>
+          <p:cNvPr id="23" name="Straight Arrow Connector 22">
+            <a:extLst>
+              <a:ext uri="{FF2B5EF4-FFF2-40B4-BE49-F238E27FC236}">
+                <a16:creationId xmlns:a16="http://schemas.microsoft.com/office/drawing/2014/main" id="{765839AA-20DD-ABAA-694A-080210B06ECD}"/>
+              </a:ext>
+            </a:extLst>
+          </p:cNvPr>
+          <p:cNvCxnSpPr/>
+          <p:nvPr/>
+        </p:nvCxnSpPr>
+        <p:spPr>
+          <a:xfrm>
+            <a:off x="4734009" y="4124406"/>
+            <a:ext cx="986828" cy="0"/>
+          </a:xfrm>
+          <a:prstGeom prst="straightConnector1">
+            <a:avLst/>
+          </a:prstGeom>
+          <a:noFill/>
+          <a:ln w="57150" cap="flat" cmpd="sng" algn="ctr">
+            <a:solidFill>
+              <a:srgbClr val="602651"/>
+            </a:solidFill>
+            <a:prstDash val="solid"/>
+            <a:miter lim="800000"/>
+            <a:tailEnd type="triangle"/>
+          </a:ln>
+          <a:effectLst/>
+        </p:spPr>
+      </p:cxnSp>
+      <p:cxnSp>
+        <p:nvCxnSpPr>
+          <p:cNvPr id="24" name="Straight Arrow Connector 23">
+            <a:extLst>
+              <a:ext uri="{FF2B5EF4-FFF2-40B4-BE49-F238E27FC236}">
+                <a16:creationId xmlns:a16="http://schemas.microsoft.com/office/drawing/2014/main" id="{24A4F852-B066-A3E0-BAFE-1F99A98F3A90}"/>
+              </a:ext>
+            </a:extLst>
+          </p:cNvPr>
+          <p:cNvCxnSpPr/>
+          <p:nvPr/>
+        </p:nvCxnSpPr>
+        <p:spPr>
+          <a:xfrm>
+            <a:off x="4734009" y="4536123"/>
+            <a:ext cx="986828" cy="0"/>
+          </a:xfrm>
+          <a:prstGeom prst="straightConnector1">
+            <a:avLst/>
+          </a:prstGeom>
+          <a:noFill/>
+          <a:ln w="57150" cap="flat" cmpd="sng" algn="ctr">
+            <a:solidFill>
+              <a:srgbClr val="602651"/>
+            </a:solidFill>
+            <a:prstDash val="solid"/>
+            <a:miter lim="800000"/>
+            <a:tailEnd type="triangle"/>
+          </a:ln>
+          <a:effectLst/>
+        </p:spPr>
+      </p:cxnSp>
+      <p:cxnSp>
+        <p:nvCxnSpPr>
+          <p:cNvPr id="25" name="Straight Arrow Connector 24">
+            <a:extLst>
+              <a:ext uri="{FF2B5EF4-FFF2-40B4-BE49-F238E27FC236}">
+                <a16:creationId xmlns:a16="http://schemas.microsoft.com/office/drawing/2014/main" id="{B62E26AA-BE62-E0A5-35DF-9705A2B88CDA}"/>
+              </a:ext>
+            </a:extLst>
+          </p:cNvPr>
+          <p:cNvCxnSpPr/>
+          <p:nvPr/>
+        </p:nvCxnSpPr>
+        <p:spPr>
+          <a:xfrm>
+            <a:off x="7602449" y="4141054"/>
+            <a:ext cx="986828" cy="0"/>
+          </a:xfrm>
+          <a:prstGeom prst="straightConnector1">
+            <a:avLst/>
+          </a:prstGeom>
+          <a:noFill/>
+          <a:ln w="57150" cap="flat" cmpd="sng" algn="ctr">
+            <a:solidFill>
+              <a:srgbClr val="602651"/>
+            </a:solidFill>
+            <a:prstDash val="solid"/>
+            <a:miter lim="800000"/>
+            <a:tailEnd type="triangle"/>
+          </a:ln>
+          <a:effectLst/>
+        </p:spPr>
+      </p:cxnSp>
+      <p:cxnSp>
+        <p:nvCxnSpPr>
+          <p:cNvPr id="26" name="Straight Arrow Connector 13">
+            <a:extLst>
+              <a:ext uri="{FF2B5EF4-FFF2-40B4-BE49-F238E27FC236}">
+                <a16:creationId xmlns:a16="http://schemas.microsoft.com/office/drawing/2014/main" id="{7EAFECAD-617E-728D-4EFB-0753DCA1E595}"/>
+              </a:ext>
+            </a:extLst>
+          </p:cNvPr>
+          <p:cNvCxnSpPr>
+            <a:cxnSpLocks/>
+            <a:endCxn id="34" idx="2"/>
+          </p:cNvCxnSpPr>
+          <p:nvPr/>
+        </p:nvCxnSpPr>
+        <p:spPr>
+          <a:xfrm flipV="1">
+            <a:off x="838200" y="4435796"/>
+            <a:ext cx="9571960" cy="1932053"/>
+          </a:xfrm>
+          <a:prstGeom prst="bentConnector2">
+            <a:avLst/>
+          </a:prstGeom>
+          <a:noFill/>
+          <a:ln w="57150" cap="flat" cmpd="sng" algn="ctr">
+            <a:solidFill>
+              <a:srgbClr val="602651"/>
+            </a:solidFill>
+            <a:prstDash val="solid"/>
+            <a:miter lim="800000"/>
+            <a:tailEnd type="triangle"/>
+          </a:ln>
+          <a:effectLst/>
+        </p:spPr>
+      </p:cxnSp>
+      <p:sp>
+        <p:nvSpPr>
+          <p:cNvPr id="27" name="TextBox 26">
+            <a:extLst>
+              <a:ext uri="{FF2B5EF4-FFF2-40B4-BE49-F238E27FC236}">
+                <a16:creationId xmlns:a16="http://schemas.microsoft.com/office/drawing/2014/main" id="{030CE359-862B-0646-6203-4CC960B156A5}"/>
+              </a:ext>
+            </a:extLst>
+          </p:cNvPr>
+          <p:cNvSpPr txBox="1"/>
+          <p:nvPr/>
+        </p:nvSpPr>
+        <p:spPr>
+          <a:xfrm>
+            <a:off x="4870383" y="3361625"/>
+            <a:ext cx="683394" cy="369332"/>
+          </a:xfrm>
+          <a:prstGeom prst="rect">
+            <a:avLst/>
+          </a:prstGeom>
+          <a:noFill/>
+        </p:spPr>
+        <p:txBody>
+          <a:bodyPr wrap="square" rtlCol="0">
+            <a:spAutoFit/>
+          </a:bodyPr>
+          <a:lstStyle/>
+          <a:p>
+            <a:pPr marL="0" marR="0" lvl="0" indent="0" defTabSz="914400" eaLnBrk="1" fontAlgn="auto" latinLnBrk="0" hangingPunct="1">
+              <a:lnSpc>
+                <a:spcPct val="100000"/>
+              </a:lnSpc>
+              <a:spcBef>
+                <a:spcPts val="0"/>
+              </a:spcBef>
+              <a:spcAft>
+                <a:spcPts val="0"/>
+              </a:spcAft>
+              <a:buClrTx/>
+              <a:buSzTx/>
+              <a:buFontTx/>
+              <a:buNone/>
+              <a:tabLst/>
+              <a:defRPr/>
+            </a:pPr>
+            <a:r>
+              <a:rPr kumimoji="0" lang="en-US" sz="1800" b="0" i="0" u="none" strike="noStrike" kern="0" cap="none" spc="0" normalizeH="0" baseline="0" noProof="0" dirty="0">
+                <a:ln>
+                  <a:noFill/>
+                </a:ln>
+                <a:solidFill>
+                  <a:srgbClr val="163861"/>
+                </a:solidFill>
+                <a:effectLst/>
+                <a:uLnTx/>
+                <a:uFillTx/>
+              </a:rPr>
+              <a:t>POST</a:t>
+            </a:r>
+            <a:endParaRPr kumimoji="0" lang="en-SE" sz="1800" b="0" i="0" u="none" strike="noStrike" kern="0" cap="none" spc="0" normalizeH="0" baseline="0" noProof="0" dirty="0">
+              <a:ln>
+                <a:noFill/>
+              </a:ln>
+              <a:solidFill>
+                <a:srgbClr val="163861"/>
+              </a:solidFill>
+              <a:effectLst/>
+              <a:uLnTx/>
+              <a:uFillTx/>
+            </a:endParaRPr>
+          </a:p>
+        </p:txBody>
+      </p:sp>
+      <p:sp>
+        <p:nvSpPr>
+          <p:cNvPr id="28" name="TextBox 27">
+            <a:extLst>
+              <a:ext uri="{FF2B5EF4-FFF2-40B4-BE49-F238E27FC236}">
+                <a16:creationId xmlns:a16="http://schemas.microsoft.com/office/drawing/2014/main" id="{E34252CB-26AF-1382-E64D-3DD97B6D4138}"/>
+              </a:ext>
+            </a:extLst>
+          </p:cNvPr>
+          <p:cNvSpPr txBox="1"/>
+          <p:nvPr/>
+        </p:nvSpPr>
+        <p:spPr>
+          <a:xfrm>
+            <a:off x="6048081" y="5979842"/>
+            <a:ext cx="683394" cy="369332"/>
+          </a:xfrm>
+          <a:prstGeom prst="rect">
+            <a:avLst/>
+          </a:prstGeom>
+          <a:noFill/>
+        </p:spPr>
+        <p:txBody>
+          <a:bodyPr wrap="square" rtlCol="0">
+            <a:spAutoFit/>
+          </a:bodyPr>
+          <a:lstStyle/>
+          <a:p>
+            <a:pPr marL="0" marR="0" lvl="0" indent="0" defTabSz="914400" eaLnBrk="1" fontAlgn="auto" latinLnBrk="0" hangingPunct="1">
+              <a:lnSpc>
+                <a:spcPct val="100000"/>
+              </a:lnSpc>
+              <a:spcBef>
+                <a:spcPts val="0"/>
+              </a:spcBef>
+              <a:spcAft>
+                <a:spcPts val="0"/>
+              </a:spcAft>
+              <a:buClrTx/>
+              <a:buSzTx/>
+              <a:buFontTx/>
+              <a:buNone/>
+              <a:tabLst/>
+              <a:defRPr/>
+            </a:pPr>
+            <a:r>
+              <a:rPr kumimoji="0" lang="en-US" sz="1800" b="0" i="0" u="none" strike="noStrike" kern="0" cap="none" spc="0" normalizeH="0" baseline="0" noProof="0" dirty="0">
+                <a:ln>
+                  <a:noFill/>
+                </a:ln>
+                <a:solidFill>
+                  <a:srgbClr val="163861"/>
+                </a:solidFill>
+                <a:effectLst/>
+                <a:uLnTx/>
+                <a:uFillTx/>
+              </a:rPr>
+              <a:t>GET</a:t>
+            </a:r>
+            <a:endParaRPr kumimoji="0" lang="en-SE" sz="1800" b="0" i="0" u="none" strike="noStrike" kern="0" cap="none" spc="0" normalizeH="0" baseline="0" noProof="0" dirty="0">
+              <a:ln>
+                <a:noFill/>
+              </a:ln>
+              <a:solidFill>
+                <a:srgbClr val="163861"/>
+              </a:solidFill>
+              <a:effectLst/>
+              <a:uLnTx/>
+              <a:uFillTx/>
+            </a:endParaRPr>
+          </a:p>
+        </p:txBody>
+      </p:sp>
+      <p:sp>
+        <p:nvSpPr>
+          <p:cNvPr id="29" name="TextBox 28">
+            <a:extLst>
+              <a:ext uri="{FF2B5EF4-FFF2-40B4-BE49-F238E27FC236}">
+                <a16:creationId xmlns:a16="http://schemas.microsoft.com/office/drawing/2014/main" id="{E20A6CD7-17BD-5E89-43FE-60C3C3949BF7}"/>
+              </a:ext>
+            </a:extLst>
+          </p:cNvPr>
+          <p:cNvSpPr txBox="1"/>
+          <p:nvPr/>
+        </p:nvSpPr>
+        <p:spPr>
+          <a:xfrm>
+            <a:off x="4561040" y="3755265"/>
+            <a:ext cx="1425873" cy="369332"/>
+          </a:xfrm>
+          <a:prstGeom prst="rect">
+            <a:avLst/>
+          </a:prstGeom>
+          <a:noFill/>
+        </p:spPr>
+        <p:txBody>
+          <a:bodyPr wrap="square" rtlCol="0">
+            <a:spAutoFit/>
+          </a:bodyPr>
+          <a:lstStyle/>
+          <a:p>
+            <a:pPr marL="0" marR="0" lvl="0" indent="0" defTabSz="914400" eaLnBrk="1" fontAlgn="auto" latinLnBrk="0" hangingPunct="1">
+              <a:lnSpc>
+                <a:spcPct val="100000"/>
+              </a:lnSpc>
+              <a:spcBef>
+                <a:spcPts val="0"/>
+              </a:spcBef>
+              <a:spcAft>
+                <a:spcPts val="0"/>
+              </a:spcAft>
+              <a:buClrTx/>
+              <a:buSzTx/>
+              <a:buFontTx/>
+              <a:buNone/>
+              <a:tabLst/>
+              <a:defRPr/>
+            </a:pPr>
+            <a:r>
+              <a:rPr kumimoji="0" lang="en-US" sz="1800" b="0" i="0" u="none" strike="noStrike" kern="0" cap="none" spc="0" normalizeH="0" baseline="0" noProof="0" dirty="0">
+                <a:ln>
+                  <a:noFill/>
+                </a:ln>
+                <a:solidFill>
+                  <a:srgbClr val="163861"/>
+                </a:solidFill>
+                <a:effectLst/>
+                <a:uLnTx/>
+                <a:uFillTx/>
+              </a:rPr>
+              <a:t>GET - status</a:t>
+            </a:r>
+            <a:endParaRPr kumimoji="0" lang="en-SE" sz="1800" b="0" i="0" u="none" strike="noStrike" kern="0" cap="none" spc="0" normalizeH="0" baseline="0" noProof="0" dirty="0">
+              <a:ln>
+                <a:noFill/>
+              </a:ln>
+              <a:solidFill>
+                <a:srgbClr val="163861"/>
+              </a:solidFill>
+              <a:effectLst/>
+              <a:uLnTx/>
+              <a:uFillTx/>
+            </a:endParaRPr>
+          </a:p>
+        </p:txBody>
+      </p:sp>
+      <p:sp>
+        <p:nvSpPr>
+          <p:cNvPr id="30" name="TextBox 29">
+            <a:extLst>
+              <a:ext uri="{FF2B5EF4-FFF2-40B4-BE49-F238E27FC236}">
+                <a16:creationId xmlns:a16="http://schemas.microsoft.com/office/drawing/2014/main" id="{D3F11D45-B7FC-BA99-0192-C47C12D0419D}"/>
+              </a:ext>
+            </a:extLst>
+          </p:cNvPr>
+          <p:cNvSpPr txBox="1"/>
+          <p:nvPr/>
+        </p:nvSpPr>
+        <p:spPr>
+          <a:xfrm>
+            <a:off x="4549635" y="4165961"/>
+            <a:ext cx="1425873" cy="369332"/>
+          </a:xfrm>
+          <a:prstGeom prst="rect">
+            <a:avLst/>
+          </a:prstGeom>
+          <a:noFill/>
+        </p:spPr>
+        <p:txBody>
+          <a:bodyPr wrap="square" rtlCol="0">
+            <a:spAutoFit/>
+          </a:bodyPr>
+          <a:lstStyle/>
+          <a:p>
+            <a:pPr marL="0" marR="0" lvl="0" indent="0" defTabSz="914400" eaLnBrk="1" fontAlgn="auto" latinLnBrk="0" hangingPunct="1">
+              <a:lnSpc>
+                <a:spcPct val="100000"/>
+              </a:lnSpc>
+              <a:spcBef>
+                <a:spcPts val="0"/>
+              </a:spcBef>
+              <a:spcAft>
+                <a:spcPts val="0"/>
+              </a:spcAft>
+              <a:buClrTx/>
+              <a:buSzTx/>
+              <a:buFontTx/>
+              <a:buNone/>
+              <a:tabLst/>
+              <a:defRPr/>
+            </a:pPr>
+            <a:r>
+              <a:rPr kumimoji="0" lang="en-US" sz="1800" b="0" i="0" u="none" strike="noStrike" kern="0" cap="none" spc="0" normalizeH="0" baseline="0" noProof="0" dirty="0">
+                <a:ln>
+                  <a:noFill/>
+                </a:ln>
+                <a:solidFill>
+                  <a:srgbClr val="163861"/>
+                </a:solidFill>
+                <a:effectLst/>
+                <a:uLnTx/>
+                <a:uFillTx/>
+              </a:rPr>
+              <a:t>GET - status</a:t>
+            </a:r>
+            <a:endParaRPr kumimoji="0" lang="en-SE" sz="1800" b="0" i="0" u="none" strike="noStrike" kern="0" cap="none" spc="0" normalizeH="0" baseline="0" noProof="0" dirty="0">
+              <a:ln>
+                <a:noFill/>
+              </a:ln>
+              <a:solidFill>
+                <a:srgbClr val="163861"/>
+              </a:solidFill>
+              <a:effectLst/>
+              <a:uLnTx/>
+              <a:uFillTx/>
+            </a:endParaRPr>
+          </a:p>
+        </p:txBody>
+      </p:sp>
+      <p:sp>
+        <p:nvSpPr>
+          <p:cNvPr id="31" name="Rectangle: Rounded Corners 30">
+            <a:extLst>
+              <a:ext uri="{FF2B5EF4-FFF2-40B4-BE49-F238E27FC236}">
+                <a16:creationId xmlns:a16="http://schemas.microsoft.com/office/drawing/2014/main" id="{13ED159F-760B-F430-63D9-8F43B0A368E6}"/>
+              </a:ext>
+            </a:extLst>
+          </p:cNvPr>
+          <p:cNvSpPr/>
+          <p:nvPr/>
+        </p:nvSpPr>
+        <p:spPr>
+          <a:xfrm>
+            <a:off x="1131596" y="3645189"/>
+            <a:ext cx="3172945" cy="622780"/>
+          </a:xfrm>
+          <a:prstGeom prst="roundRect">
+            <a:avLst/>
+          </a:prstGeom>
+          <a:solidFill>
+            <a:srgbClr val="602651"/>
+          </a:solidFill>
+          <a:ln w="12700" cap="flat" cmpd="sng" algn="ctr">
+            <a:solidFill>
+              <a:srgbClr val="602651">
+                <a:shade val="15000"/>
+              </a:srgbClr>
+            </a:solidFill>
+            <a:prstDash val="solid"/>
+            <a:miter lim="800000"/>
+          </a:ln>
+          <a:effectLst/>
+        </p:spPr>
+        <p:txBody>
+          <a:bodyPr rtlCol="0" anchor="ctr"/>
+          <a:lstStyle/>
+          <a:p>
+            <a:pPr marL="0" marR="0" lvl="0" indent="0" algn="ctr" defTabSz="914400" eaLnBrk="1" fontAlgn="auto" latinLnBrk="0" hangingPunct="1">
+              <a:lnSpc>
+                <a:spcPct val="100000"/>
+              </a:lnSpc>
+              <a:spcBef>
+                <a:spcPts val="0"/>
+              </a:spcBef>
+              <a:spcAft>
+                <a:spcPts val="0"/>
+              </a:spcAft>
+              <a:buClrTx/>
+              <a:buSzTx/>
+              <a:buFontTx/>
+              <a:buNone/>
+              <a:tabLst/>
+              <a:defRPr/>
+            </a:pPr>
+            <a:r>
+              <a:rPr kumimoji="0" lang="en-US" sz="1800" b="0" i="0" u="none" strike="noStrike" kern="0" cap="none" spc="0" normalizeH="0" baseline="0" noProof="0" dirty="0" err="1">
+                <a:ln>
+                  <a:noFill/>
+                </a:ln>
+                <a:solidFill>
+                  <a:srgbClr val="FFFFFF"/>
+                </a:solidFill>
+                <a:effectLst/>
+                <a:uLnTx/>
+                <a:uFillTx/>
+                <a:latin typeface="Calibri" panose="020F0502020204030204"/>
+                <a:ea typeface="+mn-ea"/>
+                <a:cs typeface="+mn-cs"/>
+              </a:rPr>
+              <a:t>MedicinalProductDefinition</a:t>
+            </a:r>
+            <a:endParaRPr kumimoji="0" lang="en-SE" sz="1800" b="0" i="0" u="none" strike="noStrike" kern="0" cap="none" spc="0" normalizeH="0" baseline="0" noProof="0" dirty="0">
+              <a:ln>
+                <a:noFill/>
+              </a:ln>
+              <a:solidFill>
+                <a:srgbClr val="FFFFFF"/>
+              </a:solidFill>
+              <a:effectLst/>
+              <a:uLnTx/>
+              <a:uFillTx/>
+              <a:latin typeface="Calibri" panose="020F0502020204030204"/>
+              <a:ea typeface="+mn-ea"/>
+              <a:cs typeface="+mn-cs"/>
+            </a:endParaRPr>
+          </a:p>
+        </p:txBody>
+      </p:sp>
+      <p:sp>
+        <p:nvSpPr>
+          <p:cNvPr id="33" name="Rectangle: Rounded Corners 32">
+            <a:extLst>
+              <a:ext uri="{FF2B5EF4-FFF2-40B4-BE49-F238E27FC236}">
+                <a16:creationId xmlns:a16="http://schemas.microsoft.com/office/drawing/2014/main" id="{6B0B2C9B-0D5C-FB39-205D-A133E45E6804}"/>
+              </a:ext>
+            </a:extLst>
+          </p:cNvPr>
+          <p:cNvSpPr/>
+          <p:nvPr/>
+        </p:nvSpPr>
+        <p:spPr>
+          <a:xfrm>
+            <a:off x="1614518" y="4379435"/>
+            <a:ext cx="2227251" cy="622780"/>
+          </a:xfrm>
+          <a:prstGeom prst="roundRect">
+            <a:avLst/>
+          </a:prstGeom>
+          <a:gradFill rotWithShape="1">
+            <a:gsLst>
+              <a:gs pos="0">
+                <a:srgbClr val="77C5B1">
+                  <a:satMod val="103000"/>
+                  <a:lumMod val="102000"/>
+                  <a:tint val="94000"/>
+                </a:srgbClr>
+              </a:gs>
+              <a:gs pos="50000">
+                <a:srgbClr val="77C5B1">
+                  <a:satMod val="110000"/>
+                  <a:lumMod val="100000"/>
+                  <a:shade val="100000"/>
+                </a:srgbClr>
+              </a:gs>
+              <a:gs pos="100000">
+                <a:srgbClr val="77C5B1">
+                  <a:lumMod val="99000"/>
+                  <a:satMod val="120000"/>
+                  <a:shade val="78000"/>
+                </a:srgbClr>
+              </a:gs>
+            </a:gsLst>
+            <a:lin ang="5400000" scaled="0"/>
+          </a:gradFill>
+          <a:ln w="6350" cap="flat" cmpd="sng" algn="ctr">
+            <a:solidFill>
+              <a:srgbClr val="77C5B1"/>
+            </a:solidFill>
+            <a:prstDash val="solid"/>
+            <a:miter lim="800000"/>
+          </a:ln>
+          <a:effectLst/>
+        </p:spPr>
+        <p:txBody>
+          <a:bodyPr rtlCol="0" anchor="ctr"/>
+          <a:lstStyle/>
+          <a:p>
+            <a:pPr marL="0" marR="0" lvl="0" indent="0" algn="ctr" defTabSz="914400" eaLnBrk="1" fontAlgn="auto" latinLnBrk="0" hangingPunct="1">
+              <a:lnSpc>
+                <a:spcPct val="100000"/>
+              </a:lnSpc>
+              <a:spcBef>
+                <a:spcPts val="0"/>
+              </a:spcBef>
+              <a:spcAft>
+                <a:spcPts val="0"/>
+              </a:spcAft>
+              <a:buClrTx/>
+              <a:buSzTx/>
+              <a:buFontTx/>
+              <a:buNone/>
+              <a:tabLst/>
+              <a:defRPr/>
+            </a:pPr>
+            <a:r>
+              <a:rPr kumimoji="0" lang="en-US" sz="1800" b="0" i="0" u="none" strike="noStrike" kern="0" cap="none" spc="0" normalizeH="0" baseline="0" noProof="0" dirty="0">
+                <a:ln>
+                  <a:noFill/>
+                </a:ln>
+                <a:solidFill>
+                  <a:srgbClr val="FFFFFF"/>
+                </a:solidFill>
+                <a:effectLst/>
+                <a:uLnTx/>
+                <a:uFillTx/>
+                <a:latin typeface="Calibri" panose="020F0502020204030204"/>
+                <a:ea typeface="+mn-ea"/>
+                <a:cs typeface="+mn-cs"/>
+              </a:rPr>
+              <a:t>Ingredient</a:t>
+            </a:r>
+            <a:endParaRPr kumimoji="0" lang="en-SE" sz="1800" b="0" i="0" u="none" strike="noStrike" kern="0" cap="none" spc="0" normalizeH="0" baseline="0" noProof="0" dirty="0">
+              <a:ln>
+                <a:noFill/>
+              </a:ln>
+              <a:solidFill>
+                <a:srgbClr val="FFFFFF"/>
+              </a:solidFill>
+              <a:effectLst/>
+              <a:uLnTx/>
+              <a:uFillTx/>
+              <a:latin typeface="Calibri" panose="020F0502020204030204"/>
+              <a:ea typeface="+mn-ea"/>
+              <a:cs typeface="+mn-cs"/>
+            </a:endParaRPr>
+          </a:p>
+        </p:txBody>
+      </p:sp>
+      <p:sp>
+        <p:nvSpPr>
+          <p:cNvPr id="34" name="Rectangle: Rounded Corners 33">
+            <a:extLst>
+              <a:ext uri="{FF2B5EF4-FFF2-40B4-BE49-F238E27FC236}">
+                <a16:creationId xmlns:a16="http://schemas.microsoft.com/office/drawing/2014/main" id="{0631AF96-80D9-F329-C57F-B632E95E905A}"/>
+              </a:ext>
+            </a:extLst>
+          </p:cNvPr>
+          <p:cNvSpPr/>
+          <p:nvPr/>
+        </p:nvSpPr>
+        <p:spPr>
+          <a:xfrm>
+            <a:off x="8734133" y="3813016"/>
+            <a:ext cx="3352054" cy="622780"/>
+          </a:xfrm>
+          <a:prstGeom prst="roundRect">
+            <a:avLst/>
+          </a:prstGeom>
+          <a:solidFill>
+            <a:srgbClr val="163861"/>
+          </a:solidFill>
+          <a:ln w="12700" cap="flat" cmpd="sng" algn="ctr">
+            <a:solidFill>
+              <a:srgbClr val="602651">
+                <a:shade val="15000"/>
+              </a:srgbClr>
+            </a:solidFill>
+            <a:prstDash val="solid"/>
+            <a:miter lim="800000"/>
+          </a:ln>
+          <a:effectLst/>
+        </p:spPr>
+        <p:txBody>
+          <a:bodyPr rtlCol="0" anchor="ctr"/>
+          <a:lstStyle/>
+          <a:p>
+            <a:pPr marL="0" marR="0" lvl="0" indent="0" algn="ctr" defTabSz="914400" eaLnBrk="1" fontAlgn="auto" latinLnBrk="0" hangingPunct="1">
+              <a:lnSpc>
+                <a:spcPct val="100000"/>
+              </a:lnSpc>
+              <a:spcBef>
+                <a:spcPts val="0"/>
+              </a:spcBef>
+              <a:spcAft>
+                <a:spcPts val="0"/>
+              </a:spcAft>
+              <a:buClrTx/>
+              <a:buSzTx/>
+              <a:buFontTx/>
+              <a:buNone/>
+              <a:tabLst/>
+              <a:defRPr/>
+            </a:pPr>
+            <a:r>
+              <a:rPr kumimoji="0" lang="en-US" sz="1800" b="0" i="0" u="none" strike="noStrike" kern="0" cap="none" spc="0" normalizeH="0" baseline="0" noProof="0" dirty="0" err="1">
+                <a:ln>
+                  <a:noFill/>
+                </a:ln>
+                <a:solidFill>
+                  <a:srgbClr val="FFFFFF"/>
+                </a:solidFill>
+                <a:effectLst/>
+                <a:uLnTx/>
+                <a:uFillTx/>
+                <a:latin typeface="Calibri" panose="020F0502020204030204"/>
+                <a:ea typeface="+mn-ea"/>
+                <a:cs typeface="+mn-cs"/>
+              </a:rPr>
+              <a:t>AdministrableProductDefinition</a:t>
+            </a:r>
+            <a:endParaRPr kumimoji="0" lang="en-US" sz="1800" b="0" i="0" u="none" strike="noStrike" kern="0" cap="none" spc="0" normalizeH="0" baseline="0" noProof="0" dirty="0">
+              <a:ln>
+                <a:noFill/>
+              </a:ln>
+              <a:solidFill>
+                <a:srgbClr val="FFFFFF"/>
+              </a:solidFill>
+              <a:effectLst/>
+              <a:uLnTx/>
+              <a:uFillTx/>
+              <a:latin typeface="Calibri" panose="020F0502020204030204"/>
+              <a:ea typeface="+mn-ea"/>
+              <a:cs typeface="+mn-cs"/>
+            </a:endParaRPr>
+          </a:p>
+          <a:p>
+            <a:pPr marL="0" marR="0" lvl="0" indent="0" algn="ctr" defTabSz="914400" eaLnBrk="1" fontAlgn="auto" latinLnBrk="0" hangingPunct="1">
+              <a:lnSpc>
+                <a:spcPct val="100000"/>
+              </a:lnSpc>
+              <a:spcBef>
+                <a:spcPts val="0"/>
+              </a:spcBef>
+              <a:spcAft>
+                <a:spcPts val="0"/>
+              </a:spcAft>
+              <a:buClrTx/>
+              <a:buSzTx/>
+              <a:buFontTx/>
+              <a:buNone/>
+              <a:tabLst/>
+              <a:defRPr/>
+            </a:pPr>
+            <a:r>
+              <a:rPr kumimoji="0" lang="en-US" sz="1800" b="0" i="0" u="none" strike="noStrike" kern="0" cap="none" spc="0" normalizeH="0" baseline="0" noProof="0" dirty="0">
+                <a:ln>
+                  <a:noFill/>
+                </a:ln>
+                <a:solidFill>
+                  <a:srgbClr val="FFFFFF"/>
+                </a:solidFill>
+                <a:effectLst/>
+                <a:uLnTx/>
+                <a:uFillTx/>
+                <a:latin typeface="Calibri" panose="020F0502020204030204"/>
+                <a:ea typeface="+mn-ea"/>
+                <a:cs typeface="+mn-cs"/>
+              </a:rPr>
+              <a:t>(PhPID)</a:t>
+            </a:r>
+            <a:endParaRPr kumimoji="0" lang="en-SE" sz="1800" b="0" i="0" u="none" strike="noStrike" kern="0" cap="none" spc="0" normalizeH="0" baseline="0" noProof="0" dirty="0">
+              <a:ln>
+                <a:noFill/>
+              </a:ln>
+              <a:solidFill>
+                <a:srgbClr val="FFFFFF"/>
+              </a:solidFill>
+              <a:effectLst/>
+              <a:uLnTx/>
+              <a:uFillTx/>
+              <a:latin typeface="Calibri" panose="020F0502020204030204"/>
+              <a:ea typeface="+mn-ea"/>
+              <a:cs typeface="+mn-cs"/>
+            </a:endParaRPr>
+          </a:p>
+        </p:txBody>
+      </p:sp>
+      <p:sp>
+        <p:nvSpPr>
+          <p:cNvPr id="35" name="TextBox 34">
+            <a:extLst>
+              <a:ext uri="{FF2B5EF4-FFF2-40B4-BE49-F238E27FC236}">
+                <a16:creationId xmlns:a16="http://schemas.microsoft.com/office/drawing/2014/main" id="{3AF6F818-1278-64EB-0DEC-0B0F67E1219F}"/>
+              </a:ext>
+            </a:extLst>
+          </p:cNvPr>
+          <p:cNvSpPr txBox="1"/>
+          <p:nvPr/>
+        </p:nvSpPr>
+        <p:spPr>
+          <a:xfrm>
+            <a:off x="7602449" y="3714395"/>
+            <a:ext cx="899740" cy="369332"/>
+          </a:xfrm>
+          <a:prstGeom prst="rect">
+            <a:avLst/>
+          </a:prstGeom>
+          <a:noFill/>
+        </p:spPr>
+        <p:txBody>
+          <a:bodyPr wrap="square" rtlCol="0">
+            <a:spAutoFit/>
+          </a:bodyPr>
+          <a:lstStyle/>
+          <a:p>
+            <a:pPr marL="0" marR="0" lvl="0" indent="0" defTabSz="914400" eaLnBrk="1" fontAlgn="auto" latinLnBrk="0" hangingPunct="1">
+              <a:lnSpc>
+                <a:spcPct val="100000"/>
+              </a:lnSpc>
+              <a:spcBef>
+                <a:spcPts val="0"/>
+              </a:spcBef>
+              <a:spcAft>
+                <a:spcPts val="0"/>
+              </a:spcAft>
+              <a:buClrTx/>
+              <a:buSzTx/>
+              <a:buFontTx/>
+              <a:buNone/>
+              <a:tabLst/>
+              <a:defRPr/>
+            </a:pPr>
+            <a:r>
+              <a:rPr kumimoji="0" lang="en-US" sz="1800" b="0" i="0" u="none" strike="noStrike" kern="0" cap="none" spc="0" normalizeH="0" baseline="0" noProof="0" dirty="0">
+                <a:ln>
+                  <a:noFill/>
+                </a:ln>
+                <a:solidFill>
+                  <a:srgbClr val="163861"/>
+                </a:solidFill>
+                <a:effectLst/>
+                <a:uLnTx/>
+                <a:uFillTx/>
+              </a:rPr>
+              <a:t>Publish</a:t>
+            </a:r>
+            <a:endParaRPr kumimoji="0" lang="en-SE" sz="1800" b="0" i="0" u="none" strike="noStrike" kern="0" cap="none" spc="0" normalizeH="0" baseline="0" noProof="0" dirty="0">
+              <a:ln>
+                <a:noFill/>
+              </a:ln>
+              <a:solidFill>
+                <a:srgbClr val="163861"/>
+              </a:solidFill>
+              <a:effectLst/>
+              <a:uLnTx/>
+              <a:uFillTx/>
+            </a:endParaRPr>
+          </a:p>
+        </p:txBody>
+      </p:sp>
+      <p:sp>
+        <p:nvSpPr>
+          <p:cNvPr id="2" name="Oval 1">
+            <a:extLst>
+              <a:ext uri="{FF2B5EF4-FFF2-40B4-BE49-F238E27FC236}">
+                <a16:creationId xmlns:a16="http://schemas.microsoft.com/office/drawing/2014/main" id="{833FAF6A-9DC3-0655-8427-FF42F0FA272F}"/>
+              </a:ext>
+            </a:extLst>
+          </p:cNvPr>
+          <p:cNvSpPr/>
+          <p:nvPr/>
+        </p:nvSpPr>
+        <p:spPr>
+          <a:xfrm>
+            <a:off x="925172" y="4350627"/>
+            <a:ext cx="597159" cy="547943"/>
+          </a:xfrm>
+          <a:prstGeom prst="ellipse">
+            <a:avLst/>
+          </a:prstGeom>
+        </p:spPr>
+        <p:style>
+          <a:lnRef idx="2">
+            <a:schemeClr val="dk1"/>
+          </a:lnRef>
+          <a:fillRef idx="1">
+            <a:schemeClr val="lt1"/>
+          </a:fillRef>
+          <a:effectRef idx="0">
+            <a:schemeClr val="dk1"/>
+          </a:effectRef>
+          <a:fontRef idx="minor">
+            <a:schemeClr val="dk1"/>
+          </a:fontRef>
+        </p:style>
+        <p:txBody>
+          <a:bodyPr rtlCol="0" anchor="ctr"/>
+          <a:lstStyle/>
+          <a:p>
+            <a:pPr algn="ctr"/>
+            <a:r>
+              <a:rPr lang="en-US" dirty="0"/>
+              <a:t>1</a:t>
+            </a:r>
+            <a:endParaRPr lang="en-SE" dirty="0"/>
+          </a:p>
+        </p:txBody>
+      </p:sp>
+      <p:sp>
+        <p:nvSpPr>
+          <p:cNvPr id="3" name="Oval 2">
+            <a:extLst>
+              <a:ext uri="{FF2B5EF4-FFF2-40B4-BE49-F238E27FC236}">
+                <a16:creationId xmlns:a16="http://schemas.microsoft.com/office/drawing/2014/main" id="{96A1E009-FAB8-9095-271E-878F7D82A925}"/>
+              </a:ext>
+            </a:extLst>
+          </p:cNvPr>
+          <p:cNvSpPr/>
+          <p:nvPr/>
+        </p:nvSpPr>
+        <p:spPr>
+          <a:xfrm>
+            <a:off x="2893805" y="2549662"/>
+            <a:ext cx="597159" cy="547943"/>
+          </a:xfrm>
+          <a:prstGeom prst="ellipse">
+            <a:avLst/>
+          </a:prstGeom>
+        </p:spPr>
+        <p:style>
+          <a:lnRef idx="2">
+            <a:schemeClr val="dk1"/>
+          </a:lnRef>
+          <a:fillRef idx="1">
+            <a:schemeClr val="lt1"/>
+          </a:fillRef>
+          <a:effectRef idx="0">
+            <a:schemeClr val="dk1"/>
+          </a:effectRef>
+          <a:fontRef idx="minor">
+            <a:schemeClr val="dk1"/>
+          </a:fontRef>
+        </p:style>
+        <p:txBody>
+          <a:bodyPr rtlCol="0" anchor="ctr"/>
+          <a:lstStyle/>
+          <a:p>
+            <a:pPr algn="ctr"/>
+            <a:r>
+              <a:rPr lang="en-US" dirty="0"/>
+              <a:t>2</a:t>
+            </a:r>
+            <a:endParaRPr lang="en-SE" dirty="0"/>
+          </a:p>
+        </p:txBody>
+      </p:sp>
+      <p:sp>
+        <p:nvSpPr>
+          <p:cNvPr id="4" name="Oval 3">
+            <a:extLst>
+              <a:ext uri="{FF2B5EF4-FFF2-40B4-BE49-F238E27FC236}">
+                <a16:creationId xmlns:a16="http://schemas.microsoft.com/office/drawing/2014/main" id="{E90FD837-239C-71EC-9058-5A6F196E2CCF}"/>
+              </a:ext>
+            </a:extLst>
+          </p:cNvPr>
+          <p:cNvSpPr/>
+          <p:nvPr/>
+        </p:nvSpPr>
+        <p:spPr>
+          <a:xfrm>
+            <a:off x="5123678" y="2781909"/>
+            <a:ext cx="597159" cy="547943"/>
+          </a:xfrm>
+          <a:prstGeom prst="ellipse">
+            <a:avLst/>
+          </a:prstGeom>
+        </p:spPr>
+        <p:style>
+          <a:lnRef idx="2">
+            <a:schemeClr val="dk1"/>
+          </a:lnRef>
+          <a:fillRef idx="1">
+            <a:schemeClr val="lt1"/>
+          </a:fillRef>
+          <a:effectRef idx="0">
+            <a:schemeClr val="dk1"/>
+          </a:effectRef>
+          <a:fontRef idx="minor">
+            <a:schemeClr val="dk1"/>
+          </a:fontRef>
+        </p:style>
+        <p:txBody>
+          <a:bodyPr rtlCol="0" anchor="ctr"/>
+          <a:lstStyle/>
+          <a:p>
+            <a:pPr algn="ctr"/>
+            <a:r>
+              <a:rPr lang="en-US" dirty="0"/>
+              <a:t>3</a:t>
+            </a:r>
+            <a:endParaRPr lang="en-SE" dirty="0"/>
+          </a:p>
+        </p:txBody>
+      </p:sp>
+      <p:sp>
+        <p:nvSpPr>
+          <p:cNvPr id="5" name="Oval 4">
+            <a:extLst>
+              <a:ext uri="{FF2B5EF4-FFF2-40B4-BE49-F238E27FC236}">
+                <a16:creationId xmlns:a16="http://schemas.microsoft.com/office/drawing/2014/main" id="{A04B9EC5-BE21-DE43-33AE-9652098EC279}"/>
+              </a:ext>
+            </a:extLst>
+          </p:cNvPr>
+          <p:cNvSpPr/>
+          <p:nvPr/>
+        </p:nvSpPr>
+        <p:spPr>
+          <a:xfrm>
+            <a:off x="5336460" y="4690825"/>
+            <a:ext cx="597159" cy="547943"/>
+          </a:xfrm>
+          <a:prstGeom prst="ellipse">
+            <a:avLst/>
+          </a:prstGeom>
+        </p:spPr>
+        <p:style>
+          <a:lnRef idx="2">
+            <a:schemeClr val="dk1"/>
+          </a:lnRef>
+          <a:fillRef idx="1">
+            <a:schemeClr val="lt1"/>
+          </a:fillRef>
+          <a:effectRef idx="0">
+            <a:schemeClr val="dk1"/>
+          </a:effectRef>
+          <a:fontRef idx="minor">
+            <a:schemeClr val="dk1"/>
+          </a:fontRef>
+        </p:style>
+        <p:txBody>
+          <a:bodyPr rtlCol="0" anchor="ctr"/>
+          <a:lstStyle/>
+          <a:p>
+            <a:pPr algn="ctr"/>
+            <a:r>
+              <a:rPr lang="en-US" dirty="0"/>
+              <a:t>4</a:t>
+            </a:r>
+            <a:endParaRPr lang="en-SE" dirty="0"/>
+          </a:p>
+        </p:txBody>
+      </p:sp>
+      <p:sp>
+        <p:nvSpPr>
+          <p:cNvPr id="6" name="Oval 5">
+            <a:extLst>
+              <a:ext uri="{FF2B5EF4-FFF2-40B4-BE49-F238E27FC236}">
+                <a16:creationId xmlns:a16="http://schemas.microsoft.com/office/drawing/2014/main" id="{0EB9319A-3A3C-A819-6B11-46A4767560F9}"/>
+              </a:ext>
+            </a:extLst>
+          </p:cNvPr>
+          <p:cNvSpPr/>
+          <p:nvPr/>
+        </p:nvSpPr>
+        <p:spPr>
+          <a:xfrm>
+            <a:off x="8430687" y="3165355"/>
+            <a:ext cx="597159" cy="547943"/>
+          </a:xfrm>
+          <a:prstGeom prst="ellipse">
+            <a:avLst/>
+          </a:prstGeom>
+        </p:spPr>
+        <p:style>
+          <a:lnRef idx="2">
+            <a:schemeClr val="dk1"/>
+          </a:lnRef>
+          <a:fillRef idx="1">
+            <a:schemeClr val="lt1"/>
+          </a:fillRef>
+          <a:effectRef idx="0">
+            <a:schemeClr val="dk1"/>
+          </a:effectRef>
+          <a:fontRef idx="minor">
+            <a:schemeClr val="dk1"/>
+          </a:fontRef>
+        </p:style>
+        <p:txBody>
+          <a:bodyPr rtlCol="0" anchor="ctr"/>
+          <a:lstStyle/>
+          <a:p>
+            <a:pPr algn="ctr"/>
+            <a:r>
+              <a:rPr lang="en-US" dirty="0"/>
+              <a:t>5</a:t>
+            </a:r>
+            <a:endParaRPr lang="en-SE" dirty="0"/>
+          </a:p>
+        </p:txBody>
+      </p:sp>
+      <p:sp>
+        <p:nvSpPr>
+          <p:cNvPr id="7" name="Oval 6">
+            <a:extLst>
+              <a:ext uri="{FF2B5EF4-FFF2-40B4-BE49-F238E27FC236}">
+                <a16:creationId xmlns:a16="http://schemas.microsoft.com/office/drawing/2014/main" id="{AAAF70DF-F125-5E1D-B717-5E583E4BB261}"/>
+              </a:ext>
+            </a:extLst>
+          </p:cNvPr>
+          <p:cNvSpPr/>
+          <p:nvPr/>
+        </p:nvSpPr>
+        <p:spPr>
+          <a:xfrm>
+            <a:off x="5422257" y="6051737"/>
+            <a:ext cx="597159" cy="547943"/>
+          </a:xfrm>
+          <a:prstGeom prst="ellipse">
+            <a:avLst/>
+          </a:prstGeom>
+        </p:spPr>
+        <p:style>
+          <a:lnRef idx="2">
+            <a:schemeClr val="dk1"/>
+          </a:lnRef>
+          <a:fillRef idx="1">
+            <a:schemeClr val="lt1"/>
+          </a:fillRef>
+          <a:effectRef idx="0">
+            <a:schemeClr val="dk1"/>
+          </a:effectRef>
+          <a:fontRef idx="minor">
+            <a:schemeClr val="dk1"/>
+          </a:fontRef>
+        </p:style>
+        <p:txBody>
+          <a:bodyPr rtlCol="0" anchor="ctr"/>
+          <a:lstStyle/>
+          <a:p>
+            <a:pPr algn="ctr"/>
+            <a:r>
+              <a:rPr lang="en-US" dirty="0"/>
+              <a:t>6</a:t>
+            </a:r>
+            <a:endParaRPr lang="en-SE" dirty="0"/>
+          </a:p>
+        </p:txBody>
+      </p:sp>
+      <p:sp>
+        <p:nvSpPr>
+          <p:cNvPr id="8" name="Title 7">
+            <a:extLst>
+              <a:ext uri="{FF2B5EF4-FFF2-40B4-BE49-F238E27FC236}">
+                <a16:creationId xmlns:a16="http://schemas.microsoft.com/office/drawing/2014/main" id="{13F19C36-24C6-17C2-84D9-DE2ACE70754A}"/>
+              </a:ext>
+            </a:extLst>
+          </p:cNvPr>
+          <p:cNvSpPr>
+            <a:spLocks noGrp="1"/>
+          </p:cNvSpPr>
+          <p:nvPr>
+            <p:ph type="title"/>
+          </p:nvPr>
+        </p:nvSpPr>
+        <p:spPr/>
+        <p:txBody>
+          <a:bodyPr/>
+          <a:lstStyle/>
+          <a:p>
+            <a:r>
+              <a:rPr lang="en-US" dirty="0"/>
+              <a:t>Extended</a:t>
+            </a:r>
+            <a:endParaRPr lang="en-SE" dirty="0"/>
+          </a:p>
+        </p:txBody>
+      </p:sp>
+      <p:sp>
+        <p:nvSpPr>
+          <p:cNvPr id="9" name="Rectangle: Rounded Corners 8">
+            <a:extLst>
+              <a:ext uri="{FF2B5EF4-FFF2-40B4-BE49-F238E27FC236}">
+                <a16:creationId xmlns:a16="http://schemas.microsoft.com/office/drawing/2014/main" id="{2025CDEF-990F-A148-B7DF-AB5DB046D894}"/>
+              </a:ext>
+            </a:extLst>
+          </p:cNvPr>
+          <p:cNvSpPr/>
+          <p:nvPr/>
+        </p:nvSpPr>
+        <p:spPr>
+          <a:xfrm>
+            <a:off x="1604442" y="5151790"/>
+            <a:ext cx="2237327" cy="622780"/>
+          </a:xfrm>
+          <a:prstGeom prst="roundRect">
+            <a:avLst/>
+          </a:prstGeom>
+          <a:ln/>
+        </p:spPr>
+        <p:style>
+          <a:lnRef idx="1">
+            <a:schemeClr val="accent3"/>
+          </a:lnRef>
+          <a:fillRef idx="2">
+            <a:schemeClr val="accent3"/>
+          </a:fillRef>
+          <a:effectRef idx="1">
+            <a:schemeClr val="accent3"/>
+          </a:effectRef>
+          <a:fontRef idx="minor">
+            <a:schemeClr val="dk1"/>
+          </a:fontRef>
+        </p:style>
+        <p:txBody>
+          <a:bodyPr rtlCol="0" anchor="ctr"/>
+          <a:lstStyle/>
+          <a:p>
+            <a:pPr marL="0" marR="0" lvl="0" indent="0" algn="ctr" defTabSz="914400" eaLnBrk="1" fontAlgn="auto" latinLnBrk="0" hangingPunct="1">
+              <a:lnSpc>
+                <a:spcPct val="100000"/>
+              </a:lnSpc>
+              <a:spcBef>
+                <a:spcPts val="0"/>
+              </a:spcBef>
+              <a:spcAft>
+                <a:spcPts val="0"/>
+              </a:spcAft>
+              <a:buClrTx/>
+              <a:buSzTx/>
+              <a:buFontTx/>
+              <a:buNone/>
+              <a:tabLst/>
+              <a:defRPr/>
+            </a:pPr>
+            <a:r>
+              <a:rPr kumimoji="0" lang="en-US" sz="1800" b="0" i="0" u="none" strike="noStrike" kern="0" cap="none" spc="0" normalizeH="0" baseline="0" noProof="0" dirty="0">
+                <a:ln>
+                  <a:noFill/>
+                </a:ln>
+                <a:solidFill>
+                  <a:srgbClr val="FFFFFF"/>
+                </a:solidFill>
+                <a:effectLst/>
+                <a:uLnTx/>
+                <a:uFillTx/>
+                <a:latin typeface="Calibri" panose="020F0502020204030204"/>
+                <a:ea typeface="+mn-ea"/>
+                <a:cs typeface="+mn-cs"/>
+              </a:rPr>
+              <a:t>Organization</a:t>
+            </a:r>
+            <a:endParaRPr kumimoji="0" lang="en-SE" sz="1800" b="0" i="0" u="none" strike="noStrike" kern="0" cap="none" spc="0" normalizeH="0" baseline="0" noProof="0" dirty="0">
+              <a:ln>
+                <a:noFill/>
+              </a:ln>
+              <a:solidFill>
+                <a:srgbClr val="FFFFFF"/>
+              </a:solidFill>
+              <a:effectLst/>
+              <a:uLnTx/>
+              <a:uFillTx/>
+              <a:latin typeface="Calibri" panose="020F0502020204030204"/>
+              <a:ea typeface="+mn-ea"/>
+              <a:cs typeface="+mn-cs"/>
+            </a:endParaRPr>
+          </a:p>
+        </p:txBody>
+      </p:sp>
+    </p:spTree>
+    <p:extLst>
+      <p:ext uri="{BB962C8B-B14F-4D97-AF65-F5344CB8AC3E}">
+        <p14:creationId xmlns:p14="http://schemas.microsoft.com/office/powerpoint/2010/main" val="4104755876"/>
+      </p:ext>
+    </p:extLst>
+  </p:cSld>
+  <p:clrMapOvr>
+    <a:masterClrMapping/>
+  </p:clrMapOvr>
+  <p:timing>
+    <p:tnLst>
+      <p:par>
+        <p:cTn id="1" dur="indefinite" restart="never" nodeType="tmRoot">
+          <p:childTnLst>
+            <p:seq concurrent="1" nextAc="seek">
+              <p:cTn id="2" dur="indefinite" nodeType="mainSeq">
+                <p:childTnLst>
+                  <p:par>
+                    <p:cTn id="3" fill="hold">
+                      <p:stCondLst>
+                        <p:cond delay="indefinite"/>
+                      </p:stCondLst>
+                      <p:childTnLst>
+                        <p:par>
+                          <p:cTn id="4" fill="hold">
+                            <p:stCondLst>
+                              <p:cond delay="0"/>
+                            </p:stCondLst>
+                            <p:childTnLst>
+                              <p:par>
+                                <p:cTn id="5" presetID="1" presetClass="entr" presetSubtype="0" fill="hold" grpId="0" nodeType="clickEffect">
+                                  <p:stCondLst>
+                                    <p:cond delay="0"/>
+                                  </p:stCondLst>
+                                  <p:childTnLst>
+                                    <p:set>
+                                      <p:cBhvr>
+                                        <p:cTn id="6" dur="1" fill="hold">
+                                          <p:stCondLst>
+                                            <p:cond delay="0"/>
+                                          </p:stCondLst>
+                                        </p:cTn>
+                                        <p:tgtEl>
+                                          <p:spTgt spid="31"/>
+                                        </p:tgtEl>
+                                        <p:attrNameLst>
+                                          <p:attrName>style.visibility</p:attrName>
+                                        </p:attrNameLst>
+                                      </p:cBhvr>
+                                      <p:to>
+                                        <p:strVal val="visible"/>
+                                      </p:to>
+                                    </p:set>
+                                  </p:childTnLst>
+                                </p:cTn>
+                              </p:par>
+                              <p:par>
+                                <p:cTn id="7" presetID="1" presetClass="entr" presetSubtype="0" fill="hold" grpId="0" nodeType="withEffect">
+                                  <p:stCondLst>
+                                    <p:cond delay="0"/>
+                                  </p:stCondLst>
+                                  <p:childTnLst>
+                                    <p:set>
+                                      <p:cBhvr>
+                                        <p:cTn id="8" dur="1" fill="hold">
+                                          <p:stCondLst>
+                                            <p:cond delay="0"/>
+                                          </p:stCondLst>
+                                        </p:cTn>
+                                        <p:tgtEl>
+                                          <p:spTgt spid="33"/>
+                                        </p:tgtEl>
+                                        <p:attrNameLst>
+                                          <p:attrName>style.visibility</p:attrName>
+                                        </p:attrNameLst>
+                                      </p:cBhvr>
+                                      <p:to>
+                                        <p:strVal val="visible"/>
+                                      </p:to>
+                                    </p:set>
+                                  </p:childTnLst>
+                                </p:cTn>
+                              </p:par>
+                            </p:childTnLst>
+                          </p:cTn>
+                        </p:par>
+                      </p:childTnLst>
+                    </p:cTn>
+                  </p:par>
+                  <p:par>
+                    <p:cTn id="9" fill="hold">
+                      <p:stCondLst>
+                        <p:cond delay="indefinite"/>
+                      </p:stCondLst>
+                      <p:childTnLst>
+                        <p:par>
+                          <p:cTn id="10" fill="hold">
+                            <p:stCondLst>
+                              <p:cond delay="0"/>
+                            </p:stCondLst>
+                            <p:childTnLst>
+                              <p:par>
+                                <p:cTn id="11" presetID="1" presetClass="entr" presetSubtype="0" fill="hold" grpId="0" nodeType="clickEffect">
+                                  <p:stCondLst>
+                                    <p:cond delay="0"/>
+                                  </p:stCondLst>
+                                  <p:childTnLst>
+                                    <p:set>
+                                      <p:cBhvr>
+                                        <p:cTn id="12" dur="1" fill="hold">
+                                          <p:stCondLst>
+                                            <p:cond delay="0"/>
+                                          </p:stCondLst>
+                                        </p:cTn>
+                                        <p:tgtEl>
+                                          <p:spTgt spid="20"/>
+                                        </p:tgtEl>
+                                        <p:attrNameLst>
+                                          <p:attrName>style.visibility</p:attrName>
+                                        </p:attrNameLst>
+                                      </p:cBhvr>
+                                      <p:to>
+                                        <p:strVal val="visible"/>
+                                      </p:to>
+                                    </p:set>
+                                  </p:childTnLst>
+                                </p:cTn>
+                              </p:par>
+                            </p:childTnLst>
+                          </p:cTn>
+                        </p:par>
+                      </p:childTnLst>
+                    </p:cTn>
+                  </p:par>
+                  <p:par>
+                    <p:cTn id="13" fill="hold">
+                      <p:stCondLst>
+                        <p:cond delay="indefinite"/>
+                      </p:stCondLst>
+                      <p:childTnLst>
+                        <p:par>
+                          <p:cTn id="14" fill="hold">
+                            <p:stCondLst>
+                              <p:cond delay="0"/>
+                            </p:stCondLst>
+                            <p:childTnLst>
+                              <p:par>
+                                <p:cTn id="15" presetID="1" presetClass="entr" presetSubtype="0" fill="hold" grpId="0" nodeType="clickEffect">
+                                  <p:stCondLst>
+                                    <p:cond delay="0"/>
+                                  </p:stCondLst>
+                                  <p:childTnLst>
+                                    <p:set>
+                                      <p:cBhvr>
+                                        <p:cTn id="16" dur="1" fill="hold">
+                                          <p:stCondLst>
+                                            <p:cond delay="0"/>
+                                          </p:stCondLst>
+                                        </p:cTn>
+                                        <p:tgtEl>
+                                          <p:spTgt spid="21"/>
+                                        </p:tgtEl>
+                                        <p:attrNameLst>
+                                          <p:attrName>style.visibility</p:attrName>
+                                        </p:attrNameLst>
+                                      </p:cBhvr>
+                                      <p:to>
+                                        <p:strVal val="visible"/>
+                                      </p:to>
+                                    </p:set>
+                                  </p:childTnLst>
+                                </p:cTn>
+                              </p:par>
+                              <p:par>
+                                <p:cTn id="17" presetID="1" presetClass="entr" presetSubtype="0" fill="hold" nodeType="withEffect">
+                                  <p:stCondLst>
+                                    <p:cond delay="0"/>
+                                  </p:stCondLst>
+                                  <p:childTnLst>
+                                    <p:set>
+                                      <p:cBhvr>
+                                        <p:cTn id="18" dur="1" fill="hold">
+                                          <p:stCondLst>
+                                            <p:cond delay="0"/>
+                                          </p:stCondLst>
+                                        </p:cTn>
+                                        <p:tgtEl>
+                                          <p:spTgt spid="22"/>
+                                        </p:tgtEl>
+                                        <p:attrNameLst>
+                                          <p:attrName>style.visibility</p:attrName>
+                                        </p:attrNameLst>
+                                      </p:cBhvr>
+                                      <p:to>
+                                        <p:strVal val="visible"/>
+                                      </p:to>
+                                    </p:set>
+                                  </p:childTnLst>
+                                </p:cTn>
+                              </p:par>
+                              <p:par>
+                                <p:cTn id="19" presetID="1" presetClass="entr" presetSubtype="0" fill="hold" nodeType="withEffect">
+                                  <p:stCondLst>
+                                    <p:cond delay="0"/>
+                                  </p:stCondLst>
+                                  <p:childTnLst>
+                                    <p:set>
+                                      <p:cBhvr>
+                                        <p:cTn id="20" dur="1" fill="hold">
+                                          <p:stCondLst>
+                                            <p:cond delay="0"/>
+                                          </p:stCondLst>
+                                        </p:cTn>
+                                        <p:tgtEl>
+                                          <p:spTgt spid="23"/>
+                                        </p:tgtEl>
+                                        <p:attrNameLst>
+                                          <p:attrName>style.visibility</p:attrName>
+                                        </p:attrNameLst>
+                                      </p:cBhvr>
+                                      <p:to>
+                                        <p:strVal val="visible"/>
+                                      </p:to>
+                                    </p:set>
+                                  </p:childTnLst>
+                                </p:cTn>
+                              </p:par>
+                              <p:par>
+                                <p:cTn id="21" presetID="1" presetClass="entr" presetSubtype="0" fill="hold" nodeType="withEffect">
+                                  <p:stCondLst>
+                                    <p:cond delay="0"/>
+                                  </p:stCondLst>
+                                  <p:childTnLst>
+                                    <p:set>
+                                      <p:cBhvr>
+                                        <p:cTn id="22" dur="1" fill="hold">
+                                          <p:stCondLst>
+                                            <p:cond delay="0"/>
+                                          </p:stCondLst>
+                                        </p:cTn>
+                                        <p:tgtEl>
+                                          <p:spTgt spid="24"/>
+                                        </p:tgtEl>
+                                        <p:attrNameLst>
+                                          <p:attrName>style.visibility</p:attrName>
+                                        </p:attrNameLst>
+                                      </p:cBhvr>
+                                      <p:to>
+                                        <p:strVal val="visible"/>
+                                      </p:to>
+                                    </p:set>
+                                  </p:childTnLst>
+                                </p:cTn>
+                              </p:par>
+                              <p:par>
+                                <p:cTn id="23" presetID="1" presetClass="entr" presetSubtype="0" fill="hold" grpId="0" nodeType="withEffect">
+                                  <p:stCondLst>
+                                    <p:cond delay="0"/>
+                                  </p:stCondLst>
+                                  <p:childTnLst>
+                                    <p:set>
+                                      <p:cBhvr>
+                                        <p:cTn id="24" dur="1" fill="hold">
+                                          <p:stCondLst>
+                                            <p:cond delay="0"/>
+                                          </p:stCondLst>
+                                        </p:cTn>
+                                        <p:tgtEl>
+                                          <p:spTgt spid="30"/>
+                                        </p:tgtEl>
+                                        <p:attrNameLst>
+                                          <p:attrName>style.visibility</p:attrName>
+                                        </p:attrNameLst>
+                                      </p:cBhvr>
+                                      <p:to>
+                                        <p:strVal val="visible"/>
+                                      </p:to>
+                                    </p:set>
+                                  </p:childTnLst>
+                                </p:cTn>
+                              </p:par>
+                              <p:par>
+                                <p:cTn id="25" presetID="1" presetClass="entr" presetSubtype="0" fill="hold" grpId="0" nodeType="withEffect">
+                                  <p:stCondLst>
+                                    <p:cond delay="0"/>
+                                  </p:stCondLst>
+                                  <p:childTnLst>
+                                    <p:set>
+                                      <p:cBhvr>
+                                        <p:cTn id="26" dur="1" fill="hold">
+                                          <p:stCondLst>
+                                            <p:cond delay="0"/>
+                                          </p:stCondLst>
+                                        </p:cTn>
+                                        <p:tgtEl>
+                                          <p:spTgt spid="29"/>
+                                        </p:tgtEl>
+                                        <p:attrNameLst>
+                                          <p:attrName>style.visibility</p:attrName>
+                                        </p:attrNameLst>
+                                      </p:cBhvr>
+                                      <p:to>
+                                        <p:strVal val="visible"/>
+                                      </p:to>
+                                    </p:set>
+                                  </p:childTnLst>
+                                </p:cTn>
+                              </p:par>
+                              <p:par>
+                                <p:cTn id="27" presetID="1" presetClass="entr" presetSubtype="0" fill="hold" grpId="0" nodeType="withEffect">
+                                  <p:stCondLst>
+                                    <p:cond delay="0"/>
+                                  </p:stCondLst>
+                                  <p:childTnLst>
+                                    <p:set>
+                                      <p:cBhvr>
+                                        <p:cTn id="28" dur="1" fill="hold">
+                                          <p:stCondLst>
+                                            <p:cond delay="0"/>
+                                          </p:stCondLst>
+                                        </p:cTn>
+                                        <p:tgtEl>
+                                          <p:spTgt spid="27"/>
+                                        </p:tgtEl>
+                                        <p:attrNameLst>
+                                          <p:attrName>style.visibility</p:attrName>
+                                        </p:attrNameLst>
+                                      </p:cBhvr>
+                                      <p:to>
+                                        <p:strVal val="visible"/>
+                                      </p:to>
+                                    </p:set>
+                                  </p:childTnLst>
+                                </p:cTn>
+                              </p:par>
+                            </p:childTnLst>
+                          </p:cTn>
+                        </p:par>
+                      </p:childTnLst>
+                    </p:cTn>
+                  </p:par>
+                  <p:par>
+                    <p:cTn id="29" fill="hold">
+                      <p:stCondLst>
+                        <p:cond delay="indefinite"/>
+                      </p:stCondLst>
+                      <p:childTnLst>
+                        <p:par>
+                          <p:cTn id="30" fill="hold">
+                            <p:stCondLst>
+                              <p:cond delay="0"/>
+                            </p:stCondLst>
+                            <p:childTnLst>
+                              <p:par>
+                                <p:cTn id="31" presetID="1" presetClass="entr" presetSubtype="0" fill="hold" nodeType="clickEffect">
+                                  <p:stCondLst>
+                                    <p:cond delay="0"/>
+                                  </p:stCondLst>
+                                  <p:childTnLst>
+                                    <p:set>
+                                      <p:cBhvr>
+                                        <p:cTn id="32" dur="1" fill="hold">
+                                          <p:stCondLst>
+                                            <p:cond delay="0"/>
+                                          </p:stCondLst>
+                                        </p:cTn>
+                                        <p:tgtEl>
+                                          <p:spTgt spid="25"/>
+                                        </p:tgtEl>
+                                        <p:attrNameLst>
+                                          <p:attrName>style.visibility</p:attrName>
+                                        </p:attrNameLst>
+                                      </p:cBhvr>
+                                      <p:to>
+                                        <p:strVal val="visible"/>
+                                      </p:to>
+                                    </p:set>
+                                  </p:childTnLst>
+                                </p:cTn>
+                              </p:par>
+                              <p:par>
+                                <p:cTn id="33" presetID="1" presetClass="entr" presetSubtype="0" fill="hold" grpId="0" nodeType="withEffect">
+                                  <p:stCondLst>
+                                    <p:cond delay="0"/>
+                                  </p:stCondLst>
+                                  <p:childTnLst>
+                                    <p:set>
+                                      <p:cBhvr>
+                                        <p:cTn id="34" dur="1" fill="hold">
+                                          <p:stCondLst>
+                                            <p:cond delay="0"/>
+                                          </p:stCondLst>
+                                        </p:cTn>
+                                        <p:tgtEl>
+                                          <p:spTgt spid="34"/>
+                                        </p:tgtEl>
+                                        <p:attrNameLst>
+                                          <p:attrName>style.visibility</p:attrName>
+                                        </p:attrNameLst>
+                                      </p:cBhvr>
+                                      <p:to>
+                                        <p:strVal val="visible"/>
+                                      </p:to>
+                                    </p:set>
+                                  </p:childTnLst>
+                                </p:cTn>
+                              </p:par>
+                              <p:par>
+                                <p:cTn id="35" presetID="1" presetClass="entr" presetSubtype="0" fill="hold" grpId="0" nodeType="withEffect">
+                                  <p:stCondLst>
+                                    <p:cond delay="0"/>
+                                  </p:stCondLst>
+                                  <p:childTnLst>
+                                    <p:set>
+                                      <p:cBhvr>
+                                        <p:cTn id="36" dur="1" fill="hold">
+                                          <p:stCondLst>
+                                            <p:cond delay="0"/>
+                                          </p:stCondLst>
+                                        </p:cTn>
+                                        <p:tgtEl>
+                                          <p:spTgt spid="35"/>
+                                        </p:tgtEl>
+                                        <p:attrNameLst>
+                                          <p:attrName>style.visibility</p:attrName>
+                                        </p:attrNameLst>
+                                      </p:cBhvr>
+                                      <p:to>
+                                        <p:strVal val="visible"/>
+                                      </p:to>
+                                    </p:set>
+                                  </p:childTnLst>
+                                </p:cTn>
+                              </p:par>
+                            </p:childTnLst>
+                          </p:cTn>
+                        </p:par>
+                      </p:childTnLst>
+                    </p:cTn>
+                  </p:par>
+                  <p:par>
+                    <p:cTn id="37" fill="hold">
+                      <p:stCondLst>
+                        <p:cond delay="indefinite"/>
+                      </p:stCondLst>
+                      <p:childTnLst>
+                        <p:par>
+                          <p:cTn id="38" fill="hold">
+                            <p:stCondLst>
+                              <p:cond delay="0"/>
+                            </p:stCondLst>
+                            <p:childTnLst>
+                              <p:par>
+                                <p:cTn id="39" presetID="1" presetClass="entr" presetSubtype="0" fill="hold" nodeType="clickEffect">
+                                  <p:stCondLst>
+                                    <p:cond delay="0"/>
+                                  </p:stCondLst>
+                                  <p:childTnLst>
+                                    <p:set>
+                                      <p:cBhvr>
+                                        <p:cTn id="40" dur="1" fill="hold">
+                                          <p:stCondLst>
+                                            <p:cond delay="0"/>
+                                          </p:stCondLst>
+                                        </p:cTn>
+                                        <p:tgtEl>
+                                          <p:spTgt spid="26"/>
+                                        </p:tgtEl>
+                                        <p:attrNameLst>
+                                          <p:attrName>style.visibility</p:attrName>
+                                        </p:attrNameLst>
+                                      </p:cBhvr>
+                                      <p:to>
+                                        <p:strVal val="visible"/>
+                                      </p:to>
+                                    </p:set>
+                                  </p:childTnLst>
+                                </p:cTn>
+                              </p:par>
+                              <p:par>
+                                <p:cTn id="41" presetID="1" presetClass="entr" presetSubtype="0" fill="hold" grpId="0" nodeType="withEffect">
+                                  <p:stCondLst>
+                                    <p:cond delay="0"/>
+                                  </p:stCondLst>
+                                  <p:childTnLst>
+                                    <p:set>
+                                      <p:cBhvr>
+                                        <p:cTn id="42" dur="1" fill="hold">
+                                          <p:stCondLst>
+                                            <p:cond delay="0"/>
+                                          </p:stCondLst>
+                                        </p:cTn>
+                                        <p:tgtEl>
+                                          <p:spTgt spid="28"/>
+                                        </p:tgtEl>
+                                        <p:attrNameLst>
+                                          <p:attrName>style.visibility</p:attrName>
+                                        </p:attrNameLst>
+                                      </p:cBhvr>
+                                      <p:to>
+                                        <p:strVal val="visible"/>
+                                      </p:to>
+                                    </p:set>
+                                  </p:childTnLst>
+                                </p:cTn>
+                              </p:par>
+                              <p:par>
+                                <p:cTn id="43" presetID="1" presetClass="entr" presetSubtype="0" fill="hold" grpId="0" nodeType="withEffect">
+                                  <p:stCondLst>
+                                    <p:cond delay="0"/>
+                                  </p:stCondLst>
+                                  <p:childTnLst>
+                                    <p:set>
+                                      <p:cBhvr>
+                                        <p:cTn id="44" dur="1" fill="hold">
+                                          <p:stCondLst>
+                                            <p:cond delay="0"/>
+                                          </p:stCondLst>
+                                        </p:cTn>
+                                        <p:tgtEl>
+                                          <p:spTgt spid="9"/>
+                                        </p:tgtEl>
+                                        <p:attrNameLst>
+                                          <p:attrName>style.visibility</p:attrName>
+                                        </p:attrNameLst>
+                                      </p:cBhvr>
+                                      <p:to>
+                                        <p:strVal val="visible"/>
+                                      </p:to>
+                                    </p:set>
+                                  </p:childTnLst>
+                                </p:cTn>
+                              </p:par>
+                            </p:childTnLst>
+                          </p:cTn>
+                        </p:par>
+                      </p:childTnLst>
+                    </p:cTn>
+                  </p:par>
+                </p:childTnLst>
+              </p:cTn>
+              <p:prevCondLst>
+                <p:cond evt="onPrev" delay="0">
+                  <p:tgtEl>
+                    <p:sldTgt/>
+                  </p:tgtEl>
+                </p:cond>
+              </p:prevCondLst>
+              <p:nextCondLst>
+                <p:cond evt="onNext" delay="0">
+                  <p:tgtEl>
+                    <p:sldTgt/>
+                  </p:tgtEl>
+                </p:cond>
+              </p:nextCondLst>
+            </p:seq>
+          </p:childTnLst>
+        </p:cTn>
+      </p:par>
+    </p:tnLst>
+    <p:bldLst>
+      <p:bldP spid="20" grpId="0" animBg="1"/>
+      <p:bldP spid="21" grpId="0" animBg="1"/>
+      <p:bldP spid="27" grpId="0"/>
+      <p:bldP spid="28" grpId="0"/>
+      <p:bldP spid="29" grpId="0"/>
+      <p:bldP spid="30" grpId="0"/>
+      <p:bldP spid="31" grpId="0" animBg="1"/>
+      <p:bldP spid="33" grpId="0" animBg="1"/>
+      <p:bldP spid="34" grpId="0" animBg="1"/>
+      <p:bldP spid="35" grpId="0"/>
+      <p:bldP spid="9" grpId="0" animBg="1"/>
+    </p:bldLst>
+  </p:timing>
+</p:sld>
+</file>
+
+<file path=ppt/slides/slide5.xml><?xml version="1.0" encoding="utf-8"?>
+<p:sld xmlns:a="http://schemas.openxmlformats.org/drawingml/2006/main" xmlns:r="http://schemas.openxmlformats.org/officeDocument/2006/relationships" xmlns:p="http://schemas.openxmlformats.org/presentationml/2006/main">
+  <p:cSld>
+    <p:spTree>
+      <p:nvGrpSpPr>
+        <p:cNvPr id="1" name=""/>
+        <p:cNvGrpSpPr/>
+        <p:nvPr/>
+      </p:nvGrpSpPr>
+      <p:grpSpPr>
+        <a:xfrm>
+          <a:off x="0" y="0"/>
+          <a:ext cx="0" cy="0"/>
+          <a:chOff x="0" y="0"/>
+          <a:chExt cx="0" cy="0"/>
+        </a:xfrm>
+      </p:grpSpPr>
+      <p:sp>
+        <p:nvSpPr>
           <p:cNvPr id="2" name="Title 1">
             <a:extLst>
               <a:ext uri="{FF2B5EF4-FFF2-40B4-BE49-F238E27FC236}">

</xml_diff>

<commit_message>
Adding some content on authentication
</commit_message>
<xml_diff>
--- a/ImplementationGuideImages.pptx
+++ b/ImplementationGuideImages.pptx
@@ -10,6 +10,7 @@
     <p:sldId id="257" r:id="rId4"/>
     <p:sldId id="261" r:id="rId5"/>
     <p:sldId id="258" r:id="rId6"/>
+    <p:sldId id="262" r:id="rId7"/>
   </p:sldIdLst>
   <p:sldSz cx="12192000" cy="6858000"/>
   <p:notesSz cx="6858000" cy="9144000"/>
@@ -265,7 +266,7 @@
           <a:p>
             <a:fld id="{6B5A8AD0-4133-444B-956D-B3352209FA33}" type="datetimeFigureOut">
               <a:rPr lang="en-SE" smtClean="0"/>
-              <a:t>2024-01-24</a:t>
+              <a:t>2024-01-27</a:t>
             </a:fld>
             <a:endParaRPr lang="en-SE"/>
           </a:p>
@@ -465,7 +466,7 @@
           <a:p>
             <a:fld id="{6B5A8AD0-4133-444B-956D-B3352209FA33}" type="datetimeFigureOut">
               <a:rPr lang="en-SE" smtClean="0"/>
-              <a:t>2024-01-24</a:t>
+              <a:t>2024-01-27</a:t>
             </a:fld>
             <a:endParaRPr lang="en-SE"/>
           </a:p>
@@ -675,7 +676,7 @@
           <a:p>
             <a:fld id="{6B5A8AD0-4133-444B-956D-B3352209FA33}" type="datetimeFigureOut">
               <a:rPr lang="en-SE" smtClean="0"/>
-              <a:t>2024-01-24</a:t>
+              <a:t>2024-01-27</a:t>
             </a:fld>
             <a:endParaRPr lang="en-SE"/>
           </a:p>
@@ -875,7 +876,7 @@
           <a:p>
             <a:fld id="{6B5A8AD0-4133-444B-956D-B3352209FA33}" type="datetimeFigureOut">
               <a:rPr lang="en-SE" smtClean="0"/>
-              <a:t>2024-01-24</a:t>
+              <a:t>2024-01-27</a:t>
             </a:fld>
             <a:endParaRPr lang="en-SE"/>
           </a:p>
@@ -1151,7 +1152,7 @@
           <a:p>
             <a:fld id="{6B5A8AD0-4133-444B-956D-B3352209FA33}" type="datetimeFigureOut">
               <a:rPr lang="en-SE" smtClean="0"/>
-              <a:t>2024-01-24</a:t>
+              <a:t>2024-01-27</a:t>
             </a:fld>
             <a:endParaRPr lang="en-SE"/>
           </a:p>
@@ -1419,7 +1420,7 @@
           <a:p>
             <a:fld id="{6B5A8AD0-4133-444B-956D-B3352209FA33}" type="datetimeFigureOut">
               <a:rPr lang="en-SE" smtClean="0"/>
-              <a:t>2024-01-24</a:t>
+              <a:t>2024-01-27</a:t>
             </a:fld>
             <a:endParaRPr lang="en-SE"/>
           </a:p>
@@ -1834,7 +1835,7 @@
           <a:p>
             <a:fld id="{6B5A8AD0-4133-444B-956D-B3352209FA33}" type="datetimeFigureOut">
               <a:rPr lang="en-SE" smtClean="0"/>
-              <a:t>2024-01-24</a:t>
+              <a:t>2024-01-27</a:t>
             </a:fld>
             <a:endParaRPr lang="en-SE"/>
           </a:p>
@@ -1976,7 +1977,7 @@
           <a:p>
             <a:fld id="{6B5A8AD0-4133-444B-956D-B3352209FA33}" type="datetimeFigureOut">
               <a:rPr lang="en-SE" smtClean="0"/>
-              <a:t>2024-01-24</a:t>
+              <a:t>2024-01-27</a:t>
             </a:fld>
             <a:endParaRPr lang="en-SE"/>
           </a:p>
@@ -2089,7 +2090,7 @@
           <a:p>
             <a:fld id="{6B5A8AD0-4133-444B-956D-B3352209FA33}" type="datetimeFigureOut">
               <a:rPr lang="en-SE" smtClean="0"/>
-              <a:t>2024-01-24</a:t>
+              <a:t>2024-01-27</a:t>
             </a:fld>
             <a:endParaRPr lang="en-SE"/>
           </a:p>
@@ -2402,7 +2403,7 @@
           <a:p>
             <a:fld id="{6B5A8AD0-4133-444B-956D-B3352209FA33}" type="datetimeFigureOut">
               <a:rPr lang="en-SE" smtClean="0"/>
-              <a:t>2024-01-24</a:t>
+              <a:t>2024-01-27</a:t>
             </a:fld>
             <a:endParaRPr lang="en-SE"/>
           </a:p>
@@ -2691,7 +2692,7 @@
           <a:p>
             <a:fld id="{6B5A8AD0-4133-444B-956D-B3352209FA33}" type="datetimeFigureOut">
               <a:rPr lang="en-SE" smtClean="0"/>
-              <a:t>2024-01-24</a:t>
+              <a:t>2024-01-27</a:t>
             </a:fld>
             <a:endParaRPr lang="en-SE"/>
           </a:p>
@@ -2934,7 +2935,7 @@
           <a:p>
             <a:fld id="{6B5A8AD0-4133-444B-956D-B3352209FA33}" type="datetimeFigureOut">
               <a:rPr lang="en-SE" smtClean="0"/>
-              <a:t>2024-01-24</a:t>
+              <a:t>2024-01-27</a:t>
             </a:fld>
             <a:endParaRPr lang="en-SE"/>
           </a:p>
@@ -9750,6 +9751,907 @@
 </p:sld>
 </file>
 
+<file path=ppt/slides/slide6.xml><?xml version="1.0" encoding="utf-8"?>
+<p:sld xmlns:a="http://schemas.openxmlformats.org/drawingml/2006/main" xmlns:r="http://schemas.openxmlformats.org/officeDocument/2006/relationships" xmlns:p="http://schemas.openxmlformats.org/presentationml/2006/main">
+  <p:cSld>
+    <p:spTree>
+      <p:nvGrpSpPr>
+        <p:cNvPr id="1" name=""/>
+        <p:cNvGrpSpPr/>
+        <p:nvPr/>
+      </p:nvGrpSpPr>
+      <p:grpSpPr>
+        <a:xfrm>
+          <a:off x="0" y="0"/>
+          <a:ext cx="0" cy="0"/>
+          <a:chOff x="0" y="0"/>
+          <a:chExt cx="0" cy="0"/>
+        </a:xfrm>
+      </p:grpSpPr>
+      <p:sp>
+        <p:nvSpPr>
+          <p:cNvPr id="2" name="Rectangle: Rounded Corners 1">
+            <a:extLst>
+              <a:ext uri="{FF2B5EF4-FFF2-40B4-BE49-F238E27FC236}">
+                <a16:creationId xmlns:a16="http://schemas.microsoft.com/office/drawing/2014/main" id="{A6A1EED9-243B-7BBD-4808-DE1ECC8E4B69}"/>
+              </a:ext>
+            </a:extLst>
+          </p:cNvPr>
+          <p:cNvSpPr/>
+          <p:nvPr/>
+        </p:nvSpPr>
+        <p:spPr>
+          <a:xfrm>
+            <a:off x="3581656" y="3705892"/>
+            <a:ext cx="4054818" cy="622780"/>
+          </a:xfrm>
+          <a:prstGeom prst="roundRect">
+            <a:avLst/>
+          </a:prstGeom>
+          <a:solidFill>
+            <a:srgbClr val="602651"/>
+          </a:solidFill>
+          <a:ln w="12700" cap="flat" cmpd="sng" algn="ctr">
+            <a:solidFill>
+              <a:srgbClr val="602651">
+                <a:shade val="15000"/>
+              </a:srgbClr>
+            </a:solidFill>
+            <a:prstDash val="solid"/>
+            <a:miter lim="800000"/>
+          </a:ln>
+          <a:effectLst/>
+        </p:spPr>
+        <p:txBody>
+          <a:bodyPr rtlCol="0" anchor="ctr"/>
+          <a:lstStyle/>
+          <a:p>
+            <a:pPr algn="ctr"/>
+            <a:r>
+              <a:rPr lang="en-US" kern="0" dirty="0" err="1">
+                <a:solidFill>
+                  <a:srgbClr val="FFFFFF"/>
+                </a:solidFill>
+                <a:latin typeface="Calibri" panose="020F0502020204030204"/>
+              </a:rPr>
+              <a:t>MedicinalProductDefinition</a:t>
+            </a:r>
+            <a:r>
+              <a:rPr lang="en-US" kern="0" dirty="0">
+                <a:solidFill>
+                  <a:srgbClr val="FFFFFF"/>
+                </a:solidFill>
+                <a:latin typeface="Calibri" panose="020F0502020204030204"/>
+              </a:rPr>
+              <a:t> (GET)</a:t>
+            </a:r>
+          </a:p>
+          <a:p>
+            <a:pPr algn="ctr"/>
+            <a:r>
+              <a:rPr lang="en-US" sz="1200" kern="0" dirty="0">
+                <a:solidFill>
+                  <a:srgbClr val="FFFFFF"/>
+                </a:solidFill>
+                <a:latin typeface="Calibri" panose="020F0502020204030204"/>
+              </a:rPr>
+              <a:t>(Special license)</a:t>
+            </a:r>
+            <a:endParaRPr lang="en-SE" sz="1200" kern="0" dirty="0">
+              <a:solidFill>
+                <a:srgbClr val="FFFFFF"/>
+              </a:solidFill>
+              <a:latin typeface="Calibri" panose="020F0502020204030204"/>
+            </a:endParaRPr>
+          </a:p>
+        </p:txBody>
+      </p:sp>
+      <p:sp>
+        <p:nvSpPr>
+          <p:cNvPr id="3" name="Rectangle: Rounded Corners 2">
+            <a:extLst>
+              <a:ext uri="{FF2B5EF4-FFF2-40B4-BE49-F238E27FC236}">
+                <a16:creationId xmlns:a16="http://schemas.microsoft.com/office/drawing/2014/main" id="{7B518AF5-4BCB-E001-C29C-3E9F915FE331}"/>
+              </a:ext>
+            </a:extLst>
+          </p:cNvPr>
+          <p:cNvSpPr/>
+          <p:nvPr/>
+        </p:nvSpPr>
+        <p:spPr>
+          <a:xfrm>
+            <a:off x="3581656" y="2748388"/>
+            <a:ext cx="4054819" cy="622780"/>
+          </a:xfrm>
+          <a:prstGeom prst="roundRect">
+            <a:avLst/>
+          </a:prstGeom>
+          <a:solidFill>
+            <a:srgbClr val="163861"/>
+          </a:solidFill>
+          <a:ln w="12700" cap="flat" cmpd="sng" algn="ctr">
+            <a:solidFill>
+              <a:srgbClr val="602651">
+                <a:shade val="15000"/>
+              </a:srgbClr>
+            </a:solidFill>
+            <a:prstDash val="solid"/>
+            <a:miter lim="800000"/>
+          </a:ln>
+          <a:effectLst/>
+        </p:spPr>
+        <p:txBody>
+          <a:bodyPr rtlCol="0" anchor="ctr"/>
+          <a:lstStyle/>
+          <a:p>
+            <a:pPr algn="ctr"/>
+            <a:r>
+              <a:rPr lang="en-US" kern="0" dirty="0" err="1">
+                <a:solidFill>
+                  <a:srgbClr val="FFFFFF"/>
+                </a:solidFill>
+                <a:latin typeface="Calibri" panose="020F0502020204030204"/>
+              </a:rPr>
+              <a:t>AdministrableProductDefinition</a:t>
+            </a:r>
+            <a:r>
+              <a:rPr lang="en-US" kern="0" dirty="0">
+                <a:solidFill>
+                  <a:srgbClr val="FFFFFF"/>
+                </a:solidFill>
+                <a:latin typeface="Calibri" panose="020F0502020204030204"/>
+              </a:rPr>
+              <a:t> (GET)</a:t>
+            </a:r>
+            <a:endParaRPr lang="en-SE" kern="0" dirty="0">
+              <a:solidFill>
+                <a:srgbClr val="FFFFFF"/>
+              </a:solidFill>
+              <a:latin typeface="Calibri" panose="020F0502020204030204"/>
+            </a:endParaRPr>
+          </a:p>
+        </p:txBody>
+      </p:sp>
+      <p:sp>
+        <p:nvSpPr>
+          <p:cNvPr id="4" name="Rectangle: Rounded Corners 3">
+            <a:extLst>
+              <a:ext uri="{FF2B5EF4-FFF2-40B4-BE49-F238E27FC236}">
+                <a16:creationId xmlns:a16="http://schemas.microsoft.com/office/drawing/2014/main" id="{07C1D2CB-EF80-800F-A36D-206C059BF2CB}"/>
+              </a:ext>
+            </a:extLst>
+          </p:cNvPr>
+          <p:cNvSpPr/>
+          <p:nvPr/>
+        </p:nvSpPr>
+        <p:spPr>
+          <a:xfrm>
+            <a:off x="3581656" y="1790884"/>
+            <a:ext cx="4054818" cy="622780"/>
+          </a:xfrm>
+          <a:prstGeom prst="roundRect">
+            <a:avLst/>
+          </a:prstGeom>
+          <a:solidFill>
+            <a:schemeClr val="accent3">
+              <a:lumMod val="75000"/>
+            </a:schemeClr>
+          </a:solidFill>
+        </p:spPr>
+        <p:style>
+          <a:lnRef idx="2">
+            <a:schemeClr val="accent1">
+              <a:shade val="15000"/>
+            </a:schemeClr>
+          </a:lnRef>
+          <a:fillRef idx="1">
+            <a:schemeClr val="accent1"/>
+          </a:fillRef>
+          <a:effectRef idx="0">
+            <a:schemeClr val="accent1"/>
+          </a:effectRef>
+          <a:fontRef idx="minor">
+            <a:schemeClr val="lt1"/>
+          </a:fontRef>
+        </p:style>
+        <p:txBody>
+          <a:bodyPr rtlCol="0" anchor="ctr"/>
+          <a:lstStyle/>
+          <a:p>
+            <a:pPr algn="ctr"/>
+            <a:r>
+              <a:rPr lang="en-US" dirty="0" err="1"/>
+              <a:t>SubstanceDefinition</a:t>
+            </a:r>
+            <a:r>
+              <a:rPr lang="en-US" dirty="0"/>
+              <a:t> (GET)</a:t>
+            </a:r>
+            <a:endParaRPr lang="en-SE" dirty="0"/>
+          </a:p>
+        </p:txBody>
+      </p:sp>
+      <p:sp>
+        <p:nvSpPr>
+          <p:cNvPr id="5" name="Rectangle: Rounded Corners 4">
+            <a:extLst>
+              <a:ext uri="{FF2B5EF4-FFF2-40B4-BE49-F238E27FC236}">
+                <a16:creationId xmlns:a16="http://schemas.microsoft.com/office/drawing/2014/main" id="{C4D7FD27-55EB-0385-F8D7-7012C6DEBAFD}"/>
+              </a:ext>
+            </a:extLst>
+          </p:cNvPr>
+          <p:cNvSpPr/>
+          <p:nvPr/>
+        </p:nvSpPr>
+        <p:spPr>
+          <a:xfrm>
+            <a:off x="1789928" y="980839"/>
+            <a:ext cx="1109792" cy="622780"/>
+          </a:xfrm>
+          <a:prstGeom prst="roundRect">
+            <a:avLst/>
+          </a:prstGeom>
+          <a:ln/>
+        </p:spPr>
+        <p:style>
+          <a:lnRef idx="2">
+            <a:schemeClr val="accent4">
+              <a:shade val="15000"/>
+            </a:schemeClr>
+          </a:lnRef>
+          <a:fillRef idx="1">
+            <a:schemeClr val="accent4"/>
+          </a:fillRef>
+          <a:effectRef idx="0">
+            <a:schemeClr val="accent4"/>
+          </a:effectRef>
+          <a:fontRef idx="minor">
+            <a:schemeClr val="lt1"/>
+          </a:fontRef>
+        </p:style>
+        <p:txBody>
+          <a:bodyPr rtlCol="0" anchor="ctr"/>
+          <a:lstStyle/>
+          <a:p>
+            <a:pPr algn="ctr"/>
+            <a:r>
+              <a:rPr lang="en-US" kern="0" dirty="0">
+                <a:solidFill>
+                  <a:srgbClr val="FFFFFF"/>
+                </a:solidFill>
+                <a:latin typeface="Calibri" panose="020F0502020204030204"/>
+              </a:rPr>
+              <a:t>API</a:t>
+            </a:r>
+            <a:endParaRPr lang="en-SE" kern="0" dirty="0">
+              <a:solidFill>
+                <a:srgbClr val="FFFFFF"/>
+              </a:solidFill>
+              <a:latin typeface="Calibri" panose="020F0502020204030204"/>
+            </a:endParaRPr>
+          </a:p>
+        </p:txBody>
+      </p:sp>
+      <p:sp>
+        <p:nvSpPr>
+          <p:cNvPr id="6" name="Rectangle: Rounded Corners 5">
+            <a:extLst>
+              <a:ext uri="{FF2B5EF4-FFF2-40B4-BE49-F238E27FC236}">
+                <a16:creationId xmlns:a16="http://schemas.microsoft.com/office/drawing/2014/main" id="{9EB32689-49AE-C00F-6B44-BAA21D2117E8}"/>
+              </a:ext>
+            </a:extLst>
+          </p:cNvPr>
+          <p:cNvSpPr/>
+          <p:nvPr/>
+        </p:nvSpPr>
+        <p:spPr>
+          <a:xfrm>
+            <a:off x="3581657" y="4663397"/>
+            <a:ext cx="4054818" cy="622780"/>
+          </a:xfrm>
+          <a:prstGeom prst="roundRect">
+            <a:avLst/>
+          </a:prstGeom>
+        </p:spPr>
+        <p:style>
+          <a:lnRef idx="2">
+            <a:schemeClr val="accent2">
+              <a:shade val="15000"/>
+            </a:schemeClr>
+          </a:lnRef>
+          <a:fillRef idx="1">
+            <a:schemeClr val="accent2"/>
+          </a:fillRef>
+          <a:effectRef idx="0">
+            <a:schemeClr val="accent2"/>
+          </a:effectRef>
+          <a:fontRef idx="minor">
+            <a:schemeClr val="lt1"/>
+          </a:fontRef>
+        </p:style>
+        <p:txBody>
+          <a:bodyPr rtlCol="0" anchor="ctr"/>
+          <a:lstStyle/>
+          <a:p>
+            <a:pPr algn="ctr"/>
+            <a:r>
+              <a:rPr lang="en-US" dirty="0"/>
+              <a:t>Task (POST, GET, DELETE)</a:t>
+            </a:r>
+            <a:endParaRPr lang="en-SE" dirty="0"/>
+          </a:p>
+        </p:txBody>
+      </p:sp>
+      <p:cxnSp>
+        <p:nvCxnSpPr>
+          <p:cNvPr id="8" name="Connector: Elbow 7">
+            <a:extLst>
+              <a:ext uri="{FF2B5EF4-FFF2-40B4-BE49-F238E27FC236}">
+                <a16:creationId xmlns:a16="http://schemas.microsoft.com/office/drawing/2014/main" id="{A928A728-D046-80EE-F586-76B456AFD797}"/>
+              </a:ext>
+            </a:extLst>
+          </p:cNvPr>
+          <p:cNvCxnSpPr>
+            <a:stCxn id="5" idx="2"/>
+            <a:endCxn id="4" idx="1"/>
+          </p:cNvCxnSpPr>
+          <p:nvPr/>
+        </p:nvCxnSpPr>
+        <p:spPr>
+          <a:xfrm rot="16200000" flipH="1">
+            <a:off x="2713913" y="1234530"/>
+            <a:ext cx="498655" cy="1236832"/>
+          </a:xfrm>
+          <a:prstGeom prst="bentConnector2">
+            <a:avLst/>
+          </a:prstGeom>
+          <a:ln w="38100">
+            <a:solidFill>
+              <a:schemeClr val="tx2">
+                <a:lumMod val="75000"/>
+              </a:schemeClr>
+            </a:solidFill>
+            <a:tailEnd type="triangle"/>
+          </a:ln>
+        </p:spPr>
+        <p:style>
+          <a:lnRef idx="1">
+            <a:schemeClr val="accent1"/>
+          </a:lnRef>
+          <a:fillRef idx="0">
+            <a:schemeClr val="accent1"/>
+          </a:fillRef>
+          <a:effectRef idx="0">
+            <a:schemeClr val="accent1"/>
+          </a:effectRef>
+          <a:fontRef idx="minor">
+            <a:schemeClr val="tx1"/>
+          </a:fontRef>
+        </p:style>
+      </p:cxnSp>
+      <p:cxnSp>
+        <p:nvCxnSpPr>
+          <p:cNvPr id="9" name="Connector: Elbow 8">
+            <a:extLst>
+              <a:ext uri="{FF2B5EF4-FFF2-40B4-BE49-F238E27FC236}">
+                <a16:creationId xmlns:a16="http://schemas.microsoft.com/office/drawing/2014/main" id="{860AAAC7-4D17-F9A6-732A-F23885C462EB}"/>
+              </a:ext>
+            </a:extLst>
+          </p:cNvPr>
+          <p:cNvCxnSpPr>
+            <a:cxnSpLocks/>
+            <a:stCxn id="5" idx="2"/>
+            <a:endCxn id="3" idx="1"/>
+          </p:cNvCxnSpPr>
+          <p:nvPr/>
+        </p:nvCxnSpPr>
+        <p:spPr>
+          <a:xfrm rot="16200000" flipH="1">
+            <a:off x="2235161" y="1713282"/>
+            <a:ext cx="1456159" cy="1236832"/>
+          </a:xfrm>
+          <a:prstGeom prst="bentConnector2">
+            <a:avLst/>
+          </a:prstGeom>
+          <a:ln w="38100">
+            <a:solidFill>
+              <a:schemeClr val="tx2">
+                <a:lumMod val="75000"/>
+              </a:schemeClr>
+            </a:solidFill>
+            <a:tailEnd type="triangle"/>
+          </a:ln>
+        </p:spPr>
+        <p:style>
+          <a:lnRef idx="1">
+            <a:schemeClr val="accent1"/>
+          </a:lnRef>
+          <a:fillRef idx="0">
+            <a:schemeClr val="accent1"/>
+          </a:fillRef>
+          <a:effectRef idx="0">
+            <a:schemeClr val="accent1"/>
+          </a:effectRef>
+          <a:fontRef idx="minor">
+            <a:schemeClr val="tx1"/>
+          </a:fontRef>
+        </p:style>
+      </p:cxnSp>
+      <p:cxnSp>
+        <p:nvCxnSpPr>
+          <p:cNvPr id="12" name="Connector: Elbow 11">
+            <a:extLst>
+              <a:ext uri="{FF2B5EF4-FFF2-40B4-BE49-F238E27FC236}">
+                <a16:creationId xmlns:a16="http://schemas.microsoft.com/office/drawing/2014/main" id="{5C9EA003-5B37-13B2-6CC8-ED6C6D26C350}"/>
+              </a:ext>
+            </a:extLst>
+          </p:cNvPr>
+          <p:cNvCxnSpPr>
+            <a:cxnSpLocks/>
+            <a:stCxn id="5" idx="2"/>
+            <a:endCxn id="2" idx="1"/>
+          </p:cNvCxnSpPr>
+          <p:nvPr/>
+        </p:nvCxnSpPr>
+        <p:spPr>
+          <a:xfrm rot="16200000" flipH="1">
+            <a:off x="1756409" y="2192034"/>
+            <a:ext cx="2413663" cy="1236832"/>
+          </a:xfrm>
+          <a:prstGeom prst="bentConnector2">
+            <a:avLst/>
+          </a:prstGeom>
+          <a:ln w="38100">
+            <a:solidFill>
+              <a:schemeClr val="tx2">
+                <a:lumMod val="75000"/>
+              </a:schemeClr>
+            </a:solidFill>
+            <a:tailEnd type="triangle"/>
+          </a:ln>
+        </p:spPr>
+        <p:style>
+          <a:lnRef idx="1">
+            <a:schemeClr val="accent1"/>
+          </a:lnRef>
+          <a:fillRef idx="0">
+            <a:schemeClr val="accent1"/>
+          </a:fillRef>
+          <a:effectRef idx="0">
+            <a:schemeClr val="accent1"/>
+          </a:effectRef>
+          <a:fontRef idx="minor">
+            <a:schemeClr val="tx1"/>
+          </a:fontRef>
+        </p:style>
+      </p:cxnSp>
+      <p:cxnSp>
+        <p:nvCxnSpPr>
+          <p:cNvPr id="15" name="Connector: Elbow 14">
+            <a:extLst>
+              <a:ext uri="{FF2B5EF4-FFF2-40B4-BE49-F238E27FC236}">
+                <a16:creationId xmlns:a16="http://schemas.microsoft.com/office/drawing/2014/main" id="{352FBB81-59B9-4FFC-94F0-0D347445B8FC}"/>
+              </a:ext>
+            </a:extLst>
+          </p:cNvPr>
+          <p:cNvCxnSpPr>
+            <a:cxnSpLocks/>
+            <a:stCxn id="5" idx="2"/>
+            <a:endCxn id="6" idx="1"/>
+          </p:cNvCxnSpPr>
+          <p:nvPr/>
+        </p:nvCxnSpPr>
+        <p:spPr>
+          <a:xfrm rot="16200000" flipH="1">
+            <a:off x="1277656" y="2670786"/>
+            <a:ext cx="3371168" cy="1236833"/>
+          </a:xfrm>
+          <a:prstGeom prst="bentConnector2">
+            <a:avLst/>
+          </a:prstGeom>
+          <a:ln w="38100">
+            <a:solidFill>
+              <a:schemeClr val="tx2">
+                <a:lumMod val="75000"/>
+              </a:schemeClr>
+            </a:solidFill>
+            <a:tailEnd type="triangle"/>
+          </a:ln>
+        </p:spPr>
+        <p:style>
+          <a:lnRef idx="1">
+            <a:schemeClr val="accent1"/>
+          </a:lnRef>
+          <a:fillRef idx="0">
+            <a:schemeClr val="accent1"/>
+          </a:fillRef>
+          <a:effectRef idx="0">
+            <a:schemeClr val="accent1"/>
+          </a:effectRef>
+          <a:fontRef idx="minor">
+            <a:schemeClr val="tx1"/>
+          </a:fontRef>
+        </p:style>
+      </p:cxnSp>
+      <p:sp>
+        <p:nvSpPr>
+          <p:cNvPr id="18" name="Rectangle 17">
+            <a:extLst>
+              <a:ext uri="{FF2B5EF4-FFF2-40B4-BE49-F238E27FC236}">
+                <a16:creationId xmlns:a16="http://schemas.microsoft.com/office/drawing/2014/main" id="{F1268E06-0A40-5EBC-F956-7DD46D7B1FA1}"/>
+              </a:ext>
+            </a:extLst>
+          </p:cNvPr>
+          <p:cNvSpPr/>
+          <p:nvPr/>
+        </p:nvSpPr>
+        <p:spPr>
+          <a:xfrm>
+            <a:off x="3336324" y="3575222"/>
+            <a:ext cx="4497860" cy="1853513"/>
+          </a:xfrm>
+          <a:custGeom>
+            <a:avLst/>
+            <a:gdLst>
+              <a:gd name="connsiteX0" fmla="*/ 0 w 4497860"/>
+              <a:gd name="connsiteY0" fmla="*/ 0 h 1853513"/>
+              <a:gd name="connsiteX1" fmla="*/ 607211 w 4497860"/>
+              <a:gd name="connsiteY1" fmla="*/ 0 h 1853513"/>
+              <a:gd name="connsiteX2" fmla="*/ 1034508 w 4497860"/>
+              <a:gd name="connsiteY2" fmla="*/ 0 h 1853513"/>
+              <a:gd name="connsiteX3" fmla="*/ 1551762 w 4497860"/>
+              <a:gd name="connsiteY3" fmla="*/ 0 h 1853513"/>
+              <a:gd name="connsiteX4" fmla="*/ 1979058 w 4497860"/>
+              <a:gd name="connsiteY4" fmla="*/ 0 h 1853513"/>
+              <a:gd name="connsiteX5" fmla="*/ 2631248 w 4497860"/>
+              <a:gd name="connsiteY5" fmla="*/ 0 h 1853513"/>
+              <a:gd name="connsiteX6" fmla="*/ 3058545 w 4497860"/>
+              <a:gd name="connsiteY6" fmla="*/ 0 h 1853513"/>
+              <a:gd name="connsiteX7" fmla="*/ 3530820 w 4497860"/>
+              <a:gd name="connsiteY7" fmla="*/ 0 h 1853513"/>
+              <a:gd name="connsiteX8" fmla="*/ 4003095 w 4497860"/>
+              <a:gd name="connsiteY8" fmla="*/ 0 h 1853513"/>
+              <a:gd name="connsiteX9" fmla="*/ 4497860 w 4497860"/>
+              <a:gd name="connsiteY9" fmla="*/ 0 h 1853513"/>
+              <a:gd name="connsiteX10" fmla="*/ 4497860 w 4497860"/>
+              <a:gd name="connsiteY10" fmla="*/ 463378 h 1853513"/>
+              <a:gd name="connsiteX11" fmla="*/ 4497860 w 4497860"/>
+              <a:gd name="connsiteY11" fmla="*/ 908221 h 1853513"/>
+              <a:gd name="connsiteX12" fmla="*/ 4497860 w 4497860"/>
+              <a:gd name="connsiteY12" fmla="*/ 1371600 h 1853513"/>
+              <a:gd name="connsiteX13" fmla="*/ 4497860 w 4497860"/>
+              <a:gd name="connsiteY13" fmla="*/ 1853513 h 1853513"/>
+              <a:gd name="connsiteX14" fmla="*/ 4070563 w 4497860"/>
+              <a:gd name="connsiteY14" fmla="*/ 1853513 h 1853513"/>
+              <a:gd name="connsiteX15" fmla="*/ 3418374 w 4497860"/>
+              <a:gd name="connsiteY15" fmla="*/ 1853513 h 1853513"/>
+              <a:gd name="connsiteX16" fmla="*/ 2946098 w 4497860"/>
+              <a:gd name="connsiteY16" fmla="*/ 1853513 h 1853513"/>
+              <a:gd name="connsiteX17" fmla="*/ 2383866 w 4497860"/>
+              <a:gd name="connsiteY17" fmla="*/ 1853513 h 1853513"/>
+              <a:gd name="connsiteX18" fmla="*/ 1956569 w 4497860"/>
+              <a:gd name="connsiteY18" fmla="*/ 1853513 h 1853513"/>
+              <a:gd name="connsiteX19" fmla="*/ 1394337 w 4497860"/>
+              <a:gd name="connsiteY19" fmla="*/ 1853513 h 1853513"/>
+              <a:gd name="connsiteX20" fmla="*/ 787126 w 4497860"/>
+              <a:gd name="connsiteY20" fmla="*/ 1853513 h 1853513"/>
+              <a:gd name="connsiteX21" fmla="*/ 0 w 4497860"/>
+              <a:gd name="connsiteY21" fmla="*/ 1853513 h 1853513"/>
+              <a:gd name="connsiteX22" fmla="*/ 0 w 4497860"/>
+              <a:gd name="connsiteY22" fmla="*/ 1445740 h 1853513"/>
+              <a:gd name="connsiteX23" fmla="*/ 0 w 4497860"/>
+              <a:gd name="connsiteY23" fmla="*/ 963827 h 1853513"/>
+              <a:gd name="connsiteX24" fmla="*/ 0 w 4497860"/>
+              <a:gd name="connsiteY24" fmla="*/ 556054 h 1853513"/>
+              <a:gd name="connsiteX25" fmla="*/ 0 w 4497860"/>
+              <a:gd name="connsiteY25" fmla="*/ 0 h 1853513"/>
+            </a:gdLst>
+            <a:ahLst/>
+            <a:cxnLst>
+              <a:cxn ang="0">
+                <a:pos x="connsiteX0" y="connsiteY0"/>
+              </a:cxn>
+              <a:cxn ang="0">
+                <a:pos x="connsiteX1" y="connsiteY1"/>
+              </a:cxn>
+              <a:cxn ang="0">
+                <a:pos x="connsiteX2" y="connsiteY2"/>
+              </a:cxn>
+              <a:cxn ang="0">
+                <a:pos x="connsiteX3" y="connsiteY3"/>
+              </a:cxn>
+              <a:cxn ang="0">
+                <a:pos x="connsiteX4" y="connsiteY4"/>
+              </a:cxn>
+              <a:cxn ang="0">
+                <a:pos x="connsiteX5" y="connsiteY5"/>
+              </a:cxn>
+              <a:cxn ang="0">
+                <a:pos x="connsiteX6" y="connsiteY6"/>
+              </a:cxn>
+              <a:cxn ang="0">
+                <a:pos x="connsiteX7" y="connsiteY7"/>
+              </a:cxn>
+              <a:cxn ang="0">
+                <a:pos x="connsiteX8" y="connsiteY8"/>
+              </a:cxn>
+              <a:cxn ang="0">
+                <a:pos x="connsiteX9" y="connsiteY9"/>
+              </a:cxn>
+              <a:cxn ang="0">
+                <a:pos x="connsiteX10" y="connsiteY10"/>
+              </a:cxn>
+              <a:cxn ang="0">
+                <a:pos x="connsiteX11" y="connsiteY11"/>
+              </a:cxn>
+              <a:cxn ang="0">
+                <a:pos x="connsiteX12" y="connsiteY12"/>
+              </a:cxn>
+              <a:cxn ang="0">
+                <a:pos x="connsiteX13" y="connsiteY13"/>
+              </a:cxn>
+              <a:cxn ang="0">
+                <a:pos x="connsiteX14" y="connsiteY14"/>
+              </a:cxn>
+              <a:cxn ang="0">
+                <a:pos x="connsiteX15" y="connsiteY15"/>
+              </a:cxn>
+              <a:cxn ang="0">
+                <a:pos x="connsiteX16" y="connsiteY16"/>
+              </a:cxn>
+              <a:cxn ang="0">
+                <a:pos x="connsiteX17" y="connsiteY17"/>
+              </a:cxn>
+              <a:cxn ang="0">
+                <a:pos x="connsiteX18" y="connsiteY18"/>
+              </a:cxn>
+              <a:cxn ang="0">
+                <a:pos x="connsiteX19" y="connsiteY19"/>
+              </a:cxn>
+              <a:cxn ang="0">
+                <a:pos x="connsiteX20" y="connsiteY20"/>
+              </a:cxn>
+              <a:cxn ang="0">
+                <a:pos x="connsiteX21" y="connsiteY21"/>
+              </a:cxn>
+              <a:cxn ang="0">
+                <a:pos x="connsiteX22" y="connsiteY22"/>
+              </a:cxn>
+              <a:cxn ang="0">
+                <a:pos x="connsiteX23" y="connsiteY23"/>
+              </a:cxn>
+              <a:cxn ang="0">
+                <a:pos x="connsiteX24" y="connsiteY24"/>
+              </a:cxn>
+              <a:cxn ang="0">
+                <a:pos x="connsiteX25" y="connsiteY25"/>
+              </a:cxn>
+            </a:cxnLst>
+            <a:rect l="l" t="t" r="r" b="b"/>
+            <a:pathLst>
+              <a:path w="4497860" h="1853513" extrusionOk="0">
+                <a:moveTo>
+                  <a:pt x="0" y="0"/>
+                </a:moveTo>
+                <a:cubicBezTo>
+                  <a:pt x="256733" y="-43004"/>
+                  <a:pt x="327057" y="64863"/>
+                  <a:pt x="607211" y="0"/>
+                </a:cubicBezTo>
+                <a:cubicBezTo>
+                  <a:pt x="887365" y="-64863"/>
+                  <a:pt x="889967" y="6900"/>
+                  <a:pt x="1034508" y="0"/>
+                </a:cubicBezTo>
+                <a:cubicBezTo>
+                  <a:pt x="1179049" y="-6900"/>
+                  <a:pt x="1356711" y="31455"/>
+                  <a:pt x="1551762" y="0"/>
+                </a:cubicBezTo>
+                <a:cubicBezTo>
+                  <a:pt x="1746813" y="-31455"/>
+                  <a:pt x="1846425" y="29390"/>
+                  <a:pt x="1979058" y="0"/>
+                </a:cubicBezTo>
+                <a:cubicBezTo>
+                  <a:pt x="2111691" y="-29390"/>
+                  <a:pt x="2373889" y="41501"/>
+                  <a:pt x="2631248" y="0"/>
+                </a:cubicBezTo>
+                <a:cubicBezTo>
+                  <a:pt x="2888607" y="-41501"/>
+                  <a:pt x="2944973" y="33819"/>
+                  <a:pt x="3058545" y="0"/>
+                </a:cubicBezTo>
+                <a:cubicBezTo>
+                  <a:pt x="3172117" y="-33819"/>
+                  <a:pt x="3377326" y="39846"/>
+                  <a:pt x="3530820" y="0"/>
+                </a:cubicBezTo>
+                <a:cubicBezTo>
+                  <a:pt x="3684314" y="-39846"/>
+                  <a:pt x="3773814" y="43399"/>
+                  <a:pt x="4003095" y="0"/>
+                </a:cubicBezTo>
+                <a:cubicBezTo>
+                  <a:pt x="4232376" y="-43399"/>
+                  <a:pt x="4256934" y="29781"/>
+                  <a:pt x="4497860" y="0"/>
+                </a:cubicBezTo>
+                <a:cubicBezTo>
+                  <a:pt x="4497945" y="97629"/>
+                  <a:pt x="4463612" y="339729"/>
+                  <a:pt x="4497860" y="463378"/>
+                </a:cubicBezTo>
+                <a:cubicBezTo>
+                  <a:pt x="4532108" y="587027"/>
+                  <a:pt x="4468320" y="696559"/>
+                  <a:pt x="4497860" y="908221"/>
+                </a:cubicBezTo>
+                <a:cubicBezTo>
+                  <a:pt x="4527400" y="1119883"/>
+                  <a:pt x="4490354" y="1154749"/>
+                  <a:pt x="4497860" y="1371600"/>
+                </a:cubicBezTo>
+                <a:cubicBezTo>
+                  <a:pt x="4505366" y="1588451"/>
+                  <a:pt x="4453758" y="1750881"/>
+                  <a:pt x="4497860" y="1853513"/>
+                </a:cubicBezTo>
+                <a:cubicBezTo>
+                  <a:pt x="4341028" y="1888501"/>
+                  <a:pt x="4191527" y="1833877"/>
+                  <a:pt x="4070563" y="1853513"/>
+                </a:cubicBezTo>
+                <a:cubicBezTo>
+                  <a:pt x="3949599" y="1873149"/>
+                  <a:pt x="3689505" y="1780201"/>
+                  <a:pt x="3418374" y="1853513"/>
+                </a:cubicBezTo>
+                <a:cubicBezTo>
+                  <a:pt x="3147243" y="1926825"/>
+                  <a:pt x="3170584" y="1822045"/>
+                  <a:pt x="2946098" y="1853513"/>
+                </a:cubicBezTo>
+                <a:cubicBezTo>
+                  <a:pt x="2721612" y="1884981"/>
+                  <a:pt x="2580483" y="1851284"/>
+                  <a:pt x="2383866" y="1853513"/>
+                </a:cubicBezTo>
+                <a:cubicBezTo>
+                  <a:pt x="2187249" y="1855742"/>
+                  <a:pt x="2055184" y="1831991"/>
+                  <a:pt x="1956569" y="1853513"/>
+                </a:cubicBezTo>
+                <a:cubicBezTo>
+                  <a:pt x="1857954" y="1875035"/>
+                  <a:pt x="1586842" y="1801096"/>
+                  <a:pt x="1394337" y="1853513"/>
+                </a:cubicBezTo>
+                <a:cubicBezTo>
+                  <a:pt x="1201832" y="1905930"/>
+                  <a:pt x="999904" y="1812059"/>
+                  <a:pt x="787126" y="1853513"/>
+                </a:cubicBezTo>
+                <a:cubicBezTo>
+                  <a:pt x="574348" y="1894967"/>
+                  <a:pt x="247171" y="1840682"/>
+                  <a:pt x="0" y="1853513"/>
+                </a:cubicBezTo>
+                <a:cubicBezTo>
+                  <a:pt x="-2255" y="1686211"/>
+                  <a:pt x="15398" y="1629522"/>
+                  <a:pt x="0" y="1445740"/>
+                </a:cubicBezTo>
+                <a:cubicBezTo>
+                  <a:pt x="-15398" y="1261958"/>
+                  <a:pt x="24768" y="1133849"/>
+                  <a:pt x="0" y="963827"/>
+                </a:cubicBezTo>
+                <a:cubicBezTo>
+                  <a:pt x="-24768" y="793805"/>
+                  <a:pt x="21348" y="649557"/>
+                  <a:pt x="0" y="556054"/>
+                </a:cubicBezTo>
+                <a:cubicBezTo>
+                  <a:pt x="-21348" y="462551"/>
+                  <a:pt x="32736" y="130581"/>
+                  <a:pt x="0" y="0"/>
+                </a:cubicBezTo>
+                <a:close/>
+              </a:path>
+            </a:pathLst>
+          </a:custGeom>
+          <a:noFill/>
+          <a:ln>
+            <a:extLst>
+              <a:ext uri="{C807C97D-BFC1-408E-A445-0C87EB9F89A2}">
+                <ask:lineSketchStyleProps xmlns:ask="http://schemas.microsoft.com/office/drawing/2018/sketchyshapes" sd="1066159514">
+                  <a:prstGeom prst="rect">
+                    <a:avLst/>
+                  </a:prstGeom>
+                  <ask:type>
+                    <ask:lineSketchScribble/>
+                  </ask:type>
+                </ask:lineSketchStyleProps>
+              </a:ext>
+            </a:extLst>
+          </a:ln>
+        </p:spPr>
+        <p:style>
+          <a:lnRef idx="2">
+            <a:schemeClr val="accent1">
+              <a:shade val="15000"/>
+            </a:schemeClr>
+          </a:lnRef>
+          <a:fillRef idx="1">
+            <a:schemeClr val="accent1"/>
+          </a:fillRef>
+          <a:effectRef idx="0">
+            <a:schemeClr val="accent1"/>
+          </a:effectRef>
+          <a:fontRef idx="minor">
+            <a:schemeClr val="lt1"/>
+          </a:fontRef>
+        </p:style>
+        <p:txBody>
+          <a:bodyPr rtlCol="0" anchor="ctr"/>
+          <a:lstStyle/>
+          <a:p>
+            <a:pPr algn="ctr"/>
+            <a:endParaRPr lang="en-SE"/>
+          </a:p>
+        </p:txBody>
+      </p:sp>
+      <p:sp>
+        <p:nvSpPr>
+          <p:cNvPr id="19" name="TextBox 18">
+            <a:extLst>
+              <a:ext uri="{FF2B5EF4-FFF2-40B4-BE49-F238E27FC236}">
+                <a16:creationId xmlns:a16="http://schemas.microsoft.com/office/drawing/2014/main" id="{5BE77691-B4C7-2940-908A-2254153773C0}"/>
+              </a:ext>
+            </a:extLst>
+          </p:cNvPr>
+          <p:cNvSpPr txBox="1"/>
+          <p:nvPr/>
+        </p:nvSpPr>
+        <p:spPr>
+          <a:xfrm>
+            <a:off x="4431956" y="5448123"/>
+            <a:ext cx="2817340" cy="369332"/>
+          </a:xfrm>
+          <a:prstGeom prst="rect">
+            <a:avLst/>
+          </a:prstGeom>
+          <a:noFill/>
+        </p:spPr>
+        <p:txBody>
+          <a:bodyPr wrap="square" rtlCol="0">
+            <a:spAutoFit/>
+          </a:bodyPr>
+          <a:lstStyle/>
+          <a:p>
+            <a:r>
+              <a:rPr lang="en-US" dirty="0"/>
+              <a:t>Requires authentication</a:t>
+            </a:r>
+            <a:endParaRPr lang="en-SE" dirty="0"/>
+          </a:p>
+        </p:txBody>
+      </p:sp>
+    </p:spTree>
+    <p:extLst>
+      <p:ext uri="{BB962C8B-B14F-4D97-AF65-F5344CB8AC3E}">
+        <p14:creationId xmlns:p14="http://schemas.microsoft.com/office/powerpoint/2010/main" val="3736548304"/>
+      </p:ext>
+    </p:extLst>
+  </p:cSld>
+  <p:clrMapOvr>
+    <a:masterClrMapping/>
+  </p:clrMapOvr>
+</p:sld>
+</file>
+
 <file path=ppt/theme/theme1.xml><?xml version="1.0" encoding="utf-8"?>
 <a:theme xmlns:a="http://schemas.openxmlformats.org/drawingml/2006/main" name="Office Theme">
   <a:themeElements>

</xml_diff>

<commit_message>
Updating an image in the PPT
</commit_message>
<xml_diff>
--- a/ImplementationGuideImages.pptx
+++ b/ImplementationGuideImages.pptx
@@ -266,7 +266,7 @@
           <a:p>
             <a:fld id="{6B5A8AD0-4133-444B-956D-B3352209FA33}" type="datetimeFigureOut">
               <a:rPr lang="en-SE" smtClean="0"/>
-              <a:t>2024-01-27</a:t>
+              <a:t>2024-01-29</a:t>
             </a:fld>
             <a:endParaRPr lang="en-SE"/>
           </a:p>
@@ -466,7 +466,7 @@
           <a:p>
             <a:fld id="{6B5A8AD0-4133-444B-956D-B3352209FA33}" type="datetimeFigureOut">
               <a:rPr lang="en-SE" smtClean="0"/>
-              <a:t>2024-01-27</a:t>
+              <a:t>2024-01-29</a:t>
             </a:fld>
             <a:endParaRPr lang="en-SE"/>
           </a:p>
@@ -676,7 +676,7 @@
           <a:p>
             <a:fld id="{6B5A8AD0-4133-444B-956D-B3352209FA33}" type="datetimeFigureOut">
               <a:rPr lang="en-SE" smtClean="0"/>
-              <a:t>2024-01-27</a:t>
+              <a:t>2024-01-29</a:t>
             </a:fld>
             <a:endParaRPr lang="en-SE"/>
           </a:p>
@@ -876,7 +876,7 @@
           <a:p>
             <a:fld id="{6B5A8AD0-4133-444B-956D-B3352209FA33}" type="datetimeFigureOut">
               <a:rPr lang="en-SE" smtClean="0"/>
-              <a:t>2024-01-27</a:t>
+              <a:t>2024-01-29</a:t>
             </a:fld>
             <a:endParaRPr lang="en-SE"/>
           </a:p>
@@ -1152,7 +1152,7 @@
           <a:p>
             <a:fld id="{6B5A8AD0-4133-444B-956D-B3352209FA33}" type="datetimeFigureOut">
               <a:rPr lang="en-SE" smtClean="0"/>
-              <a:t>2024-01-27</a:t>
+              <a:t>2024-01-29</a:t>
             </a:fld>
             <a:endParaRPr lang="en-SE"/>
           </a:p>
@@ -1420,7 +1420,7 @@
           <a:p>
             <a:fld id="{6B5A8AD0-4133-444B-956D-B3352209FA33}" type="datetimeFigureOut">
               <a:rPr lang="en-SE" smtClean="0"/>
-              <a:t>2024-01-27</a:t>
+              <a:t>2024-01-29</a:t>
             </a:fld>
             <a:endParaRPr lang="en-SE"/>
           </a:p>
@@ -1835,7 +1835,7 @@
           <a:p>
             <a:fld id="{6B5A8AD0-4133-444B-956D-B3352209FA33}" type="datetimeFigureOut">
               <a:rPr lang="en-SE" smtClean="0"/>
-              <a:t>2024-01-27</a:t>
+              <a:t>2024-01-29</a:t>
             </a:fld>
             <a:endParaRPr lang="en-SE"/>
           </a:p>
@@ -1977,7 +1977,7 @@
           <a:p>
             <a:fld id="{6B5A8AD0-4133-444B-956D-B3352209FA33}" type="datetimeFigureOut">
               <a:rPr lang="en-SE" smtClean="0"/>
-              <a:t>2024-01-27</a:t>
+              <a:t>2024-01-29</a:t>
             </a:fld>
             <a:endParaRPr lang="en-SE"/>
           </a:p>
@@ -2090,7 +2090,7 @@
           <a:p>
             <a:fld id="{6B5A8AD0-4133-444B-956D-B3352209FA33}" type="datetimeFigureOut">
               <a:rPr lang="en-SE" smtClean="0"/>
-              <a:t>2024-01-27</a:t>
+              <a:t>2024-01-29</a:t>
             </a:fld>
             <a:endParaRPr lang="en-SE"/>
           </a:p>
@@ -2403,7 +2403,7 @@
           <a:p>
             <a:fld id="{6B5A8AD0-4133-444B-956D-B3352209FA33}" type="datetimeFigureOut">
               <a:rPr lang="en-SE" smtClean="0"/>
-              <a:t>2024-01-27</a:t>
+              <a:t>2024-01-29</a:t>
             </a:fld>
             <a:endParaRPr lang="en-SE"/>
           </a:p>
@@ -2692,7 +2692,7 @@
           <a:p>
             <a:fld id="{6B5A8AD0-4133-444B-956D-B3352209FA33}" type="datetimeFigureOut">
               <a:rPr lang="en-SE" smtClean="0"/>
-              <a:t>2024-01-27</a:t>
+              <a:t>2024-01-29</a:t>
             </a:fld>
             <a:endParaRPr lang="en-SE"/>
           </a:p>
@@ -2935,7 +2935,7 @@
           <a:p>
             <a:fld id="{6B5A8AD0-4133-444B-956D-B3352209FA33}" type="datetimeFigureOut">
               <a:rPr lang="en-SE" smtClean="0"/>
-              <a:t>2024-01-27</a:t>
+              <a:t>2024-01-29</a:t>
             </a:fld>
             <a:endParaRPr lang="en-SE"/>
           </a:p>
@@ -3512,9 +3512,9 @@
             </a:gsLst>
             <a:lin ang="5400000" scaled="0"/>
           </a:gradFill>
-          <a:ln w="6350" cap="flat" cmpd="sng" algn="ctr">
+          <a:ln w="12700" cap="flat" cmpd="sng" algn="ctr">
             <a:solidFill>
-              <a:srgbClr val="77C5B1"/>
+              <a:schemeClr val="tx1"/>
             </a:solidFill>
             <a:prstDash val="solid"/>
             <a:miter lim="800000"/>
@@ -6193,9 +6193,9 @@
             </a:gsLst>
             <a:lin ang="5400000" scaled="0"/>
           </a:gradFill>
-          <a:ln w="6350" cap="flat" cmpd="sng" algn="ctr">
+          <a:ln w="12700" cap="flat" cmpd="sng" algn="ctr">
             <a:solidFill>
-              <a:srgbClr val="77C5B1"/>
+              <a:schemeClr val="tx1"/>
             </a:solidFill>
             <a:prstDash val="solid"/>
             <a:miter lim="800000"/>
@@ -8338,9 +8338,9 @@
             </a:gsLst>
             <a:lin ang="5400000" scaled="0"/>
           </a:gradFill>
-          <a:ln w="6350" cap="flat" cmpd="sng" algn="ctr">
+          <a:ln w="12700" cap="flat" cmpd="sng" algn="ctr">
             <a:solidFill>
-              <a:srgbClr val="77C5B1"/>
+              <a:schemeClr val="tx1"/>
             </a:solidFill>
             <a:prstDash val="solid"/>
             <a:miter lim="800000"/>

</xml_diff>